<commit_message>
Updated gradient descent pptx from 04.04.21 practice session.
</commit_message>
<xml_diff>
--- a/presentations/03_gradient_descent.pptx
+++ b/presentations/03_gradient_descent.pptx
@@ -19,14 +19,14 @@
     <p:sldId id="303" r:id="rId10"/>
     <p:sldId id="308" r:id="rId11"/>
     <p:sldId id="313" r:id="rId12"/>
-    <p:sldId id="329" r:id="rId13"/>
-    <p:sldId id="325" r:id="rId14"/>
-    <p:sldId id="331" r:id="rId15"/>
-    <p:sldId id="330" r:id="rId16"/>
-    <p:sldId id="311" r:id="rId17"/>
-    <p:sldId id="294" r:id="rId18"/>
-    <p:sldId id="323" r:id="rId19"/>
-    <p:sldId id="289" r:id="rId20"/>
+    <p:sldId id="294" r:id="rId13"/>
+    <p:sldId id="329" r:id="rId14"/>
+    <p:sldId id="325" r:id="rId15"/>
+    <p:sldId id="331" r:id="rId16"/>
+    <p:sldId id="330" r:id="rId17"/>
+    <p:sldId id="311" r:id="rId18"/>
+    <p:sldId id="289" r:id="rId19"/>
+    <p:sldId id="323" r:id="rId20"/>
     <p:sldId id="328" r:id="rId21"/>
     <p:sldId id="305" r:id="rId22"/>
     <p:sldId id="324" r:id="rId23"/>
@@ -229,7 +229,7 @@
           <a:p>
             <a:fld id="{FD93C9B2-20F6-4DB1-B471-224337D0AC79}" type="datetimeFigureOut">
               <a:rPr lang="en-US" smtClean="0"/>
-              <a:t>11/19/2021</a:t>
+              <a:t>4/4/2022</a:t>
             </a:fld>
             <a:endParaRPr lang="en-US"/>
           </a:p>
@@ -960,27 +960,6 @@
           <a:bodyPr/>
           <a:lstStyle/>
           <a:p>
-            <a:r>
-              <a:rPr lang="en-US" b="0" i="0" dirty="0">
-                <a:solidFill>
-                  <a:srgbClr val="3C3C3B"/>
-                </a:solidFill>
-                <a:effectLst/>
-                <a:latin typeface="+mn-lt"/>
-              </a:rPr>
-              <a:t>Now that we’ve examined backpropagation from the perspective of the error function, its contour, and gradient descent, it’s time to take a closer look at how the network’s weights are adjusted.</a:t>
-            </a:r>
-          </a:p>
-          <a:p>
-            <a:endParaRPr lang="en-US" b="0" i="0" dirty="0">
-              <a:solidFill>
-                <a:srgbClr val="3C3C3B"/>
-              </a:solidFill>
-              <a:effectLst/>
-              <a:latin typeface="+mn-lt"/>
-            </a:endParaRPr>
-          </a:p>
-          <a:p>
             <a:pPr marL="0" marR="0" lvl="0" indent="0" algn="l" defTabSz="914400" rtl="0" eaLnBrk="1" fontAlgn="auto" latinLnBrk="0" hangingPunct="1">
               <a:lnSpc>
                 <a:spcPct val="100000"/>
@@ -999,33 +978,9 @@
               <a:defRPr/>
             </a:pPr>
             <a:r>
-              <a:rPr lang="en-US" b="0" i="0" dirty="0">
-                <a:solidFill>
-                  <a:srgbClr val="3C3C3B"/>
-                </a:solidFill>
-                <a:effectLst/>
-                <a:latin typeface="+mn-lt"/>
-              </a:rPr>
-              <a:t>We start with a key observation: When the output of any neuron in our network changes, the final output error changes by a proportional amount. </a:t>
-            </a:r>
-            <a:r>
-              <a:rPr lang="en-US" sz="1200" dirty="0">
-                <a:effectLst/>
-                <a:latin typeface="+mn-lt"/>
-                <a:ea typeface="Malgun Gothic" panose="020B0503020000020004" pitchFamily="34" charset="-127"/>
-                <a:cs typeface="Times New Roman" panose="02020603050405020304" pitchFamily="18" charset="0"/>
-              </a:rPr>
-              <a:t>The connection between any change in the neuron’s output and the resulting change in the final error is just the neuron’s change multiplied by some number. This number goes by various names, but the most popular is the lowercase Greek letter δ (delta), though sometimes the uppercase version, Δ, is used. Mathematicians often use the delta character to mean “change” of some sort, so this was a natural (if terse) choice of name.  </a:t>
-            </a:r>
-          </a:p>
-          <a:p>
-            <a:endParaRPr lang="en-US" b="0" i="0" dirty="0">
-              <a:solidFill>
-                <a:srgbClr val="3C3C3B"/>
-              </a:solidFill>
-              <a:effectLst/>
-              <a:latin typeface="+mn-lt"/>
-            </a:endParaRPr>
+              <a:rPr lang="en-US" dirty="0"/>
+              <a:t>The learning experience for this workshop starts on page 79 of the textbook.  For additional information, please watch the exercise 2.01 orientation video.</a:t>
+            </a:r>
           </a:p>
         </p:txBody>
       </p:sp>
@@ -1055,7 +1010,7 @@
     </p:spTree>
     <p:extLst>
       <p:ext uri="{BB962C8B-B14F-4D97-AF65-F5344CB8AC3E}">
-        <p14:creationId xmlns:p14="http://schemas.microsoft.com/office/powerpoint/2010/main" val="1498903180"/>
+        <p14:creationId xmlns:p14="http://schemas.microsoft.com/office/powerpoint/2010/main" val="2820707112"/>
       </p:ext>
     </p:extLst>
   </p:cSld>
@@ -1109,7 +1064,28 @@
           <a:bodyPr/>
           <a:lstStyle/>
           <a:p>
-            <a:pPr marL="0" marR="0" lvl="0" indent="0" algn="l" defTabSz="914400" rtl="0" eaLnBrk="1" fontAlgn="auto" latinLnBrk="0" hangingPunct="1">
+            <a:r>
+              <a:rPr lang="en-US" b="0" i="0" dirty="0">
+                <a:solidFill>
+                  <a:srgbClr val="3C3C3B"/>
+                </a:solidFill>
+                <a:effectLst/>
+                <a:latin typeface="+mn-lt"/>
+              </a:rPr>
+              <a:t>Now that we’ve examined backpropagation from the perspective of the error function, its contour, and gradient descent, it’s time to take a closer look at how the network’s weights are adjusted.</a:t>
+            </a:r>
+          </a:p>
+          <a:p>
+            <a:endParaRPr lang="en-US" b="0" i="0" dirty="0">
+              <a:solidFill>
+                <a:srgbClr val="3C3C3B"/>
+              </a:solidFill>
+              <a:effectLst/>
+              <a:latin typeface="+mn-lt"/>
+            </a:endParaRPr>
+          </a:p>
+          <a:p>
+            <a:pPr marL="228600" marR="0" lvl="0" indent="-228600" algn="l" defTabSz="914400" rtl="0" eaLnBrk="1" fontAlgn="auto" latinLnBrk="0" hangingPunct="1">
               <a:lnSpc>
                 <a:spcPct val="100000"/>
               </a:lnSpc>
@@ -1122,10 +1098,20 @@
               <a:buClrTx/>
               <a:buSzTx/>
               <a:buFontTx/>
-              <a:buNone/>
+              <a:buAutoNum type="arabicPeriod"/>
               <a:tabLst/>
               <a:defRPr/>
             </a:pPr>
+            <a:r>
+              <a:rPr lang="en-US" b="0" i="0" dirty="0">
+                <a:solidFill>
+                  <a:srgbClr val="3C3C3B"/>
+                </a:solidFill>
+                <a:effectLst/>
+                <a:latin typeface="+mn-lt"/>
+              </a:rPr>
+              <a:t>We start with a key observation: When the output of any neuron in our network changes, the final output error changes by a proportional amount. </a:t>
+            </a:r>
             <a:r>
               <a:rPr lang="en-US" sz="1200" dirty="0">
                 <a:effectLst/>
@@ -1133,7 +1119,35 @@
                 <a:ea typeface="Malgun Gothic" panose="020B0503020000020004" pitchFamily="34" charset="-127"/>
                 <a:cs typeface="Times New Roman" panose="02020603050405020304" pitchFamily="18" charset="0"/>
               </a:rPr>
-              <a:t>So, every neuron has a delta, or δ, associated with it as a result of evaluating the current network with the current sample. This is a real number that can be big or small, positive or negative. Assuming the network’s input doesn’t change, and the rest of the network is frozen, if a neuron’s output changes by a particular amount, we can multiply that change by the neuron’s delta to see how the entire network’s output will change.</a:t>
+              <a:t>The connection between any change in the neuron’s output and the resulting change in the final error is just the neuron’s change multiplied by some number. </a:t>
+            </a:r>
+          </a:p>
+          <a:p>
+            <a:pPr marL="228600" marR="0" lvl="0" indent="-228600" algn="l" defTabSz="914400" rtl="0" eaLnBrk="1" fontAlgn="auto" latinLnBrk="0" hangingPunct="1">
+              <a:lnSpc>
+                <a:spcPct val="100000"/>
+              </a:lnSpc>
+              <a:spcBef>
+                <a:spcPts val="0"/>
+              </a:spcBef>
+              <a:spcAft>
+                <a:spcPts val="0"/>
+              </a:spcAft>
+              <a:buClrTx/>
+              <a:buSzTx/>
+              <a:buFontTx/>
+              <a:buAutoNum type="arabicPeriod"/>
+              <a:tabLst/>
+              <a:defRPr/>
+            </a:pPr>
+            <a:r>
+              <a:rPr lang="en-US" sz="1200" dirty="0">
+                <a:effectLst/>
+                <a:latin typeface="+mn-lt"/>
+                <a:ea typeface="Malgun Gothic" panose="020B0503020000020004" pitchFamily="34" charset="-127"/>
+                <a:cs typeface="Times New Roman" panose="02020603050405020304" pitchFamily="18" charset="0"/>
+              </a:rPr>
+              <a:t>This number goes by various names, but the most popular is the lowercase Greek letter δ (delta), though sometimes the uppercase version, Δ, is used. Mathematicians often use the delta character to mean “change” of some sort, so this was a natural (if terse) choice of name.  </a:t>
             </a:r>
           </a:p>
           <a:p>
@@ -1162,164 +1176,12 @@
             </a:endParaRPr>
           </a:p>
           <a:p>
-            <a:pPr marL="0" marR="0" lvl="0" indent="0" algn="l" defTabSz="914400" rtl="0" eaLnBrk="1" fontAlgn="auto" latinLnBrk="0" hangingPunct="1">
-              <a:lnSpc>
-                <a:spcPct val="100000"/>
-              </a:lnSpc>
-              <a:spcBef>
-                <a:spcPts val="0"/>
-              </a:spcBef>
-              <a:spcAft>
-                <a:spcPts val="0"/>
-              </a:spcAft>
-              <a:buClrTx/>
-              <a:buSzTx/>
-              <a:buFontTx/>
-              <a:buNone/>
-              <a:tabLst/>
-              <a:defRPr/>
-            </a:pPr>
-            <a:r>
-              <a:rPr lang="en-US" sz="1200" dirty="0">
-                <a:effectLst/>
-                <a:latin typeface="+mn-lt"/>
-                <a:ea typeface="Malgun Gothic" panose="020B0503020000020004" pitchFamily="34" charset="-127"/>
-                <a:cs typeface="Times New Roman" panose="02020603050405020304" pitchFamily="18" charset="0"/>
-              </a:rPr>
-              <a:t>To illustrate the idea, let’s focus just on one neuron’s output for a moment by adding some arbitrary number to its output just before that value emerges.  This image shows the idea graphically, where we use the letter m (for “modification”) for this extra value.</a:t>
-            </a:r>
-          </a:p>
-          <a:p>
-            <a:pPr marL="0" marR="0" lvl="0" indent="0" algn="l" defTabSz="914400" rtl="0" eaLnBrk="1" fontAlgn="auto" latinLnBrk="0" hangingPunct="1">
-              <a:lnSpc>
-                <a:spcPct val="100000"/>
-              </a:lnSpc>
-              <a:spcBef>
-                <a:spcPts val="0"/>
-              </a:spcBef>
-              <a:spcAft>
-                <a:spcPts val="0"/>
-              </a:spcAft>
-              <a:buClrTx/>
-              <a:buSzTx/>
-              <a:buFontTx/>
-              <a:buNone/>
-              <a:tabLst/>
-              <a:defRPr/>
-            </a:pPr>
-            <a:endParaRPr lang="en-US" sz="1200" dirty="0">
-              <a:effectLst/>
-              <a:latin typeface="+mn-lt"/>
-              <a:ea typeface="Malgun Gothic" panose="020B0503020000020004" pitchFamily="34" charset="-127"/>
-              <a:cs typeface="Times New Roman" panose="02020603050405020304" pitchFamily="18" charset="0"/>
-            </a:endParaRPr>
-          </a:p>
-          <a:p>
-            <a:pPr marL="0" marR="0" lvl="0" indent="0" algn="l" defTabSz="914400" rtl="0" eaLnBrk="1" fontAlgn="auto" latinLnBrk="0" hangingPunct="1">
-              <a:lnSpc>
-                <a:spcPct val="100000"/>
-              </a:lnSpc>
-              <a:spcBef>
-                <a:spcPts val="0"/>
-              </a:spcBef>
-              <a:spcAft>
-                <a:spcPts val="0"/>
-              </a:spcAft>
-              <a:buClrTx/>
-              <a:buSzTx/>
-              <a:buFontTx/>
-              <a:buNone/>
-              <a:tabLst/>
-              <a:defRPr/>
-            </a:pPr>
-            <a:r>
-              <a:rPr lang="en-US" sz="1200" dirty="0">
-                <a:effectLst/>
-                <a:latin typeface="+mn-lt"/>
-                <a:ea typeface="Malgun Gothic" panose="020B0503020000020004" pitchFamily="34" charset="-127"/>
-                <a:cs typeface="Times New Roman" panose="02020603050405020304" pitchFamily="18" charset="0"/>
-              </a:rPr>
-              <a:t>Because the output will change by m, we know the change in the final error is m times the neuron’s δ.</a:t>
-            </a:r>
-          </a:p>
-          <a:p>
-            <a:pPr marL="0" marR="0" lvl="0" indent="0" algn="l" defTabSz="914400" rtl="0" eaLnBrk="1" fontAlgn="auto" latinLnBrk="0" hangingPunct="1">
-              <a:lnSpc>
-                <a:spcPct val="100000"/>
-              </a:lnSpc>
-              <a:spcBef>
-                <a:spcPts val="0"/>
-              </a:spcBef>
-              <a:spcAft>
-                <a:spcPts val="0"/>
-              </a:spcAft>
-              <a:buClrTx/>
-              <a:buSzTx/>
-              <a:buFontTx/>
-              <a:buNone/>
-              <a:tabLst/>
-              <a:defRPr/>
-            </a:pPr>
-            <a:endParaRPr lang="en-US" sz="1200" dirty="0">
-              <a:effectLst/>
-              <a:latin typeface="+mn-lt"/>
-              <a:ea typeface="Malgun Gothic" panose="020B0503020000020004" pitchFamily="34" charset="-127"/>
-              <a:cs typeface="Times New Roman" panose="02020603050405020304" pitchFamily="18" charset="0"/>
-            </a:endParaRPr>
-          </a:p>
-          <a:p>
-            <a:pPr marL="0" marR="0" lvl="0" indent="0" algn="l" defTabSz="914400" rtl="0" eaLnBrk="1" fontAlgn="auto" latinLnBrk="0" hangingPunct="1">
-              <a:lnSpc>
-                <a:spcPct val="100000"/>
-              </a:lnSpc>
-              <a:spcBef>
-                <a:spcPts val="0"/>
-              </a:spcBef>
-              <a:spcAft>
-                <a:spcPts val="0"/>
-              </a:spcAft>
-              <a:buClrTx/>
-              <a:buSzTx/>
-              <a:buFontTx/>
-              <a:buNone/>
-              <a:tabLst/>
-              <a:defRPr/>
-            </a:pPr>
-            <a:r>
-              <a:rPr lang="en-US" sz="1200" dirty="0">
-                <a:effectLst/>
-                <a:latin typeface="+mn-lt"/>
-                <a:ea typeface="Malgun Gothic" panose="020B0503020000020004" pitchFamily="34" charset="-127"/>
-                <a:cs typeface="Times New Roman" panose="02020603050405020304" pitchFamily="18" charset="0"/>
-              </a:rPr>
-              <a:t>Source: Deep Learning: </a:t>
-            </a:r>
-            <a:r>
-              <a:rPr lang="en-US" sz="1200" i="1" dirty="0">
-                <a:effectLst/>
-                <a:latin typeface="+mn-lt"/>
-                <a:ea typeface="Malgun Gothic" panose="020B0503020000020004" pitchFamily="34" charset="-127"/>
-                <a:cs typeface="Times New Roman" panose="02020603050405020304" pitchFamily="18" charset="0"/>
-              </a:rPr>
-              <a:t>A Visual Approach </a:t>
-            </a:r>
-            <a:r>
-              <a:rPr lang="en-US" sz="1200" i="0" dirty="0">
-                <a:effectLst/>
-                <a:latin typeface="+mn-lt"/>
-                <a:ea typeface="Malgun Gothic" panose="020B0503020000020004" pitchFamily="34" charset="-127"/>
-                <a:cs typeface="Times New Roman" panose="02020603050405020304" pitchFamily="18" charset="0"/>
-              </a:rPr>
-              <a:t>(p. 357)</a:t>
-            </a:r>
-          </a:p>
-          <a:p>
             <a:endParaRPr lang="en-US" b="0" i="0" dirty="0">
               <a:solidFill>
                 <a:srgbClr val="3C3C3B"/>
               </a:solidFill>
               <a:effectLst/>
-              <a:latin typeface="Lato"/>
+              <a:latin typeface="+mn-lt"/>
             </a:endParaRPr>
           </a:p>
         </p:txBody>
@@ -1350,7 +1212,7 @@
     </p:spTree>
     <p:extLst>
       <p:ext uri="{BB962C8B-B14F-4D97-AF65-F5344CB8AC3E}">
-        <p14:creationId xmlns:p14="http://schemas.microsoft.com/office/powerpoint/2010/main" val="1601600778"/>
+        <p14:creationId xmlns:p14="http://schemas.microsoft.com/office/powerpoint/2010/main" val="1498903180"/>
       </p:ext>
     </p:extLst>
   </p:cSld>
@@ -1404,10 +1266,236 @@
           <a:bodyPr/>
           <a:lstStyle/>
           <a:p>
-            <a:r>
-              <a:rPr lang="en-US" dirty="0"/>
-              <a:t>So far, we’ve drawn the outputs of neurons as arrows coming out of a circle to the right. Let’s draw deltas using arrows coming out of the circles to the left, as pictured here.  With this convention – which we’ve already seen in the backpropagation slide, the process for finding the updated value for weight Wgf1 can be summarized as follows.,,</a:t>
-            </a:r>
+            <a:pPr marL="0" marR="0" lvl="0" indent="0" algn="l" defTabSz="914400" rtl="0" eaLnBrk="1" fontAlgn="auto" latinLnBrk="0" hangingPunct="1">
+              <a:lnSpc>
+                <a:spcPct val="100000"/>
+              </a:lnSpc>
+              <a:spcBef>
+                <a:spcPts val="0"/>
+              </a:spcBef>
+              <a:spcAft>
+                <a:spcPts val="0"/>
+              </a:spcAft>
+              <a:buClrTx/>
+              <a:buSzTx/>
+              <a:buFontTx/>
+              <a:buNone/>
+              <a:tabLst/>
+              <a:defRPr/>
+            </a:pPr>
+            <a:r>
+              <a:rPr lang="en-US" sz="1200" dirty="0">
+                <a:effectLst/>
+                <a:latin typeface="+mn-lt"/>
+                <a:ea typeface="Malgun Gothic" panose="020B0503020000020004" pitchFamily="34" charset="-127"/>
+                <a:cs typeface="Times New Roman" panose="02020603050405020304" pitchFamily="18" charset="0"/>
+              </a:rPr>
+              <a:t>So, every neuron has a delta, or δ, associated with it as a result of evaluating the current network with the current sample. This is a real number that can be big or small, positive or negative. Assuming the network’s input doesn’t change, and the rest of the network is frozen, if a neuron’s output changes by a particular amount, we can multiply that change by the neuron’s delta to see how the entire network’s output will change.</a:t>
+            </a:r>
+          </a:p>
+          <a:p>
+            <a:pPr marL="0" marR="0" lvl="0" indent="0" algn="l" defTabSz="914400" rtl="0" eaLnBrk="1" fontAlgn="auto" latinLnBrk="0" hangingPunct="1">
+              <a:lnSpc>
+                <a:spcPct val="100000"/>
+              </a:lnSpc>
+              <a:spcBef>
+                <a:spcPts val="0"/>
+              </a:spcBef>
+              <a:spcAft>
+                <a:spcPts val="0"/>
+              </a:spcAft>
+              <a:buClrTx/>
+              <a:buSzTx/>
+              <a:buFontTx/>
+              <a:buNone/>
+              <a:tabLst/>
+              <a:defRPr/>
+            </a:pPr>
+            <a:endParaRPr lang="en-US" sz="1200" dirty="0">
+              <a:effectLst/>
+              <a:latin typeface="+mn-lt"/>
+              <a:ea typeface="Malgun Gothic" panose="020B0503020000020004" pitchFamily="34" charset="-127"/>
+              <a:cs typeface="Times New Roman" panose="02020603050405020304" pitchFamily="18" charset="0"/>
+            </a:endParaRPr>
+          </a:p>
+          <a:p>
+            <a:pPr marL="0" marR="0" lvl="0" indent="0" algn="l" defTabSz="914400" rtl="0" eaLnBrk="1" fontAlgn="auto" latinLnBrk="0" hangingPunct="1">
+              <a:lnSpc>
+                <a:spcPct val="100000"/>
+              </a:lnSpc>
+              <a:spcBef>
+                <a:spcPts val="0"/>
+              </a:spcBef>
+              <a:spcAft>
+                <a:spcPts val="0"/>
+              </a:spcAft>
+              <a:buClrTx/>
+              <a:buSzTx/>
+              <a:buFontTx/>
+              <a:buNone/>
+              <a:tabLst/>
+              <a:defRPr/>
+            </a:pPr>
+            <a:r>
+              <a:rPr lang="en-US" sz="1200" dirty="0">
+                <a:effectLst/>
+                <a:latin typeface="+mn-lt"/>
+                <a:ea typeface="Malgun Gothic" panose="020B0503020000020004" pitchFamily="34" charset="-127"/>
+                <a:cs typeface="Times New Roman" panose="02020603050405020304" pitchFamily="18" charset="0"/>
+              </a:rPr>
+              <a:t>To illustrate the idea, let’s focus on the output from G, the single node in the hidden layer of our simple network from the previous slide.  Now, let’s add some arbitrary value to G’s output just before that value emerges.  As shown here, we use the letter </a:t>
+            </a:r>
+            <a:r>
+              <a:rPr lang="en-US" sz="1200" b="1" dirty="0">
+                <a:effectLst/>
+                <a:latin typeface="+mn-lt"/>
+                <a:ea typeface="Malgun Gothic" panose="020B0503020000020004" pitchFamily="34" charset="-127"/>
+                <a:cs typeface="Times New Roman" panose="02020603050405020304" pitchFamily="18" charset="0"/>
+              </a:rPr>
+              <a:t>m</a:t>
+            </a:r>
+            <a:r>
+              <a:rPr lang="en-US" sz="1200" dirty="0">
+                <a:effectLst/>
+                <a:latin typeface="+mn-lt"/>
+                <a:ea typeface="Malgun Gothic" panose="020B0503020000020004" pitchFamily="34" charset="-127"/>
+                <a:cs typeface="Times New Roman" panose="02020603050405020304" pitchFamily="18" charset="0"/>
+              </a:rPr>
+              <a:t> (for ‘modification’) as the name of the variable that holds this extra value.  </a:t>
+            </a:r>
+          </a:p>
+          <a:p>
+            <a:pPr marL="0" marR="0" lvl="0" indent="0" algn="l" defTabSz="914400" rtl="0" eaLnBrk="1" fontAlgn="auto" latinLnBrk="0" hangingPunct="1">
+              <a:lnSpc>
+                <a:spcPct val="100000"/>
+              </a:lnSpc>
+              <a:spcBef>
+                <a:spcPts val="0"/>
+              </a:spcBef>
+              <a:spcAft>
+                <a:spcPts val="0"/>
+              </a:spcAft>
+              <a:buClrTx/>
+              <a:buSzTx/>
+              <a:buFontTx/>
+              <a:buNone/>
+              <a:tabLst/>
+              <a:defRPr/>
+            </a:pPr>
+            <a:endParaRPr lang="en-US" sz="1200" dirty="0">
+              <a:effectLst/>
+              <a:latin typeface="+mn-lt"/>
+              <a:ea typeface="Malgun Gothic" panose="020B0503020000020004" pitchFamily="34" charset="-127"/>
+              <a:cs typeface="Times New Roman" panose="02020603050405020304" pitchFamily="18" charset="0"/>
+            </a:endParaRPr>
+          </a:p>
+          <a:p>
+            <a:pPr marL="0" marR="0" lvl="0" indent="0" algn="l" defTabSz="914400" rtl="0" eaLnBrk="1" fontAlgn="auto" latinLnBrk="0" hangingPunct="1">
+              <a:lnSpc>
+                <a:spcPct val="100000"/>
+              </a:lnSpc>
+              <a:spcBef>
+                <a:spcPts val="0"/>
+              </a:spcBef>
+              <a:spcAft>
+                <a:spcPts val="0"/>
+              </a:spcAft>
+              <a:buClrTx/>
+              <a:buSzTx/>
+              <a:buFontTx/>
+              <a:buNone/>
+              <a:tabLst/>
+              <a:defRPr/>
+            </a:pPr>
+            <a:r>
+              <a:rPr lang="en-US" sz="1200" dirty="0">
+                <a:effectLst/>
+                <a:latin typeface="+mn-lt"/>
+                <a:ea typeface="Malgun Gothic" panose="020B0503020000020004" pitchFamily="34" charset="-127"/>
+                <a:cs typeface="Times New Roman" panose="02020603050405020304" pitchFamily="18" charset="0"/>
+              </a:rPr>
+              <a:t>Because the output will change by m, we know the change in the final error is m times the neuron’s δ.</a:t>
+            </a:r>
+          </a:p>
+          <a:p>
+            <a:pPr marL="0" marR="0" lvl="0" indent="0" algn="l" defTabSz="914400" rtl="0" eaLnBrk="1" fontAlgn="auto" latinLnBrk="0" hangingPunct="1">
+              <a:lnSpc>
+                <a:spcPct val="100000"/>
+              </a:lnSpc>
+              <a:spcBef>
+                <a:spcPts val="0"/>
+              </a:spcBef>
+              <a:spcAft>
+                <a:spcPts val="0"/>
+              </a:spcAft>
+              <a:buClrTx/>
+              <a:buSzTx/>
+              <a:buFontTx/>
+              <a:buNone/>
+              <a:tabLst/>
+              <a:defRPr/>
+            </a:pPr>
+            <a:endParaRPr lang="en-US" sz="1200" dirty="0">
+              <a:effectLst/>
+              <a:latin typeface="+mn-lt"/>
+              <a:ea typeface="Malgun Gothic" panose="020B0503020000020004" pitchFamily="34" charset="-127"/>
+              <a:cs typeface="Times New Roman" panose="02020603050405020304" pitchFamily="18" charset="0"/>
+            </a:endParaRPr>
+          </a:p>
+          <a:p>
+            <a:pPr marL="0" marR="0" lvl="0" indent="0" algn="l" defTabSz="914400" rtl="0" eaLnBrk="1" fontAlgn="auto" latinLnBrk="0" hangingPunct="1">
+              <a:lnSpc>
+                <a:spcPct val="100000"/>
+              </a:lnSpc>
+              <a:spcBef>
+                <a:spcPts val="0"/>
+              </a:spcBef>
+              <a:spcAft>
+                <a:spcPts val="0"/>
+              </a:spcAft>
+              <a:buClrTx/>
+              <a:buSzTx/>
+              <a:buFontTx/>
+              <a:buNone/>
+              <a:tabLst/>
+              <a:defRPr/>
+            </a:pPr>
+            <a:r>
+              <a:rPr lang="en-US" sz="1200" dirty="0">
+                <a:effectLst/>
+                <a:latin typeface="+mn-lt"/>
+                <a:ea typeface="Malgun Gothic" panose="020B0503020000020004" pitchFamily="34" charset="-127"/>
+                <a:cs typeface="Times New Roman" panose="02020603050405020304" pitchFamily="18" charset="0"/>
+              </a:rPr>
+              <a:t>Source: Deep Learning: </a:t>
+            </a:r>
+            <a:r>
+              <a:rPr lang="en-US" sz="1200" i="1" dirty="0">
+                <a:effectLst/>
+                <a:latin typeface="+mn-lt"/>
+                <a:ea typeface="Malgun Gothic" panose="020B0503020000020004" pitchFamily="34" charset="-127"/>
+                <a:cs typeface="Times New Roman" panose="02020603050405020304" pitchFamily="18" charset="0"/>
+              </a:rPr>
+              <a:t>A Visual Approach </a:t>
+            </a:r>
+            <a:r>
+              <a:rPr lang="en-US" sz="1200" i="0" dirty="0">
+                <a:effectLst/>
+                <a:latin typeface="+mn-lt"/>
+                <a:ea typeface="Malgun Gothic" panose="020B0503020000020004" pitchFamily="34" charset="-127"/>
+                <a:cs typeface="Times New Roman" panose="02020603050405020304" pitchFamily="18" charset="0"/>
+              </a:rPr>
+              <a:t>(p. 357)</a:t>
+            </a:r>
+          </a:p>
+          <a:p>
+            <a:endParaRPr lang="en-US" b="0" i="0" dirty="0">
+              <a:solidFill>
+                <a:srgbClr val="3C3C3B"/>
+              </a:solidFill>
+              <a:effectLst/>
+              <a:latin typeface="Lato"/>
+            </a:endParaRPr>
           </a:p>
         </p:txBody>
       </p:sp>
@@ -1437,7 +1525,7 @@
     </p:spTree>
     <p:extLst>
       <p:ext uri="{BB962C8B-B14F-4D97-AF65-F5344CB8AC3E}">
-        <p14:creationId xmlns:p14="http://schemas.microsoft.com/office/powerpoint/2010/main" val="256513045"/>
+        <p14:creationId xmlns:p14="http://schemas.microsoft.com/office/powerpoint/2010/main" val="1601600778"/>
       </p:ext>
     </p:extLst>
   </p:cSld>
@@ -1491,23 +1579,10 @@
           <a:bodyPr/>
           <a:lstStyle/>
           <a:p>
-            <a:pPr marL="0" marR="0" lvl="0" indent="0" algn="l" defTabSz="914400" rtl="0" eaLnBrk="1" fontAlgn="auto" latinLnBrk="0" hangingPunct="1">
-              <a:lnSpc>
-                <a:spcPct val="100000"/>
-              </a:lnSpc>
-              <a:spcBef>
-                <a:spcPts val="0"/>
-              </a:spcBef>
-              <a:spcAft>
-                <a:spcPts val="0"/>
-              </a:spcAft>
-              <a:buClrTx/>
-              <a:buSzTx/>
-              <a:buFontTx/>
-              <a:buNone/>
-              <a:tabLst/>
-              <a:defRPr/>
-            </a:pPr>
+            <a:r>
+              <a:rPr lang="en-US" dirty="0"/>
+              <a:t>Because network training includes both forward and backpropagation processes, each node in a neural network has two outputs.  Node G, for example, produces an output to the right, during forward propagation, and an output to the left, during backpropagation.  Here the output to the right (forward prop) is called Go while the output to the left (backprop) is called G</a:t>
+            </a:r>
             <a:r>
               <a:rPr lang="en-US" sz="1200" dirty="0">
                 <a:effectLst/>
@@ -1515,285 +1590,18 @@
                 <a:ea typeface="Malgun Gothic" panose="020B0503020000020004" pitchFamily="34" charset="-127"/>
                 <a:cs typeface="Times New Roman" panose="02020603050405020304" pitchFamily="18" charset="0"/>
               </a:rPr>
-              <a:t>The whole process for finding the updated value for weight AC, or AC – (</a:t>
-            </a:r>
-            <a:r>
-              <a:rPr lang="en-US" sz="1200" dirty="0" err="1">
-                <a:effectLst/>
-                <a:latin typeface="+mn-lt"/>
-                <a:ea typeface="Malgun Gothic" panose="020B0503020000020004" pitchFamily="34" charset="-127"/>
-                <a:cs typeface="Times New Roman" panose="02020603050405020304" pitchFamily="18" charset="0"/>
-              </a:rPr>
-              <a:t>Ao</a:t>
-            </a:r>
-            <a:r>
-              <a:rPr lang="en-US" sz="1200" dirty="0">
-                <a:effectLst/>
-                <a:latin typeface="+mn-lt"/>
-                <a:ea typeface="Malgun Gothic" panose="020B0503020000020004" pitchFamily="34" charset="-127"/>
-                <a:cs typeface="Times New Roman" panose="02020603050405020304" pitchFamily="18" charset="0"/>
-              </a:rPr>
-              <a:t> × </a:t>
-            </a:r>
-            <a:r>
-              <a:rPr lang="en-US" sz="1200" dirty="0" err="1">
-                <a:effectLst/>
-                <a:latin typeface="+mn-lt"/>
-                <a:ea typeface="Malgun Gothic" panose="020B0503020000020004" pitchFamily="34" charset="-127"/>
-                <a:cs typeface="Times New Roman" panose="02020603050405020304" pitchFamily="18" charset="0"/>
-              </a:rPr>
-              <a:t>Cδ</a:t>
-            </a:r>
-            <a:r>
-              <a:rPr lang="en-US" sz="1200" dirty="0">
-                <a:effectLst/>
-                <a:latin typeface="+mn-lt"/>
-                <a:ea typeface="Malgun Gothic" panose="020B0503020000020004" pitchFamily="34" charset="-127"/>
-                <a:cs typeface="Times New Roman" panose="02020603050405020304" pitchFamily="18" charset="0"/>
-              </a:rPr>
-              <a:t>), is summarized here. Showing subtraction in a diagram like this is hard, because if we have a “minus” node with two incoming arrows, it’s not clear which value is being subtracted from the other (that is, if the inputs are x and y, are we computing x − y or y − x?). To sidestep that problem, we compute AC − (</a:t>
-            </a:r>
-            <a:r>
-              <a:rPr lang="en-US" sz="1200" dirty="0" err="1">
-                <a:effectLst/>
-                <a:latin typeface="+mn-lt"/>
-                <a:ea typeface="Malgun Gothic" panose="020B0503020000020004" pitchFamily="34" charset="-127"/>
-                <a:cs typeface="Times New Roman" panose="02020603050405020304" pitchFamily="18" charset="0"/>
-              </a:rPr>
-              <a:t>Ao</a:t>
-            </a:r>
-            <a:r>
-              <a:rPr lang="en-US" sz="1200" dirty="0">
-                <a:effectLst/>
-                <a:latin typeface="+mn-lt"/>
-                <a:ea typeface="Malgun Gothic" panose="020B0503020000020004" pitchFamily="34" charset="-127"/>
-                <a:cs typeface="Times New Roman" panose="02020603050405020304" pitchFamily="18" charset="0"/>
-              </a:rPr>
-              <a:t> × </a:t>
-            </a:r>
-            <a:r>
-              <a:rPr lang="en-US" sz="1200" dirty="0" err="1">
-                <a:effectLst/>
-                <a:latin typeface="+mn-lt"/>
-                <a:ea typeface="Malgun Gothic" panose="020B0503020000020004" pitchFamily="34" charset="-127"/>
-                <a:cs typeface="Times New Roman" panose="02020603050405020304" pitchFamily="18" charset="0"/>
-              </a:rPr>
-              <a:t>Cδ</a:t>
-            </a:r>
-            <a:r>
-              <a:rPr lang="en-US" sz="1200" dirty="0">
-                <a:effectLst/>
-                <a:latin typeface="+mn-lt"/>
-                <a:ea typeface="Malgun Gothic" panose="020B0503020000020004" pitchFamily="34" charset="-127"/>
-                <a:cs typeface="Times New Roman" panose="02020603050405020304" pitchFamily="18" charset="0"/>
-              </a:rPr>
-              <a:t>) by finding </a:t>
-            </a:r>
-            <a:r>
-              <a:rPr lang="en-US" sz="1200" dirty="0" err="1">
-                <a:effectLst/>
-                <a:latin typeface="+mn-lt"/>
-                <a:ea typeface="Malgun Gothic" panose="020B0503020000020004" pitchFamily="34" charset="-127"/>
-                <a:cs typeface="Times New Roman" panose="02020603050405020304" pitchFamily="18" charset="0"/>
-              </a:rPr>
-              <a:t>Ao</a:t>
-            </a:r>
-            <a:r>
-              <a:rPr lang="en-US" sz="1200" dirty="0">
-                <a:effectLst/>
-                <a:latin typeface="+mn-lt"/>
-                <a:ea typeface="Malgun Gothic" panose="020B0503020000020004" pitchFamily="34" charset="-127"/>
-                <a:cs typeface="Times New Roman" panose="02020603050405020304" pitchFamily="18" charset="0"/>
-              </a:rPr>
-              <a:t> × </a:t>
-            </a:r>
-            <a:r>
-              <a:rPr lang="en-US" sz="1200" dirty="0" err="1">
-                <a:effectLst/>
-                <a:latin typeface="+mn-lt"/>
-                <a:ea typeface="Malgun Gothic" panose="020B0503020000020004" pitchFamily="34" charset="-127"/>
-                <a:cs typeface="Times New Roman" panose="02020603050405020304" pitchFamily="18" charset="0"/>
-              </a:rPr>
-              <a:t>Cδ</a:t>
-            </a:r>
-            <a:r>
-              <a:rPr lang="en-US" sz="1200" dirty="0">
-                <a:effectLst/>
-                <a:latin typeface="+mn-lt"/>
-                <a:ea typeface="Malgun Gothic" panose="020B0503020000020004" pitchFamily="34" charset="-127"/>
-                <a:cs typeface="Times New Roman" panose="02020603050405020304" pitchFamily="18" charset="0"/>
-              </a:rPr>
-              <a:t>, multiplying that by −1, and then adding that result to AC.</a:t>
-            </a:r>
-          </a:p>
-          <a:p>
-            <a:pPr marL="0" marR="0" lvl="0" indent="0" algn="l" defTabSz="914400" rtl="0" eaLnBrk="1" fontAlgn="auto" latinLnBrk="0" hangingPunct="1">
-              <a:lnSpc>
-                <a:spcPct val="100000"/>
-              </a:lnSpc>
-              <a:spcBef>
-                <a:spcPts val="0"/>
-              </a:spcBef>
-              <a:spcAft>
-                <a:spcPts val="0"/>
-              </a:spcAft>
-              <a:buClrTx/>
-              <a:buSzTx/>
-              <a:buFontTx/>
-              <a:buNone/>
-              <a:tabLst/>
-              <a:defRPr/>
-            </a:pPr>
-            <a:endParaRPr lang="en-US" sz="1200" dirty="0">
-              <a:effectLst/>
-              <a:latin typeface="+mn-lt"/>
-              <a:ea typeface="Malgun Gothic" panose="020B0503020000020004" pitchFamily="34" charset="-127"/>
-              <a:cs typeface="Times New Roman" panose="02020603050405020304" pitchFamily="18" charset="0"/>
-            </a:endParaRPr>
-          </a:p>
-          <a:p>
-            <a:pPr marL="0" marR="0" lvl="0" indent="0" algn="l" defTabSz="914400" rtl="0" eaLnBrk="1" fontAlgn="auto" latinLnBrk="0" hangingPunct="1">
-              <a:lnSpc>
-                <a:spcPct val="100000"/>
-              </a:lnSpc>
-              <a:spcBef>
-                <a:spcPts val="0"/>
-              </a:spcBef>
-              <a:spcAft>
-                <a:spcPts val="0"/>
-              </a:spcAft>
-              <a:buClrTx/>
-              <a:buSzTx/>
-              <a:buFontTx/>
-              <a:buNone/>
-              <a:tabLst/>
-              <a:defRPr/>
-            </a:pPr>
-            <a:r>
-              <a:rPr lang="en-US" sz="1200" dirty="0">
-                <a:effectLst/>
-                <a:latin typeface="+mn-lt"/>
-                <a:ea typeface="Malgun Gothic" panose="020B0503020000020004" pitchFamily="34" charset="-127"/>
-                <a:cs typeface="Times New Roman" panose="02020603050405020304" pitchFamily="18" charset="0"/>
-              </a:rPr>
-              <a:t>Let’s walk through this figure. We start with the output </a:t>
-            </a:r>
-            <a:r>
-              <a:rPr lang="en-US" sz="1200" dirty="0" err="1">
-                <a:effectLst/>
-                <a:latin typeface="+mn-lt"/>
-                <a:ea typeface="Malgun Gothic" panose="020B0503020000020004" pitchFamily="34" charset="-127"/>
-                <a:cs typeface="Times New Roman" panose="02020603050405020304" pitchFamily="18" charset="0"/>
-              </a:rPr>
-              <a:t>Ao</a:t>
-            </a:r>
-            <a:r>
-              <a:rPr lang="en-US" sz="1200" dirty="0">
-                <a:effectLst/>
-                <a:latin typeface="+mn-lt"/>
-                <a:ea typeface="Malgun Gothic" panose="020B0503020000020004" pitchFamily="34" charset="-127"/>
-                <a:cs typeface="Times New Roman" panose="02020603050405020304" pitchFamily="18" charset="0"/>
-              </a:rPr>
-              <a:t> from neuron A and the delta </a:t>
-            </a:r>
-            <a:r>
-              <a:rPr lang="en-US" sz="1200" dirty="0" err="1">
-                <a:effectLst/>
-                <a:latin typeface="+mn-lt"/>
-                <a:ea typeface="Malgun Gothic" panose="020B0503020000020004" pitchFamily="34" charset="-127"/>
-                <a:cs typeface="Times New Roman" panose="02020603050405020304" pitchFamily="18" charset="0"/>
-              </a:rPr>
-              <a:t>Cδ</a:t>
-            </a:r>
-            <a:r>
-              <a:rPr lang="en-US" sz="1200" dirty="0">
-                <a:effectLst/>
-                <a:latin typeface="+mn-lt"/>
-                <a:ea typeface="Malgun Gothic" panose="020B0503020000020004" pitchFamily="34" charset="-127"/>
-                <a:cs typeface="Times New Roman" panose="02020603050405020304" pitchFamily="18" charset="0"/>
-              </a:rPr>
-              <a:t> from output neuron C, and multiply them together (at the top of the figure). We want to subtract this from the current value of AC. To show this clearly in the diagram, we multiply the product by −1 and then add it to the weight AC. The green arrow is the update step, where this result becomes the new value of AC.</a:t>
-            </a:r>
-          </a:p>
-          <a:p>
-            <a:pPr marL="0" marR="0" lvl="0" indent="0" algn="l" defTabSz="914400" rtl="0" eaLnBrk="1" fontAlgn="auto" latinLnBrk="0" hangingPunct="1">
-              <a:lnSpc>
-                <a:spcPct val="100000"/>
-              </a:lnSpc>
-              <a:spcBef>
-                <a:spcPts val="0"/>
-              </a:spcBef>
-              <a:spcAft>
-                <a:spcPts val="0"/>
-              </a:spcAft>
-              <a:buClrTx/>
-              <a:buSzTx/>
-              <a:buFontTx/>
-              <a:buNone/>
-              <a:tabLst/>
-              <a:defRPr/>
-            </a:pPr>
-            <a:endParaRPr lang="en-US" sz="1200" dirty="0">
-              <a:effectLst/>
-              <a:latin typeface="+mn-lt"/>
-              <a:ea typeface="Malgun Gothic" panose="020B0503020000020004" pitchFamily="34" charset="-127"/>
-              <a:cs typeface="Times New Roman" panose="02020603050405020304" pitchFamily="18" charset="0"/>
-            </a:endParaRPr>
-          </a:p>
-          <a:p>
-            <a:pPr marL="0" marR="0" lvl="0" indent="0" algn="l" defTabSz="914400" rtl="0" eaLnBrk="1" fontAlgn="auto" latinLnBrk="0" hangingPunct="1">
-              <a:lnSpc>
-                <a:spcPct val="100000"/>
-              </a:lnSpc>
-              <a:spcBef>
-                <a:spcPts val="0"/>
-              </a:spcBef>
-              <a:spcAft>
-                <a:spcPts val="0"/>
-              </a:spcAft>
-              <a:buClrTx/>
-              <a:buSzTx/>
-              <a:buFontTx/>
-              <a:buNone/>
-              <a:tabLst/>
-              <a:defRPr/>
-            </a:pPr>
-            <a:r>
-              <a:rPr lang="en-US" sz="1200" dirty="0">
-                <a:effectLst/>
-                <a:latin typeface="+mn-lt"/>
-                <a:ea typeface="Malgun Gothic" panose="020B0503020000020004" pitchFamily="34" charset="-127"/>
-                <a:cs typeface="Times New Roman" panose="02020603050405020304" pitchFamily="18" charset="0"/>
-              </a:rPr>
-              <a:t>Source: Deep Learning: </a:t>
-            </a:r>
-            <a:r>
-              <a:rPr lang="en-US" sz="1200" i="1" dirty="0">
-                <a:effectLst/>
-                <a:latin typeface="+mn-lt"/>
-                <a:ea typeface="Malgun Gothic" panose="020B0503020000020004" pitchFamily="34" charset="-127"/>
-                <a:cs typeface="Times New Roman" panose="02020603050405020304" pitchFamily="18" charset="0"/>
-              </a:rPr>
-              <a:t>A Visual Approach </a:t>
-            </a:r>
-            <a:r>
-              <a:rPr lang="en-US" sz="1200" i="0" dirty="0">
-                <a:effectLst/>
-                <a:latin typeface="+mn-lt"/>
-                <a:ea typeface="Malgun Gothic" panose="020B0503020000020004" pitchFamily="34" charset="-127"/>
-                <a:cs typeface="Times New Roman" panose="02020603050405020304" pitchFamily="18" charset="0"/>
-              </a:rPr>
-              <a:t>(p. 367)</a:t>
-            </a:r>
-          </a:p>
-          <a:p>
-            <a:endParaRPr lang="en-US" b="0" i="0" dirty="0">
-              <a:solidFill>
-                <a:srgbClr val="3C3C3B"/>
-              </a:solidFill>
-              <a:effectLst/>
-              <a:latin typeface="Lato"/>
-            </a:endParaRPr>
+              <a:t>δ.</a:t>
+            </a:r>
+            <a:endParaRPr lang="en-US" dirty="0"/>
+          </a:p>
+          <a:p>
+            <a:endParaRPr lang="en-US" dirty="0"/>
+          </a:p>
+          <a:p>
+            <a:r>
+              <a:rPr lang="en-US" dirty="0"/>
+              <a:t>Now with this naming convention established, the process for finding the updated value for weight Wgf1 can be summarized as follows.,,</a:t>
+            </a:r>
           </a:p>
         </p:txBody>
       </p:sp>
@@ -1823,7 +1631,7 @@
     </p:spTree>
     <p:extLst>
       <p:ext uri="{BB962C8B-B14F-4D97-AF65-F5344CB8AC3E}">
-        <p14:creationId xmlns:p14="http://schemas.microsoft.com/office/powerpoint/2010/main" val="1475752521"/>
+        <p14:creationId xmlns:p14="http://schemas.microsoft.com/office/powerpoint/2010/main" val="256513045"/>
       </p:ext>
     </p:extLst>
   </p:cSld>
@@ -1877,61 +1685,155 @@
           <a:bodyPr/>
           <a:lstStyle/>
           <a:p>
-            <a:r>
-              <a:rPr lang="en-US" dirty="0">
-                <a:latin typeface="+mn-lt"/>
-              </a:rPr>
-              <a:t>Now that we understand how individual weights are updated, one final issue remains.  Network weights are linked together, </a:t>
-            </a:r>
-            <a:r>
-              <a:rPr lang="en-US" b="0" i="0" dirty="0">
-                <a:solidFill>
-                  <a:srgbClr val="3C3C3B"/>
-                </a:solidFill>
+            <a:pPr marL="0" marR="0" lvl="0" indent="0" algn="l" defTabSz="914400" rtl="0" eaLnBrk="1" fontAlgn="auto" latinLnBrk="0" hangingPunct="1">
+              <a:lnSpc>
+                <a:spcPct val="100000"/>
+              </a:lnSpc>
+              <a:spcBef>
+                <a:spcPts val="0"/>
+              </a:spcBef>
+              <a:spcAft>
+                <a:spcPts val="0"/>
+              </a:spcAft>
+              <a:buClrTx/>
+              <a:buSzTx/>
+              <a:buFontTx/>
+              <a:buNone/>
+              <a:tabLst/>
+              <a:defRPr/>
+            </a:pPr>
+            <a:r>
+              <a:rPr lang="en-US" sz="1200" dirty="0">
                 <a:effectLst/>
                 <a:latin typeface="+mn-lt"/>
-              </a:rPr>
-              <a:t>and this creates an additional complication. </a:t>
-            </a:r>
-            <a:r>
-              <a:rPr lang="en-US" b="0" i="0" dirty="0">
-                <a:solidFill>
-                  <a:schemeClr val="tx1"/>
-                </a:solidFill>
+                <a:ea typeface="Malgun Gothic" panose="020B0503020000020004" pitchFamily="34" charset="-127"/>
+                <a:cs typeface="Times New Roman" panose="02020603050405020304" pitchFamily="18" charset="0"/>
+              </a:rPr>
+              <a:t>The entire process for finding the updated value for weight Wgf0 is pictured here. Showing subtraction in a diagram like this is hard, because if we have a “minus” node with two incoming arrows, it’s not clear which value is being subtracted from the other (that is, if the inputs are x and y, do we compute x − y or y − x?). So to sidestep that problem, we compute Wgf0 − (Go × Fδ) by finding Go × Fδ, multiplying that by −1, and then add that result to Wgf0.</a:t>
+            </a:r>
+          </a:p>
+          <a:p>
+            <a:pPr marL="0" marR="0" lvl="0" indent="0" algn="l" defTabSz="914400" rtl="0" eaLnBrk="1" fontAlgn="auto" latinLnBrk="0" hangingPunct="1">
+              <a:lnSpc>
+                <a:spcPct val="100000"/>
+              </a:lnSpc>
+              <a:spcBef>
+                <a:spcPts val="0"/>
+              </a:spcBef>
+              <a:spcAft>
+                <a:spcPts val="0"/>
+              </a:spcAft>
+              <a:buClrTx/>
+              <a:buSzTx/>
+              <a:buFontTx/>
+              <a:buNone/>
+              <a:tabLst/>
+              <a:defRPr/>
+            </a:pPr>
+            <a:endParaRPr lang="en-US" sz="1200" dirty="0">
+              <a:effectLst/>
+              <a:latin typeface="+mn-lt"/>
+              <a:ea typeface="Malgun Gothic" panose="020B0503020000020004" pitchFamily="34" charset="-127"/>
+              <a:cs typeface="Times New Roman" panose="02020603050405020304" pitchFamily="18" charset="0"/>
+            </a:endParaRPr>
+          </a:p>
+          <a:p>
+            <a:pPr marL="0" marR="0" lvl="0" indent="0" algn="l" defTabSz="914400" rtl="0" eaLnBrk="1" fontAlgn="auto" latinLnBrk="0" hangingPunct="1">
+              <a:lnSpc>
+                <a:spcPct val="100000"/>
+              </a:lnSpc>
+              <a:spcBef>
+                <a:spcPts val="0"/>
+              </a:spcBef>
+              <a:spcAft>
+                <a:spcPts val="0"/>
+              </a:spcAft>
+              <a:buClrTx/>
+              <a:buSzTx/>
+              <a:buFontTx/>
+              <a:buNone/>
+              <a:tabLst/>
+              <a:defRPr/>
+            </a:pPr>
+            <a:r>
+              <a:rPr lang="en-US" sz="1200" dirty="0">
                 <a:effectLst/>
                 <a:latin typeface="+mn-lt"/>
-              </a:rPr>
-              <a:t>  </a:t>
-            </a:r>
-            <a:r>
-              <a:rPr lang="en-US" b="0" i="0" dirty="0">
-                <a:solidFill>
-                  <a:srgbClr val="3C3C3B"/>
-                </a:solidFill>
+                <a:ea typeface="Malgun Gothic" panose="020B0503020000020004" pitchFamily="34" charset="-127"/>
+                <a:cs typeface="Times New Roman" panose="02020603050405020304" pitchFamily="18" charset="0"/>
+              </a:rPr>
+              <a:t>Let’s walk through this figure. We start with the output Go from neuron G and the delta Fδ from output neuron F.  We then multiply these two numbers together, as shown by the multiplication sign.  What we want to do is subtract that from the current value of Wgf0.  To show this clearly in the diagram, we multiply the product by −1 and then add it to the weight Wgf0. The green arrow is the update step, where this result becomes the new value of Wgf0.</a:t>
+            </a:r>
+          </a:p>
+          <a:p>
+            <a:pPr marL="0" marR="0" lvl="0" indent="0" algn="l" defTabSz="914400" rtl="0" eaLnBrk="1" fontAlgn="auto" latinLnBrk="0" hangingPunct="1">
+              <a:lnSpc>
+                <a:spcPct val="100000"/>
+              </a:lnSpc>
+              <a:spcBef>
+                <a:spcPts val="0"/>
+              </a:spcBef>
+              <a:spcAft>
+                <a:spcPts val="0"/>
+              </a:spcAft>
+              <a:buClrTx/>
+              <a:buSzTx/>
+              <a:buFontTx/>
+              <a:buNone/>
+              <a:tabLst/>
+              <a:defRPr/>
+            </a:pPr>
+            <a:endParaRPr lang="en-US" sz="1200" dirty="0">
+              <a:effectLst/>
+              <a:latin typeface="+mn-lt"/>
+              <a:ea typeface="Malgun Gothic" panose="020B0503020000020004" pitchFamily="34" charset="-127"/>
+              <a:cs typeface="Times New Roman" panose="02020603050405020304" pitchFamily="18" charset="0"/>
+            </a:endParaRPr>
+          </a:p>
+          <a:p>
+            <a:pPr marL="0" marR="0" lvl="0" indent="0" algn="l" defTabSz="914400" rtl="0" eaLnBrk="1" fontAlgn="auto" latinLnBrk="0" hangingPunct="1">
+              <a:lnSpc>
+                <a:spcPct val="100000"/>
+              </a:lnSpc>
+              <a:spcBef>
+                <a:spcPts val="0"/>
+              </a:spcBef>
+              <a:spcAft>
+                <a:spcPts val="0"/>
+              </a:spcAft>
+              <a:buClrTx/>
+              <a:buSzTx/>
+              <a:buFontTx/>
+              <a:buNone/>
+              <a:tabLst/>
+              <a:defRPr/>
+            </a:pPr>
+            <a:r>
+              <a:rPr lang="en-US" sz="1200" dirty="0">
                 <a:effectLst/>
                 <a:latin typeface="+mn-lt"/>
-              </a:rPr>
-              <a:t>Consider this simple network.  Weight W4 is linked to weight W6 which, in turn, is linked to the Total Error.  Once the error (loss) function calculates the total error, its location on the gradient, and the slope (derivative) at that location, the backpropagation algorithm must then walk this error back through all the linked weights, calculating the slope (derivative) of each, and then adjusting the weights in the direction indicated.  Calculus provides a way of managing these linked weights.  It’s called the </a:t>
-            </a:r>
-            <a:r>
-              <a:rPr lang="en-US" b="1" i="0" dirty="0">
-                <a:solidFill>
-                  <a:srgbClr val="3C3C3B"/>
-                </a:solidFill>
+                <a:ea typeface="Malgun Gothic" panose="020B0503020000020004" pitchFamily="34" charset="-127"/>
+                <a:cs typeface="Times New Roman" panose="02020603050405020304" pitchFamily="18" charset="0"/>
+              </a:rPr>
+              <a:t>Source: Deep Learning: </a:t>
+            </a:r>
+            <a:r>
+              <a:rPr lang="en-US" sz="1200" i="1" dirty="0">
                 <a:effectLst/>
                 <a:latin typeface="+mn-lt"/>
-              </a:rPr>
-              <a:t>chain rule</a:t>
-            </a:r>
-            <a:r>
-              <a:rPr lang="en-US" b="0" i="0" dirty="0">
-                <a:solidFill>
-                  <a:srgbClr val="3C3C3B"/>
-                </a:solidFill>
+                <a:ea typeface="Malgun Gothic" panose="020B0503020000020004" pitchFamily="34" charset="-127"/>
+                <a:cs typeface="Times New Roman" panose="02020603050405020304" pitchFamily="18" charset="0"/>
+              </a:rPr>
+              <a:t>A Visual Approach </a:t>
+            </a:r>
+            <a:r>
+              <a:rPr lang="en-US" sz="1200" i="0" dirty="0">
                 <a:effectLst/>
                 <a:latin typeface="+mn-lt"/>
-              </a:rPr>
-              <a:t>.  As its name suggests, the chain rule is the way in which gradient descent calculates the contribution of each weight to the total error in relation to the other weights.  In this example, the chain rule follows the blue arrows backwards, from Total error to weight W6 and then weight W4.  The same logic applies to all the other weights, including bias.</a:t>
+                <a:ea typeface="Malgun Gothic" panose="020B0503020000020004" pitchFamily="34" charset="-127"/>
+                <a:cs typeface="Times New Roman" panose="02020603050405020304" pitchFamily="18" charset="0"/>
+              </a:rPr>
+              <a:t>(p. 367)</a:t>
             </a:r>
           </a:p>
           <a:p>
@@ -1971,7 +1873,7 @@
     </p:spTree>
     <p:extLst>
       <p:ext uri="{BB962C8B-B14F-4D97-AF65-F5344CB8AC3E}">
-        <p14:creationId xmlns:p14="http://schemas.microsoft.com/office/powerpoint/2010/main" val="2891833994"/>
+        <p14:creationId xmlns:p14="http://schemas.microsoft.com/office/powerpoint/2010/main" val="1475752521"/>
       </p:ext>
     </p:extLst>
   </p:cSld>
@@ -2025,27 +1927,71 @@
           <a:bodyPr/>
           <a:lstStyle/>
           <a:p>
-            <a:pPr marL="0" marR="0" lvl="0" indent="0" algn="l" defTabSz="914400" rtl="0" eaLnBrk="1" fontAlgn="auto" latinLnBrk="0" hangingPunct="1">
-              <a:lnSpc>
-                <a:spcPct val="100000"/>
-              </a:lnSpc>
-              <a:spcBef>
-                <a:spcPts val="0"/>
-              </a:spcBef>
-              <a:spcAft>
-                <a:spcPts val="0"/>
-              </a:spcAft>
-              <a:buClrTx/>
-              <a:buSzTx/>
-              <a:buFontTx/>
-              <a:buNone/>
-              <a:tabLst/>
-              <a:defRPr/>
-            </a:pPr>
-            <a:r>
-              <a:rPr lang="en-US" dirty="0"/>
-              <a:t>The learning experience for this workshop starts on page 79 of the textbook.  For additional information, please watch the exercise 2.01 orientation video.</a:t>
-            </a:r>
+            <a:r>
+              <a:rPr lang="en-US" dirty="0">
+                <a:latin typeface="+mn-lt"/>
+              </a:rPr>
+              <a:t>Now that we understand how individual weights are updated, one final issue remains.  Network weights are linked together, </a:t>
+            </a:r>
+            <a:r>
+              <a:rPr lang="en-US" b="0" i="0" dirty="0">
+                <a:solidFill>
+                  <a:srgbClr val="3C3C3B"/>
+                </a:solidFill>
+                <a:effectLst/>
+                <a:latin typeface="+mn-lt"/>
+              </a:rPr>
+              <a:t>and this creates an additional complication. </a:t>
+            </a:r>
+            <a:r>
+              <a:rPr lang="en-US" b="0" i="0" dirty="0">
+                <a:solidFill>
+                  <a:schemeClr val="tx1"/>
+                </a:solidFill>
+                <a:effectLst/>
+                <a:latin typeface="+mn-lt"/>
+              </a:rPr>
+              <a:t>  </a:t>
+            </a:r>
+            <a:r>
+              <a:rPr lang="en-US" b="0" i="0" dirty="0">
+                <a:solidFill>
+                  <a:srgbClr val="3C3C3B"/>
+                </a:solidFill>
+                <a:effectLst/>
+                <a:latin typeface="+mn-lt"/>
+              </a:rPr>
+              <a:t>Consider this simple network.  Weight W4 is linked to weight W6 which, in turn, is linked to the Total Error.  Once the error (loss) function calculates the total error, its location on the gradient, and the slope (derivative) at that location, the backpropagation algorithm must then walk this error back through all the linked weights, calculating the slope (derivative) of each, and then adjusting the weights in the direction indicated.  Calculus provides a way of managing these linked weights.  It’s called the </a:t>
+            </a:r>
+            <a:r>
+              <a:rPr lang="en-US" b="1" i="0" dirty="0">
+                <a:solidFill>
+                  <a:srgbClr val="3C3C3B"/>
+                </a:solidFill>
+                <a:effectLst/>
+                <a:latin typeface="+mn-lt"/>
+              </a:rPr>
+              <a:t>chain rule</a:t>
+            </a:r>
+            <a:r>
+              <a:rPr lang="en-US" b="0" i="0" dirty="0">
+                <a:solidFill>
+                  <a:srgbClr val="3C3C3B"/>
+                </a:solidFill>
+                <a:effectLst/>
+                <a:latin typeface="+mn-lt"/>
+              </a:rPr>
+              <a:t>.  As its name suggests, the chain rule is the way in which gradient descent calculates the contribution of each weight to the total error in relation to the other weights.  In this example, the chain rule follows the blue arrows backwards, from Total error to weight W6 and then weight W4.  The same logic applies to all the other weights, including bias.</a:t>
+            </a:r>
+          </a:p>
+          <a:p>
+            <a:endParaRPr lang="en-US" b="0" i="0" dirty="0">
+              <a:solidFill>
+                <a:srgbClr val="3C3C3B"/>
+              </a:solidFill>
+              <a:effectLst/>
+              <a:latin typeface="Lato"/>
+            </a:endParaRPr>
           </a:p>
         </p:txBody>
       </p:sp>
@@ -2075,7 +2021,7 @@
     </p:spTree>
     <p:extLst>
       <p:ext uri="{BB962C8B-B14F-4D97-AF65-F5344CB8AC3E}">
-        <p14:creationId xmlns:p14="http://schemas.microsoft.com/office/powerpoint/2010/main" val="2820707112"/>
+        <p14:creationId xmlns:p14="http://schemas.microsoft.com/office/powerpoint/2010/main" val="2891833994"/>
       </p:ext>
     </p:extLst>
   </p:cSld>
@@ -2129,7 +2075,18 @@
           <a:bodyPr/>
           <a:lstStyle/>
           <a:p>
-            <a:endParaRPr lang="en-US" dirty="0"/>
+            <a:r>
+              <a:rPr lang="en-US" dirty="0"/>
+              <a:t>Well, we have covered a lot of territory in this presentation.  First, we discussed the loss function and a network’s </a:t>
+            </a:r>
+            <a:r>
+              <a:rPr lang="en-US" b="1" dirty="0"/>
+              <a:t>total error</a:t>
+            </a:r>
+            <a:r>
+              <a:rPr lang="en-US" dirty="0"/>
+              <a:t>.  That was followed by an in-depth look at gradient descent and the use of partial differential equations to calculate the derivative or slope at a given point on the gradient.  We also learned that most loss functions exhibit complex contours, featuring hills, values, and plateaus, making it difficult to locate the global minimum.  And finally, I discussed how backpropagation employs the chain rule to determine the contribution of each weight to the total error in relation to the other weights.  </a:t>
+            </a:r>
           </a:p>
         </p:txBody>
       </p:sp>
@@ -2159,7 +2116,7 @@
     </p:spTree>
     <p:extLst>
       <p:ext uri="{BB962C8B-B14F-4D97-AF65-F5344CB8AC3E}">
-        <p14:creationId xmlns:p14="http://schemas.microsoft.com/office/powerpoint/2010/main" val="1974960137"/>
+        <p14:creationId xmlns:p14="http://schemas.microsoft.com/office/powerpoint/2010/main" val="1690277211"/>
       </p:ext>
     </p:extLst>
   </p:cSld>
@@ -2213,18 +2170,7 @@
           <a:bodyPr/>
           <a:lstStyle/>
           <a:p>
-            <a:r>
-              <a:rPr lang="en-US" dirty="0"/>
-              <a:t>Well, we have covered a lot of territory in this presentation.  First, we discussed the loss function and a network’s </a:t>
-            </a:r>
-            <a:r>
-              <a:rPr lang="en-US" b="1" dirty="0"/>
-              <a:t>total error</a:t>
-            </a:r>
-            <a:r>
-              <a:rPr lang="en-US" dirty="0"/>
-              <a:t>.  That was followed by an in-depth look at gradient descent and the use of partial differential equations to calculate the derivative or slope at a given point on the gradient.  We also learned that most loss functions exhibit complex contours, featuring hills, values, and plateaus, making it difficult to locate the global minimum.  And finally, I discussed how backpropagation employs the chain rule to determine the contribution of each weight to the total error in relation to the other weights.  </a:t>
-            </a:r>
+            <a:endParaRPr lang="en-US" dirty="0"/>
           </a:p>
         </p:txBody>
       </p:sp>
@@ -2254,7 +2200,7 @@
     </p:spTree>
     <p:extLst>
       <p:ext uri="{BB962C8B-B14F-4D97-AF65-F5344CB8AC3E}">
-        <p14:creationId xmlns:p14="http://schemas.microsoft.com/office/powerpoint/2010/main" val="1690277211"/>
+        <p14:creationId xmlns:p14="http://schemas.microsoft.com/office/powerpoint/2010/main" val="1974960137"/>
       </p:ext>
     </p:extLst>
   </p:cSld>
@@ -4324,7 +4270,7 @@
           <a:p>
             <a:fld id="{C3F78080-8D0A-4BE8-A5B4-CB115102D524}" type="datetimeFigureOut">
               <a:rPr lang="en-US" smtClean="0"/>
-              <a:t>11/19/2021</a:t>
+              <a:t>4/4/2022</a:t>
             </a:fld>
             <a:endParaRPr lang="en-US"/>
           </a:p>
@@ -4522,7 +4468,7 @@
           <a:p>
             <a:fld id="{C3F78080-8D0A-4BE8-A5B4-CB115102D524}" type="datetimeFigureOut">
               <a:rPr lang="en-US" smtClean="0"/>
-              <a:t>11/19/2021</a:t>
+              <a:t>4/4/2022</a:t>
             </a:fld>
             <a:endParaRPr lang="en-US"/>
           </a:p>
@@ -4730,7 +4676,7 @@
           <a:p>
             <a:fld id="{C3F78080-8D0A-4BE8-A5B4-CB115102D524}" type="datetimeFigureOut">
               <a:rPr lang="en-US" smtClean="0"/>
-              <a:t>11/19/2021</a:t>
+              <a:t>4/4/2022</a:t>
             </a:fld>
             <a:endParaRPr lang="en-US"/>
           </a:p>
@@ -4928,7 +4874,7 @@
           <a:p>
             <a:fld id="{C3F78080-8D0A-4BE8-A5B4-CB115102D524}" type="datetimeFigureOut">
               <a:rPr lang="en-US" smtClean="0"/>
-              <a:t>11/19/2021</a:t>
+              <a:t>4/4/2022</a:t>
             </a:fld>
             <a:endParaRPr lang="en-US"/>
           </a:p>
@@ -5203,7 +5149,7 @@
           <a:p>
             <a:fld id="{C3F78080-8D0A-4BE8-A5B4-CB115102D524}" type="datetimeFigureOut">
               <a:rPr lang="en-US" smtClean="0"/>
-              <a:t>11/19/2021</a:t>
+              <a:t>4/4/2022</a:t>
             </a:fld>
             <a:endParaRPr lang="en-US"/>
           </a:p>
@@ -5468,7 +5414,7 @@
           <a:p>
             <a:fld id="{C3F78080-8D0A-4BE8-A5B4-CB115102D524}" type="datetimeFigureOut">
               <a:rPr lang="en-US" smtClean="0"/>
-              <a:t>11/19/2021</a:t>
+              <a:t>4/4/2022</a:t>
             </a:fld>
             <a:endParaRPr lang="en-US"/>
           </a:p>
@@ -5880,7 +5826,7 @@
           <a:p>
             <a:fld id="{C3F78080-8D0A-4BE8-A5B4-CB115102D524}" type="datetimeFigureOut">
               <a:rPr lang="en-US" smtClean="0"/>
-              <a:t>11/19/2021</a:t>
+              <a:t>4/4/2022</a:t>
             </a:fld>
             <a:endParaRPr lang="en-US"/>
           </a:p>
@@ -6021,7 +5967,7 @@
           <a:p>
             <a:fld id="{C3F78080-8D0A-4BE8-A5B4-CB115102D524}" type="datetimeFigureOut">
               <a:rPr lang="en-US" smtClean="0"/>
-              <a:t>11/19/2021</a:t>
+              <a:t>4/4/2022</a:t>
             </a:fld>
             <a:endParaRPr lang="en-US"/>
           </a:p>
@@ -6134,7 +6080,7 @@
           <a:p>
             <a:fld id="{C3F78080-8D0A-4BE8-A5B4-CB115102D524}" type="datetimeFigureOut">
               <a:rPr lang="en-US" smtClean="0"/>
-              <a:t>11/19/2021</a:t>
+              <a:t>4/4/2022</a:t>
             </a:fld>
             <a:endParaRPr lang="en-US"/>
           </a:p>
@@ -6445,7 +6391,7 @@
           <a:p>
             <a:fld id="{C3F78080-8D0A-4BE8-A5B4-CB115102D524}" type="datetimeFigureOut">
               <a:rPr lang="en-US" smtClean="0"/>
-              <a:t>11/19/2021</a:t>
+              <a:t>4/4/2022</a:t>
             </a:fld>
             <a:endParaRPr lang="en-US"/>
           </a:p>
@@ -6733,7 +6679,7 @@
           <a:p>
             <a:fld id="{C3F78080-8D0A-4BE8-A5B4-CB115102D524}" type="datetimeFigureOut">
               <a:rPr lang="en-US" smtClean="0"/>
-              <a:t>11/19/2021</a:t>
+              <a:t>4/4/2022</a:t>
             </a:fld>
             <a:endParaRPr lang="en-US"/>
           </a:p>
@@ -6974,7 +6920,7 @@
           <a:p>
             <a:fld id="{C3F78080-8D0A-4BE8-A5B4-CB115102D524}" type="datetimeFigureOut">
               <a:rPr lang="en-US" smtClean="0"/>
-              <a:t>11/19/2021</a:t>
+              <a:t>4/4/2022</a:t>
             </a:fld>
             <a:endParaRPr lang="en-US"/>
           </a:p>
@@ -7940,6 +7886,213 @@
           <a:chExt cx="0" cy="0"/>
         </a:xfrm>
       </p:grpSpPr>
+      <p:sp>
+        <p:nvSpPr>
+          <p:cNvPr id="2" name="Title 1">
+            <a:extLst>
+              <a:ext uri="{FF2B5EF4-FFF2-40B4-BE49-F238E27FC236}">
+                <a16:creationId xmlns:a16="http://schemas.microsoft.com/office/drawing/2014/main" id="{0F853981-B13F-4917-804F-EBF0D4819E7E}"/>
+              </a:ext>
+            </a:extLst>
+          </p:cNvPr>
+          <p:cNvSpPr>
+            <a:spLocks noGrp="1"/>
+          </p:cNvSpPr>
+          <p:nvPr>
+            <p:ph type="title"/>
+          </p:nvPr>
+        </p:nvSpPr>
+        <p:spPr>
+          <a:xfrm>
+            <a:off x="0" y="3287209"/>
+            <a:ext cx="12192000" cy="617577"/>
+          </a:xfrm>
+          <a:noFill/>
+        </p:spPr>
+        <p:txBody>
+          <a:bodyPr>
+            <a:noAutofit/>
+          </a:bodyPr>
+          <a:lstStyle/>
+          <a:p>
+            <a:br>
+              <a:rPr lang="en-US" sz="3600" dirty="0">
+                <a:solidFill>
+                  <a:schemeClr val="tx1">
+                    <a:lumMod val="65000"/>
+                    <a:lumOff val="35000"/>
+                  </a:schemeClr>
+                </a:solidFill>
+                <a:latin typeface="Palatino Linotype" panose="02040502050505030304" pitchFamily="18" charset="0"/>
+              </a:rPr>
+            </a:br>
+            <a:br>
+              <a:rPr lang="en-US" sz="3600" dirty="0">
+                <a:solidFill>
+                  <a:schemeClr val="tx1">
+                    <a:lumMod val="65000"/>
+                    <a:lumOff val="35000"/>
+                  </a:schemeClr>
+                </a:solidFill>
+                <a:latin typeface="Palatino Linotype" panose="02040502050505030304" pitchFamily="18" charset="0"/>
+              </a:rPr>
+            </a:br>
+            <a:r>
+              <a:rPr lang="en-US" sz="3600" dirty="0">
+                <a:solidFill>
+                  <a:schemeClr val="tx1">
+                    <a:lumMod val="65000"/>
+                    <a:lumOff val="35000"/>
+                  </a:schemeClr>
+                </a:solidFill>
+                <a:latin typeface="Palatino Linotype" panose="02040502050505030304" pitchFamily="18" charset="0"/>
+              </a:rPr>
+              <a:t>		2.05 (Binary Classification using Keras)</a:t>
+            </a:r>
+            <a:endParaRPr lang="en-US" sz="3600" dirty="0">
+              <a:solidFill>
+                <a:schemeClr val="tx1">
+                  <a:lumMod val="65000"/>
+                  <a:lumOff val="35000"/>
+                </a:schemeClr>
+              </a:solidFill>
+              <a:latin typeface="Palatino Linotype" panose="02040502050505030304" pitchFamily="18" charset="0"/>
+              <a:cs typeface="Segoe UI Light" panose="020B0502040204020203" pitchFamily="34" charset="0"/>
+            </a:endParaRPr>
+          </a:p>
+        </p:txBody>
+      </p:sp>
+      <p:sp>
+        <p:nvSpPr>
+          <p:cNvPr id="3" name="Text Placeholder 2">
+            <a:extLst>
+              <a:ext uri="{FF2B5EF4-FFF2-40B4-BE49-F238E27FC236}">
+                <a16:creationId xmlns:a16="http://schemas.microsoft.com/office/drawing/2014/main" id="{098BC2D2-CCF7-4C63-8489-B46BF394FCA2}"/>
+              </a:ext>
+            </a:extLst>
+          </p:cNvPr>
+          <p:cNvSpPr>
+            <a:spLocks noGrp="1"/>
+          </p:cNvSpPr>
+          <p:nvPr>
+            <p:ph type="body" idx="1"/>
+          </p:nvPr>
+        </p:nvSpPr>
+        <p:spPr>
+          <a:xfrm>
+            <a:off x="0" y="4285400"/>
+            <a:ext cx="12192000" cy="518830"/>
+          </a:xfrm>
+        </p:spPr>
+        <p:txBody>
+          <a:bodyPr>
+            <a:normAutofit/>
+          </a:bodyPr>
+          <a:lstStyle/>
+          <a:p>
+            <a:endParaRPr lang="en-US" dirty="0">
+              <a:latin typeface="Palatino Linotype" panose="02040502050505030304" pitchFamily="18" charset="0"/>
+              <a:cs typeface="Segoe UI" panose="020B0502040204020203" pitchFamily="34" charset="0"/>
+            </a:endParaRPr>
+          </a:p>
+          <a:p>
+            <a:endParaRPr lang="en-US" dirty="0">
+              <a:latin typeface="Palatino Linotype" panose="02040502050505030304" pitchFamily="18" charset="0"/>
+              <a:cs typeface="Segoe UI" panose="020B0502040204020203" pitchFamily="34" charset="0"/>
+            </a:endParaRPr>
+          </a:p>
+          <a:p>
+            <a:endParaRPr lang="en-US" dirty="0">
+              <a:latin typeface="Palatino Linotype" panose="02040502050505030304" pitchFamily="18" charset="0"/>
+              <a:cs typeface="Segoe UI" panose="020B0502040204020203" pitchFamily="34" charset="0"/>
+            </a:endParaRPr>
+          </a:p>
+          <a:p>
+            <a:endParaRPr lang="en-US" dirty="0">
+              <a:latin typeface="Palatino Linotype" panose="02040502050505030304" pitchFamily="18" charset="0"/>
+              <a:cs typeface="Segoe UI" panose="020B0502040204020203" pitchFamily="34" charset="0"/>
+            </a:endParaRPr>
+          </a:p>
+          <a:p>
+            <a:endParaRPr lang="en-US" dirty="0">
+              <a:latin typeface="Palatino Linotype" panose="02040502050505030304" pitchFamily="18" charset="0"/>
+              <a:cs typeface="Segoe UI" panose="020B0502040204020203" pitchFamily="34" charset="0"/>
+            </a:endParaRPr>
+          </a:p>
+        </p:txBody>
+      </p:sp>
+      <p:pic>
+        <p:nvPicPr>
+          <p:cNvPr id="4" name="Picture 3">
+            <a:extLst>
+              <a:ext uri="{FF2B5EF4-FFF2-40B4-BE49-F238E27FC236}">
+                <a16:creationId xmlns:a16="http://schemas.microsoft.com/office/drawing/2014/main" id="{4CD7B1E7-8C1E-4394-BD29-073CEC503ACC}"/>
+              </a:ext>
+            </a:extLst>
+          </p:cNvPr>
+          <p:cNvPicPr>
+            <a:picLocks noChangeAspect="1"/>
+          </p:cNvPicPr>
+          <p:nvPr/>
+        </p:nvPicPr>
+        <p:blipFill>
+          <a:blip r:embed="rId3"/>
+          <a:stretch>
+            <a:fillRect/>
+          </a:stretch>
+        </p:blipFill>
+        <p:spPr>
+          <a:xfrm>
+            <a:off x="0" y="365760"/>
+            <a:ext cx="3233668" cy="805144"/>
+          </a:xfrm>
+          <a:prstGeom prst="rect">
+            <a:avLst/>
+          </a:prstGeom>
+        </p:spPr>
+      </p:pic>
+    </p:spTree>
+    <p:extLst>
+      <p:ext uri="{BB962C8B-B14F-4D97-AF65-F5344CB8AC3E}">
+        <p14:creationId xmlns:p14="http://schemas.microsoft.com/office/powerpoint/2010/main" val="864611552"/>
+      </p:ext>
+    </p:extLst>
+  </p:cSld>
+  <p:clrMapOvr>
+    <a:masterClrMapping/>
+  </p:clrMapOvr>
+  <mc:AlternateContent xmlns:mc="http://schemas.openxmlformats.org/markup-compatibility/2006" xmlns:p14="http://schemas.microsoft.com/office/powerpoint/2010/main">
+    <mc:Choice Requires="p14">
+      <p:transition spd="med" p14:dur="700">
+        <p:fade/>
+      </p:transition>
+    </mc:Choice>
+    <mc:Fallback xmlns="">
+      <p:transition spd="med">
+        <p:fade/>
+      </p:transition>
+    </mc:Fallback>
+  </mc:AlternateContent>
+</p:sld>
+</file>
+
+<file path=ppt/slides/slide13.xml><?xml version="1.0" encoding="utf-8"?>
+<p:sld xmlns:a="http://schemas.openxmlformats.org/drawingml/2006/main" xmlns:r="http://schemas.openxmlformats.org/officeDocument/2006/relationships" xmlns:p="http://schemas.openxmlformats.org/presentationml/2006/main">
+  <p:cSld>
+    <p:spTree>
+      <p:nvGrpSpPr>
+        <p:cNvPr id="1" name=""/>
+        <p:cNvGrpSpPr/>
+        <p:nvPr/>
+      </p:nvGrpSpPr>
+      <p:grpSpPr>
+        <a:xfrm>
+          <a:off x="0" y="0"/>
+          <a:ext cx="0" cy="0"/>
+          <a:chOff x="0" y="0"/>
+          <a:chExt cx="0" cy="0"/>
+        </a:xfrm>
+      </p:grpSpPr>
       <p:pic>
         <p:nvPicPr>
           <p:cNvPr id="8" name="Picture 7">
@@ -8332,7 +8485,7 @@
 </p:sld>
 </file>
 
-<file path=ppt/slides/slide13.xml><?xml version="1.0" encoding="utf-8"?>
+<file path=ppt/slides/slide14.xml><?xml version="1.0" encoding="utf-8"?>
 <p:sld xmlns:a="http://schemas.openxmlformats.org/drawingml/2006/main" xmlns:r="http://schemas.openxmlformats.org/officeDocument/2006/relationships" xmlns:p="http://schemas.openxmlformats.org/presentationml/2006/main">
   <p:cSld>
     <p:spTree>
@@ -8607,7 +8760,7 @@
 </p:sld>
 </file>
 
-<file path=ppt/slides/slide14.xml><?xml version="1.0" encoding="utf-8"?>
+<file path=ppt/slides/slide15.xml><?xml version="1.0" encoding="utf-8"?>
 <p:sld xmlns:a="http://schemas.openxmlformats.org/drawingml/2006/main" xmlns:r="http://schemas.openxmlformats.org/officeDocument/2006/relationships" xmlns:p="http://schemas.openxmlformats.org/presentationml/2006/main">
   <p:cSld>
     <p:spTree>
@@ -8685,281 +8838,6 @@
 </p:sld>
 </file>
 
-<file path=ppt/slides/slide15.xml><?xml version="1.0" encoding="utf-8"?>
-<p:sld xmlns:a="http://schemas.openxmlformats.org/drawingml/2006/main" xmlns:r="http://schemas.openxmlformats.org/officeDocument/2006/relationships" xmlns:p="http://schemas.openxmlformats.org/presentationml/2006/main">
-  <p:cSld>
-    <p:spTree>
-      <p:nvGrpSpPr>
-        <p:cNvPr id="1" name=""/>
-        <p:cNvGrpSpPr/>
-        <p:nvPr/>
-      </p:nvGrpSpPr>
-      <p:grpSpPr>
-        <a:xfrm>
-          <a:off x="0" y="0"/>
-          <a:ext cx="0" cy="0"/>
-          <a:chOff x="0" y="0"/>
-          <a:chExt cx="0" cy="0"/>
-        </a:xfrm>
-      </p:grpSpPr>
-      <p:sp>
-        <p:nvSpPr>
-          <p:cNvPr id="3" name="TextBox 3">
-            <a:extLst>
-              <a:ext uri="{FF2B5EF4-FFF2-40B4-BE49-F238E27FC236}">
-                <a16:creationId xmlns:a16="http://schemas.microsoft.com/office/drawing/2014/main" id="{6F847786-7632-4043-BBAB-89FD3F1E42F8}"/>
-              </a:ext>
-            </a:extLst>
-          </p:cNvPr>
-          <p:cNvSpPr txBox="1"/>
-          <p:nvPr/>
-        </p:nvSpPr>
-        <p:spPr>
-          <a:xfrm>
-            <a:off x="0" y="6550223"/>
-            <a:ext cx="12192000" cy="307777"/>
-          </a:xfrm>
-          <a:prstGeom prst="rect">
-            <a:avLst/>
-          </a:prstGeom>
-          <a:noFill/>
-        </p:spPr>
-        <p:txBody>
-          <a:bodyPr wrap="square" rtlCol="0">
-            <a:spAutoFit/>
-          </a:bodyPr>
-          <a:lstStyle>
-            <a:defPPr>
-              <a:defRPr lang="en-US"/>
-            </a:defPPr>
-            <a:lvl1pPr marL="0" algn="l" defTabSz="914400" rtl="0" eaLnBrk="1" latinLnBrk="0" hangingPunct="1">
-              <a:defRPr sz="1800" kern="1200">
-                <a:solidFill>
-                  <a:schemeClr val="tx1"/>
-                </a:solidFill>
-                <a:latin typeface="+mn-lt"/>
-                <a:ea typeface="+mn-ea"/>
-                <a:cs typeface="+mn-cs"/>
-              </a:defRPr>
-            </a:lvl1pPr>
-            <a:lvl2pPr marL="457200" algn="l" defTabSz="914400" rtl="0" eaLnBrk="1" latinLnBrk="0" hangingPunct="1">
-              <a:defRPr sz="1800" kern="1200">
-                <a:solidFill>
-                  <a:schemeClr val="tx1"/>
-                </a:solidFill>
-                <a:latin typeface="+mn-lt"/>
-                <a:ea typeface="+mn-ea"/>
-                <a:cs typeface="+mn-cs"/>
-              </a:defRPr>
-            </a:lvl2pPr>
-            <a:lvl3pPr marL="914400" algn="l" defTabSz="914400" rtl="0" eaLnBrk="1" latinLnBrk="0" hangingPunct="1">
-              <a:defRPr sz="1800" kern="1200">
-                <a:solidFill>
-                  <a:schemeClr val="tx1"/>
-                </a:solidFill>
-                <a:latin typeface="+mn-lt"/>
-                <a:ea typeface="+mn-ea"/>
-                <a:cs typeface="+mn-cs"/>
-              </a:defRPr>
-            </a:lvl3pPr>
-            <a:lvl4pPr marL="1371600" algn="l" defTabSz="914400" rtl="0" eaLnBrk="1" latinLnBrk="0" hangingPunct="1">
-              <a:defRPr sz="1800" kern="1200">
-                <a:solidFill>
-                  <a:schemeClr val="tx1"/>
-                </a:solidFill>
-                <a:latin typeface="+mn-lt"/>
-                <a:ea typeface="+mn-ea"/>
-                <a:cs typeface="+mn-cs"/>
-              </a:defRPr>
-            </a:lvl4pPr>
-            <a:lvl5pPr marL="1828800" algn="l" defTabSz="914400" rtl="0" eaLnBrk="1" latinLnBrk="0" hangingPunct="1">
-              <a:defRPr sz="1800" kern="1200">
-                <a:solidFill>
-                  <a:schemeClr val="tx1"/>
-                </a:solidFill>
-                <a:latin typeface="+mn-lt"/>
-                <a:ea typeface="+mn-ea"/>
-                <a:cs typeface="+mn-cs"/>
-              </a:defRPr>
-            </a:lvl5pPr>
-            <a:lvl6pPr marL="2286000" algn="l" defTabSz="914400" rtl="0" eaLnBrk="1" latinLnBrk="0" hangingPunct="1">
-              <a:defRPr sz="1800" kern="1200">
-                <a:solidFill>
-                  <a:schemeClr val="tx1"/>
-                </a:solidFill>
-                <a:latin typeface="+mn-lt"/>
-                <a:ea typeface="+mn-ea"/>
-                <a:cs typeface="+mn-cs"/>
-              </a:defRPr>
-            </a:lvl6pPr>
-            <a:lvl7pPr marL="2743200" algn="l" defTabSz="914400" rtl="0" eaLnBrk="1" latinLnBrk="0" hangingPunct="1">
-              <a:defRPr sz="1800" kern="1200">
-                <a:solidFill>
-                  <a:schemeClr val="tx1"/>
-                </a:solidFill>
-                <a:latin typeface="+mn-lt"/>
-                <a:ea typeface="+mn-ea"/>
-                <a:cs typeface="+mn-cs"/>
-              </a:defRPr>
-            </a:lvl7pPr>
-            <a:lvl8pPr marL="3200400" algn="l" defTabSz="914400" rtl="0" eaLnBrk="1" latinLnBrk="0" hangingPunct="1">
-              <a:defRPr sz="1800" kern="1200">
-                <a:solidFill>
-                  <a:schemeClr val="tx1"/>
-                </a:solidFill>
-                <a:latin typeface="+mn-lt"/>
-                <a:ea typeface="+mn-ea"/>
-                <a:cs typeface="+mn-cs"/>
-              </a:defRPr>
-            </a:lvl8pPr>
-            <a:lvl9pPr marL="3657600" algn="l" defTabSz="914400" rtl="0" eaLnBrk="1" latinLnBrk="0" hangingPunct="1">
-              <a:defRPr sz="1800" kern="1200">
-                <a:solidFill>
-                  <a:schemeClr val="tx1"/>
-                </a:solidFill>
-                <a:latin typeface="+mn-lt"/>
-                <a:ea typeface="+mn-ea"/>
-                <a:cs typeface="+mn-cs"/>
-              </a:defRPr>
-            </a:lvl9pPr>
-          </a:lstStyle>
-          <a:p>
-            <a:r>
-              <a:rPr lang="en-US" sz="1400" dirty="0">
-                <a:solidFill>
-                  <a:schemeClr val="tx1">
-                    <a:lumMod val="65000"/>
-                    <a:lumOff val="35000"/>
-                  </a:schemeClr>
-                </a:solidFill>
-                <a:latin typeface="+mj-lt"/>
-                <a:ea typeface="Verdana" panose="020B0604030504040204" pitchFamily="34" charset="0"/>
-              </a:rPr>
-              <a:t>Source: Glassner, A. (2021). </a:t>
-            </a:r>
-            <a:r>
-              <a:rPr lang="en-US" sz="1400" i="1" dirty="0">
-                <a:solidFill>
-                  <a:schemeClr val="tx1">
-                    <a:lumMod val="65000"/>
-                    <a:lumOff val="35000"/>
-                  </a:schemeClr>
-                </a:solidFill>
-                <a:latin typeface="+mj-lt"/>
-                <a:ea typeface="Verdana" panose="020B0604030504040204" pitchFamily="34" charset="0"/>
-              </a:rPr>
-              <a:t>Deep learning: A visual approach</a:t>
-            </a:r>
-            <a:r>
-              <a:rPr lang="en-US" sz="1400" dirty="0">
-                <a:solidFill>
-                  <a:schemeClr val="tx1">
-                    <a:lumMod val="65000"/>
-                    <a:lumOff val="35000"/>
-                  </a:schemeClr>
-                </a:solidFill>
-                <a:latin typeface="+mj-lt"/>
-                <a:ea typeface="Verdana" panose="020B0604030504040204" pitchFamily="34" charset="0"/>
-              </a:rPr>
-              <a:t>. </a:t>
-            </a:r>
-            <a:r>
-              <a:rPr lang="en-US" sz="1400" b="0" i="0" dirty="0">
-                <a:solidFill>
-                  <a:schemeClr val="tx1">
-                    <a:lumMod val="65000"/>
-                    <a:lumOff val="35000"/>
-                  </a:schemeClr>
-                </a:solidFill>
-                <a:effectLst/>
-                <a:latin typeface="+mj-lt"/>
-                <a:ea typeface="Verdana" panose="020B0604030504040204" pitchFamily="34" charset="0"/>
-              </a:rPr>
-              <a:t>San Francisco, CA: No Starch Press. (Chapter 14)</a:t>
-            </a:r>
-            <a:endParaRPr lang="en-US" sz="1400" dirty="0">
-              <a:solidFill>
-                <a:schemeClr val="tx1">
-                  <a:lumMod val="65000"/>
-                  <a:lumOff val="35000"/>
-                </a:schemeClr>
-              </a:solidFill>
-              <a:latin typeface="+mj-lt"/>
-              <a:ea typeface="Verdana" panose="020B0604030504040204" pitchFamily="34" charset="0"/>
-            </a:endParaRPr>
-          </a:p>
-        </p:txBody>
-      </p:sp>
-      <p:pic>
-        <p:nvPicPr>
-          <p:cNvPr id="4" name="Picture 2">
-            <a:extLst>
-              <a:ext uri="{FF2B5EF4-FFF2-40B4-BE49-F238E27FC236}">
-                <a16:creationId xmlns:a16="http://schemas.microsoft.com/office/drawing/2014/main" id="{76F3258B-B0C6-44B7-8834-6C848B087C43}"/>
-              </a:ext>
-            </a:extLst>
-          </p:cNvPr>
-          <p:cNvPicPr>
-            <a:picLocks noChangeAspect="1" noChangeArrowheads="1"/>
-          </p:cNvPicPr>
-          <p:nvPr/>
-        </p:nvPicPr>
-        <p:blipFill>
-          <a:blip r:embed="rId3">
-            <a:extLst>
-              <a:ext uri="{28A0092B-C50C-407E-A947-70E740481C1C}">
-                <a14:useLocalDpi xmlns:a14="http://schemas.microsoft.com/office/drawing/2010/main" val="0"/>
-              </a:ext>
-            </a:extLst>
-          </a:blip>
-          <a:srcRect/>
-          <a:stretch/>
-        </p:blipFill>
-        <p:spPr bwMode="auto">
-          <a:xfrm>
-            <a:off x="2914988" y="1219435"/>
-            <a:ext cx="6362023" cy="4419130"/>
-          </a:xfrm>
-          <a:prstGeom prst="rect">
-            <a:avLst/>
-          </a:prstGeom>
-          <a:noFill/>
-          <a:extLst>
-            <a:ext uri="{909E8E84-426E-40DD-AFC4-6F175D3DCCD1}">
-              <a14:hiddenFill xmlns:a14="http://schemas.microsoft.com/office/drawing/2010/main">
-                <a:solidFill>
-                  <a:srgbClr val="FFFFFF"/>
-                </a:solidFill>
-              </a14:hiddenFill>
-            </a:ext>
-          </a:extLst>
-        </p:spPr>
-      </p:pic>
-    </p:spTree>
-    <p:extLst>
-      <p:ext uri="{BB962C8B-B14F-4D97-AF65-F5344CB8AC3E}">
-        <p14:creationId xmlns:p14="http://schemas.microsoft.com/office/powerpoint/2010/main" val="2846560920"/>
-      </p:ext>
-    </p:extLst>
-  </p:cSld>
-  <p:clrMapOvr>
-    <a:masterClrMapping/>
-  </p:clrMapOvr>
-  <mc:AlternateContent xmlns:mc="http://schemas.openxmlformats.org/markup-compatibility/2006" xmlns:p14="http://schemas.microsoft.com/office/powerpoint/2010/main">
-    <mc:Choice Requires="p14">
-      <p:transition spd="med" p14:dur="700">
-        <p:fade/>
-      </p:transition>
-    </mc:Choice>
-    <mc:Fallback xmlns="">
-      <p:transition spd="med">
-        <p:fade/>
-      </p:transition>
-    </mc:Fallback>
-  </mc:AlternateContent>
-</p:sld>
-</file>
-
 <file path=ppt/slides/slide16.xml><?xml version="1.0" encoding="utf-8"?>
 <p:sld xmlns:a="http://schemas.openxmlformats.org/drawingml/2006/main" xmlns:r="http://schemas.openxmlformats.org/officeDocument/2006/relationships" xmlns:p="http://schemas.openxmlformats.org/presentationml/2006/main">
   <p:cSld>
@@ -8977,42 +8855,12 @@
           <a:chExt cx="0" cy="0"/>
         </a:xfrm>
       </p:grpSpPr>
-      <p:pic>
-        <p:nvPicPr>
-          <p:cNvPr id="5" name="Picture 4">
-            <a:extLst>
-              <a:ext uri="{FF2B5EF4-FFF2-40B4-BE49-F238E27FC236}">
-                <a16:creationId xmlns:a16="http://schemas.microsoft.com/office/drawing/2014/main" id="{BB679311-680E-47D0-AEB5-A6FF64033ED1}"/>
-              </a:ext>
-            </a:extLst>
-          </p:cNvPr>
-          <p:cNvPicPr>
-            <a:picLocks noChangeAspect="1"/>
-          </p:cNvPicPr>
-          <p:nvPr/>
-        </p:nvPicPr>
-        <p:blipFill>
-          <a:blip r:embed="rId3"/>
-          <a:stretch>
-            <a:fillRect/>
-          </a:stretch>
-        </p:blipFill>
-        <p:spPr>
-          <a:xfrm>
-            <a:off x="917733" y="1101989"/>
-            <a:ext cx="10356534" cy="4654021"/>
-          </a:xfrm>
-          <a:prstGeom prst="rect">
-            <a:avLst/>
-          </a:prstGeom>
-        </p:spPr>
-      </p:pic>
-      <p:sp>
-        <p:nvSpPr>
-          <p:cNvPr id="3" name="TextBox 2">
-            <a:extLst>
-              <a:ext uri="{FF2B5EF4-FFF2-40B4-BE49-F238E27FC236}">
-                <a16:creationId xmlns:a16="http://schemas.microsoft.com/office/drawing/2014/main" id="{979F5AD8-51F0-434C-88FB-400CA869633A}"/>
+      <p:sp>
+        <p:nvSpPr>
+          <p:cNvPr id="3" name="TextBox 3">
+            <a:extLst>
+              <a:ext uri="{FF2B5EF4-FFF2-40B4-BE49-F238E27FC236}">
+                <a16:creationId xmlns:a16="http://schemas.microsoft.com/office/drawing/2014/main" id="{6F847786-7632-4043-BBAB-89FD3F1E42F8}"/>
               </a:ext>
             </a:extLst>
           </p:cNvPr>
@@ -9033,7 +8881,101 @@
           <a:bodyPr wrap="square" rtlCol="0">
             <a:spAutoFit/>
           </a:bodyPr>
-          <a:lstStyle/>
+          <a:lstStyle>
+            <a:defPPr>
+              <a:defRPr lang="en-US"/>
+            </a:defPPr>
+            <a:lvl1pPr marL="0" algn="l" defTabSz="914400" rtl="0" eaLnBrk="1" latinLnBrk="0" hangingPunct="1">
+              <a:defRPr sz="1800" kern="1200">
+                <a:solidFill>
+                  <a:schemeClr val="tx1"/>
+                </a:solidFill>
+                <a:latin typeface="+mn-lt"/>
+                <a:ea typeface="+mn-ea"/>
+                <a:cs typeface="+mn-cs"/>
+              </a:defRPr>
+            </a:lvl1pPr>
+            <a:lvl2pPr marL="457200" algn="l" defTabSz="914400" rtl="0" eaLnBrk="1" latinLnBrk="0" hangingPunct="1">
+              <a:defRPr sz="1800" kern="1200">
+                <a:solidFill>
+                  <a:schemeClr val="tx1"/>
+                </a:solidFill>
+                <a:latin typeface="+mn-lt"/>
+                <a:ea typeface="+mn-ea"/>
+                <a:cs typeface="+mn-cs"/>
+              </a:defRPr>
+            </a:lvl2pPr>
+            <a:lvl3pPr marL="914400" algn="l" defTabSz="914400" rtl="0" eaLnBrk="1" latinLnBrk="0" hangingPunct="1">
+              <a:defRPr sz="1800" kern="1200">
+                <a:solidFill>
+                  <a:schemeClr val="tx1"/>
+                </a:solidFill>
+                <a:latin typeface="+mn-lt"/>
+                <a:ea typeface="+mn-ea"/>
+                <a:cs typeface="+mn-cs"/>
+              </a:defRPr>
+            </a:lvl3pPr>
+            <a:lvl4pPr marL="1371600" algn="l" defTabSz="914400" rtl="0" eaLnBrk="1" latinLnBrk="0" hangingPunct="1">
+              <a:defRPr sz="1800" kern="1200">
+                <a:solidFill>
+                  <a:schemeClr val="tx1"/>
+                </a:solidFill>
+                <a:latin typeface="+mn-lt"/>
+                <a:ea typeface="+mn-ea"/>
+                <a:cs typeface="+mn-cs"/>
+              </a:defRPr>
+            </a:lvl4pPr>
+            <a:lvl5pPr marL="1828800" algn="l" defTabSz="914400" rtl="0" eaLnBrk="1" latinLnBrk="0" hangingPunct="1">
+              <a:defRPr sz="1800" kern="1200">
+                <a:solidFill>
+                  <a:schemeClr val="tx1"/>
+                </a:solidFill>
+                <a:latin typeface="+mn-lt"/>
+                <a:ea typeface="+mn-ea"/>
+                <a:cs typeface="+mn-cs"/>
+              </a:defRPr>
+            </a:lvl5pPr>
+            <a:lvl6pPr marL="2286000" algn="l" defTabSz="914400" rtl="0" eaLnBrk="1" latinLnBrk="0" hangingPunct="1">
+              <a:defRPr sz="1800" kern="1200">
+                <a:solidFill>
+                  <a:schemeClr val="tx1"/>
+                </a:solidFill>
+                <a:latin typeface="+mn-lt"/>
+                <a:ea typeface="+mn-ea"/>
+                <a:cs typeface="+mn-cs"/>
+              </a:defRPr>
+            </a:lvl6pPr>
+            <a:lvl7pPr marL="2743200" algn="l" defTabSz="914400" rtl="0" eaLnBrk="1" latinLnBrk="0" hangingPunct="1">
+              <a:defRPr sz="1800" kern="1200">
+                <a:solidFill>
+                  <a:schemeClr val="tx1"/>
+                </a:solidFill>
+                <a:latin typeface="+mn-lt"/>
+                <a:ea typeface="+mn-ea"/>
+                <a:cs typeface="+mn-cs"/>
+              </a:defRPr>
+            </a:lvl7pPr>
+            <a:lvl8pPr marL="3200400" algn="l" defTabSz="914400" rtl="0" eaLnBrk="1" latinLnBrk="0" hangingPunct="1">
+              <a:defRPr sz="1800" kern="1200">
+                <a:solidFill>
+                  <a:schemeClr val="tx1"/>
+                </a:solidFill>
+                <a:latin typeface="+mn-lt"/>
+                <a:ea typeface="+mn-ea"/>
+                <a:cs typeface="+mn-cs"/>
+              </a:defRPr>
+            </a:lvl8pPr>
+            <a:lvl9pPr marL="3657600" algn="l" defTabSz="914400" rtl="0" eaLnBrk="1" latinLnBrk="0" hangingPunct="1">
+              <a:defRPr sz="1800" kern="1200">
+                <a:solidFill>
+                  <a:schemeClr val="tx1"/>
+                </a:solidFill>
+                <a:latin typeface="+mn-lt"/>
+                <a:ea typeface="+mn-ea"/>
+                <a:cs typeface="+mn-cs"/>
+              </a:defRPr>
+            </a:lvl9pPr>
+          </a:lstStyle>
           <a:p>
             <a:r>
               <a:rPr lang="en-US" sz="1400" dirty="0">
@@ -9046,7 +8988,7 @@
                 <a:latin typeface="+mj-lt"/>
                 <a:ea typeface="Verdana" panose="020B0604030504040204" pitchFamily="34" charset="0"/>
               </a:rPr>
-              <a:t>Source: Taylor, M. (2017). </a:t>
+              <a:t>Source: Glassner, A. (2021). </a:t>
             </a:r>
             <a:r>
               <a:rPr lang="en-US" sz="1400" i="1" dirty="0">
@@ -9059,7 +9001,7 @@
                 <a:latin typeface="+mj-lt"/>
                 <a:ea typeface="Verdana" panose="020B0604030504040204" pitchFamily="34" charset="0"/>
               </a:rPr>
-              <a:t>Neural networks: A visual introduction for beginners</a:t>
+              <a:t>Deep learning: A visual approach</a:t>
             </a:r>
             <a:r>
               <a:rPr lang="en-US" sz="1400" dirty="0">
@@ -9072,7 +9014,7 @@
                 <a:latin typeface="+mj-lt"/>
                 <a:ea typeface="Verdana" panose="020B0604030504040204" pitchFamily="34" charset="0"/>
               </a:rPr>
-              <a:t>. Vancouver, Canada</a:t>
+              <a:t>. </a:t>
             </a:r>
             <a:r>
               <a:rPr lang="en-US" sz="1400" b="0" i="0" dirty="0">
@@ -9086,28 +9028,161 @@
                 <a:latin typeface="+mj-lt"/>
                 <a:ea typeface="Verdana" panose="020B0604030504040204" pitchFamily="34" charset="0"/>
               </a:rPr>
-              <a:t>: Blue Windmill Media</a:t>
-            </a:r>
-            <a:r>
-              <a:rPr lang="en-US" sz="1400" dirty="0">
-                <a:solidFill>
-                  <a:schemeClr val="tx1">
-                    <a:lumMod val="65000"/>
-                    <a:lumOff val="35000"/>
+              <a:t>San Francisco, CA: No Starch Press. (Chapter 14)</a:t>
+            </a:r>
+            <a:endParaRPr lang="en-US" sz="1400" dirty="0">
+              <a:solidFill>
+                <a:schemeClr val="tx1">
+                  <a:lumMod val="65000"/>
+                  <a:lumOff val="35000"/>
+                </a:schemeClr>
+              </a:solidFill>
+              <a:latin typeface="+mj-lt"/>
+              <a:ea typeface="Verdana" panose="020B0604030504040204" pitchFamily="34" charset="0"/>
+            </a:endParaRPr>
+          </a:p>
+        </p:txBody>
+      </p:sp>
+      <p:pic>
+        <p:nvPicPr>
+          <p:cNvPr id="4" name="Picture 2">
+            <a:extLst>
+              <a:ext uri="{FF2B5EF4-FFF2-40B4-BE49-F238E27FC236}">
+                <a16:creationId xmlns:a16="http://schemas.microsoft.com/office/drawing/2014/main" id="{76F3258B-B0C6-44B7-8834-6C848B087C43}"/>
+              </a:ext>
+            </a:extLst>
+          </p:cNvPr>
+          <p:cNvPicPr>
+            <a:picLocks noChangeAspect="1" noChangeArrowheads="1"/>
+          </p:cNvPicPr>
+          <p:nvPr/>
+        </p:nvPicPr>
+        <p:blipFill>
+          <a:blip r:embed="rId3">
+            <a:extLst>
+              <a:ext uri="{28A0092B-C50C-407E-A947-70E740481C1C}">
+                <a14:useLocalDpi xmlns:a14="http://schemas.microsoft.com/office/drawing/2010/main" val="0"/>
+              </a:ext>
+            </a:extLst>
+          </a:blip>
+          <a:srcRect/>
+          <a:stretch/>
+        </p:blipFill>
+        <p:spPr bwMode="auto">
+          <a:xfrm>
+            <a:off x="2914988" y="1219435"/>
+            <a:ext cx="6362023" cy="4419130"/>
+          </a:xfrm>
+          <a:prstGeom prst="rect">
+            <a:avLst/>
+          </a:prstGeom>
+          <a:noFill/>
+          <a:extLst>
+            <a:ext uri="{909E8E84-426E-40DD-AFC4-6F175D3DCCD1}">
+              <a14:hiddenFill xmlns:a14="http://schemas.microsoft.com/office/drawing/2010/main">
+                <a:solidFill>
+                  <a:srgbClr val="FFFFFF"/>
+                </a:solidFill>
+              </a14:hiddenFill>
+            </a:ext>
+          </a:extLst>
+        </p:spPr>
+      </p:pic>
+      <p:sp>
+        <p:nvSpPr>
+          <p:cNvPr id="2" name="TextBox 1">
+            <a:extLst>
+              <a:ext uri="{FF2B5EF4-FFF2-40B4-BE49-F238E27FC236}">
+                <a16:creationId xmlns:a16="http://schemas.microsoft.com/office/drawing/2014/main" id="{D67C09B7-1F5E-450D-9A49-54DEEA07C470}"/>
+              </a:ext>
+            </a:extLst>
+          </p:cNvPr>
+          <p:cNvSpPr txBox="1"/>
+          <p:nvPr/>
+        </p:nvSpPr>
+        <p:spPr>
+          <a:xfrm>
+            <a:off x="3788229" y="5223340"/>
+            <a:ext cx="537327" cy="461665"/>
+          </a:xfrm>
+          <a:prstGeom prst="rect">
+            <a:avLst/>
+          </a:prstGeom>
+          <a:noFill/>
+        </p:spPr>
+        <p:txBody>
+          <a:bodyPr wrap="none" rtlCol="0">
+            <a:spAutoFit/>
+          </a:bodyPr>
+          <a:lstStyle/>
+          <a:p>
+            <a:r>
+              <a:rPr lang="en-US" sz="2400" dirty="0">
+                <a:solidFill>
+                  <a:schemeClr val="accent1">
+                    <a:lumMod val="75000"/>
                   </a:schemeClr>
                 </a:solidFill>
                 <a:latin typeface="+mj-lt"/>
-                <a:ea typeface="Verdana" panose="020B0604030504040204" pitchFamily="34" charset="0"/>
-              </a:rPr>
-              <a:t>.</a:t>
-            </a:r>
+              </a:rPr>
+              <a:t>Go</a:t>
+            </a:r>
+          </a:p>
+        </p:txBody>
+      </p:sp>
+      <p:sp>
+        <p:nvSpPr>
+          <p:cNvPr id="5" name="TextBox 4">
+            <a:extLst>
+              <a:ext uri="{FF2B5EF4-FFF2-40B4-BE49-F238E27FC236}">
+                <a16:creationId xmlns:a16="http://schemas.microsoft.com/office/drawing/2014/main" id="{1E8D49E1-FF01-4A1D-B628-D09022478678}"/>
+              </a:ext>
+            </a:extLst>
+          </p:cNvPr>
+          <p:cNvSpPr txBox="1"/>
+          <p:nvPr/>
+        </p:nvSpPr>
+        <p:spPr>
+          <a:xfrm>
+            <a:off x="7969300" y="5269780"/>
+            <a:ext cx="487634" cy="461665"/>
+          </a:xfrm>
+          <a:prstGeom prst="rect">
+            <a:avLst/>
+          </a:prstGeom>
+          <a:noFill/>
+        </p:spPr>
+        <p:txBody>
+          <a:bodyPr wrap="none" rtlCol="0">
+            <a:spAutoFit/>
+          </a:bodyPr>
+          <a:lstStyle/>
+          <a:p>
+            <a:r>
+              <a:rPr lang="en-US" sz="2400" dirty="0">
+                <a:solidFill>
+                  <a:srgbClr val="C00000"/>
+                </a:solidFill>
+                <a:effectLst/>
+                <a:latin typeface="+mn-lt"/>
+                <a:ea typeface="Malgun Gothic" panose="020B0503020000020004" pitchFamily="34" charset="-127"/>
+                <a:cs typeface="Times New Roman" panose="02020603050405020304" pitchFamily="18" charset="0"/>
+              </a:rPr>
+              <a:t>Fδ</a:t>
+            </a:r>
+            <a:endParaRPr lang="en-US" sz="2400" dirty="0">
+              <a:solidFill>
+                <a:srgbClr val="C00000"/>
+              </a:solidFill>
+              <a:latin typeface="+mj-lt"/>
+            </a:endParaRPr>
           </a:p>
         </p:txBody>
       </p:sp>
     </p:spTree>
     <p:extLst>
       <p:ext uri="{BB962C8B-B14F-4D97-AF65-F5344CB8AC3E}">
-        <p14:creationId xmlns:p14="http://schemas.microsoft.com/office/powerpoint/2010/main" val="614313547"/>
+        <p14:creationId xmlns:p14="http://schemas.microsoft.com/office/powerpoint/2010/main" val="2846560920"/>
       </p:ext>
     </p:extLst>
   </p:cSld>
@@ -9146,147 +9221,12 @@
           <a:chExt cx="0" cy="0"/>
         </a:xfrm>
       </p:grpSpPr>
-      <p:sp>
-        <p:nvSpPr>
-          <p:cNvPr id="2" name="Title 1">
-            <a:extLst>
-              <a:ext uri="{FF2B5EF4-FFF2-40B4-BE49-F238E27FC236}">
-                <a16:creationId xmlns:a16="http://schemas.microsoft.com/office/drawing/2014/main" id="{0F853981-B13F-4917-804F-EBF0D4819E7E}"/>
-              </a:ext>
-            </a:extLst>
-          </p:cNvPr>
-          <p:cNvSpPr>
-            <a:spLocks noGrp="1"/>
-          </p:cNvSpPr>
-          <p:nvPr>
-            <p:ph type="title"/>
-          </p:nvPr>
-        </p:nvSpPr>
-        <p:spPr>
-          <a:xfrm>
-            <a:off x="0" y="3287209"/>
-            <a:ext cx="12192000" cy="617577"/>
-          </a:xfrm>
-          <a:noFill/>
-        </p:spPr>
-        <p:txBody>
-          <a:bodyPr>
-            <a:noAutofit/>
-          </a:bodyPr>
-          <a:lstStyle/>
-          <a:p>
-            <a:br>
-              <a:rPr lang="en-US" sz="3600" dirty="0">
-                <a:solidFill>
-                  <a:schemeClr val="tx1">
-                    <a:lumMod val="65000"/>
-                    <a:lumOff val="35000"/>
-                  </a:schemeClr>
-                </a:solidFill>
-                <a:latin typeface="Palatino Linotype" panose="02040502050505030304" pitchFamily="18" charset="0"/>
-              </a:rPr>
-            </a:br>
-            <a:br>
-              <a:rPr lang="en-US" sz="3600" dirty="0">
-                <a:solidFill>
-                  <a:schemeClr val="tx1">
-                    <a:lumMod val="65000"/>
-                    <a:lumOff val="35000"/>
-                  </a:schemeClr>
-                </a:solidFill>
-                <a:latin typeface="Palatino Linotype" panose="02040502050505030304" pitchFamily="18" charset="0"/>
-              </a:rPr>
-            </a:br>
-            <a:r>
-              <a:rPr lang="en-US" sz="3600" dirty="0">
-                <a:solidFill>
-                  <a:schemeClr val="tx1">
-                    <a:lumMod val="65000"/>
-                    <a:lumOff val="35000"/>
-                  </a:schemeClr>
-                </a:solidFill>
-                <a:latin typeface="Palatino Linotype" panose="02040502050505030304" pitchFamily="18" charset="0"/>
-              </a:rPr>
-              <a:t>		2.05 (Binary Classification using Keras)</a:t>
-            </a:r>
-            <a:endParaRPr lang="en-US" sz="3600" dirty="0">
-              <a:solidFill>
-                <a:schemeClr val="tx1">
-                  <a:lumMod val="65000"/>
-                  <a:lumOff val="35000"/>
-                </a:schemeClr>
-              </a:solidFill>
-              <a:latin typeface="Palatino Linotype" panose="02040502050505030304" pitchFamily="18" charset="0"/>
-              <a:cs typeface="Segoe UI Light" panose="020B0502040204020203" pitchFamily="34" charset="0"/>
-            </a:endParaRPr>
-          </a:p>
-        </p:txBody>
-      </p:sp>
-      <p:sp>
-        <p:nvSpPr>
-          <p:cNvPr id="3" name="Text Placeholder 2">
-            <a:extLst>
-              <a:ext uri="{FF2B5EF4-FFF2-40B4-BE49-F238E27FC236}">
-                <a16:creationId xmlns:a16="http://schemas.microsoft.com/office/drawing/2014/main" id="{098BC2D2-CCF7-4C63-8489-B46BF394FCA2}"/>
-              </a:ext>
-            </a:extLst>
-          </p:cNvPr>
-          <p:cNvSpPr>
-            <a:spLocks noGrp="1"/>
-          </p:cNvSpPr>
-          <p:nvPr>
-            <p:ph type="body" idx="1"/>
-          </p:nvPr>
-        </p:nvSpPr>
-        <p:spPr>
-          <a:xfrm>
-            <a:off x="0" y="4285400"/>
-            <a:ext cx="12192000" cy="518830"/>
-          </a:xfrm>
-        </p:spPr>
-        <p:txBody>
-          <a:bodyPr>
-            <a:normAutofit/>
-          </a:bodyPr>
-          <a:lstStyle/>
-          <a:p>
-            <a:endParaRPr lang="en-US" dirty="0">
-              <a:latin typeface="Palatino Linotype" panose="02040502050505030304" pitchFamily="18" charset="0"/>
-              <a:cs typeface="Segoe UI" panose="020B0502040204020203" pitchFamily="34" charset="0"/>
-            </a:endParaRPr>
-          </a:p>
-          <a:p>
-            <a:endParaRPr lang="en-US" dirty="0">
-              <a:latin typeface="Palatino Linotype" panose="02040502050505030304" pitchFamily="18" charset="0"/>
-              <a:cs typeface="Segoe UI" panose="020B0502040204020203" pitchFamily="34" charset="0"/>
-            </a:endParaRPr>
-          </a:p>
-          <a:p>
-            <a:endParaRPr lang="en-US" dirty="0">
-              <a:latin typeface="Palatino Linotype" panose="02040502050505030304" pitchFamily="18" charset="0"/>
-              <a:cs typeface="Segoe UI" panose="020B0502040204020203" pitchFamily="34" charset="0"/>
-            </a:endParaRPr>
-          </a:p>
-          <a:p>
-            <a:endParaRPr lang="en-US" dirty="0">
-              <a:latin typeface="Palatino Linotype" panose="02040502050505030304" pitchFamily="18" charset="0"/>
-              <a:cs typeface="Segoe UI" panose="020B0502040204020203" pitchFamily="34" charset="0"/>
-            </a:endParaRPr>
-          </a:p>
-          <a:p>
-            <a:endParaRPr lang="en-US" dirty="0">
-              <a:latin typeface="Palatino Linotype" panose="02040502050505030304" pitchFamily="18" charset="0"/>
-              <a:cs typeface="Segoe UI" panose="020B0502040204020203" pitchFamily="34" charset="0"/>
-            </a:endParaRPr>
-          </a:p>
-        </p:txBody>
-      </p:sp>
       <p:pic>
         <p:nvPicPr>
-          <p:cNvPr id="4" name="Picture 3">
-            <a:extLst>
-              <a:ext uri="{FF2B5EF4-FFF2-40B4-BE49-F238E27FC236}">
-                <a16:creationId xmlns:a16="http://schemas.microsoft.com/office/drawing/2014/main" id="{4CD7B1E7-8C1E-4394-BD29-073CEC503ACC}"/>
+          <p:cNvPr id="5" name="Picture 4">
+            <a:extLst>
+              <a:ext uri="{FF2B5EF4-FFF2-40B4-BE49-F238E27FC236}">
+                <a16:creationId xmlns:a16="http://schemas.microsoft.com/office/drawing/2014/main" id="{BB679311-680E-47D0-AEB5-A6FF64033ED1}"/>
               </a:ext>
             </a:extLst>
           </p:cNvPr>
@@ -9303,18 +9243,115 @@
         </p:blipFill>
         <p:spPr>
           <a:xfrm>
-            <a:off x="0" y="365760"/>
-            <a:ext cx="3233668" cy="805144"/>
+            <a:off x="917733" y="1101989"/>
+            <a:ext cx="10356534" cy="4654021"/>
           </a:xfrm>
           <a:prstGeom prst="rect">
             <a:avLst/>
           </a:prstGeom>
         </p:spPr>
       </p:pic>
+      <p:sp>
+        <p:nvSpPr>
+          <p:cNvPr id="3" name="TextBox 2">
+            <a:extLst>
+              <a:ext uri="{FF2B5EF4-FFF2-40B4-BE49-F238E27FC236}">
+                <a16:creationId xmlns:a16="http://schemas.microsoft.com/office/drawing/2014/main" id="{979F5AD8-51F0-434C-88FB-400CA869633A}"/>
+              </a:ext>
+            </a:extLst>
+          </p:cNvPr>
+          <p:cNvSpPr txBox="1"/>
+          <p:nvPr/>
+        </p:nvSpPr>
+        <p:spPr>
+          <a:xfrm>
+            <a:off x="0" y="6550223"/>
+            <a:ext cx="12192000" cy="307777"/>
+          </a:xfrm>
+          <a:prstGeom prst="rect">
+            <a:avLst/>
+          </a:prstGeom>
+          <a:noFill/>
+        </p:spPr>
+        <p:txBody>
+          <a:bodyPr wrap="square" rtlCol="0">
+            <a:spAutoFit/>
+          </a:bodyPr>
+          <a:lstStyle/>
+          <a:p>
+            <a:r>
+              <a:rPr lang="en-US" sz="1400" dirty="0">
+                <a:solidFill>
+                  <a:schemeClr val="tx1">
+                    <a:lumMod val="65000"/>
+                    <a:lumOff val="35000"/>
+                  </a:schemeClr>
+                </a:solidFill>
+                <a:latin typeface="+mj-lt"/>
+                <a:ea typeface="Verdana" panose="020B0604030504040204" pitchFamily="34" charset="0"/>
+              </a:rPr>
+              <a:t>Source: Taylor, M. (2017). </a:t>
+            </a:r>
+            <a:r>
+              <a:rPr lang="en-US" sz="1400" i="1" dirty="0">
+                <a:solidFill>
+                  <a:schemeClr val="tx1">
+                    <a:lumMod val="65000"/>
+                    <a:lumOff val="35000"/>
+                  </a:schemeClr>
+                </a:solidFill>
+                <a:latin typeface="+mj-lt"/>
+                <a:ea typeface="Verdana" panose="020B0604030504040204" pitchFamily="34" charset="0"/>
+              </a:rPr>
+              <a:t>Neural networks: A visual introduction for beginners</a:t>
+            </a:r>
+            <a:r>
+              <a:rPr lang="en-US" sz="1400" dirty="0">
+                <a:solidFill>
+                  <a:schemeClr val="tx1">
+                    <a:lumMod val="65000"/>
+                    <a:lumOff val="35000"/>
+                  </a:schemeClr>
+                </a:solidFill>
+                <a:latin typeface="+mj-lt"/>
+                <a:ea typeface="Verdana" panose="020B0604030504040204" pitchFamily="34" charset="0"/>
+              </a:rPr>
+              <a:t>. Vancouver, Canada</a:t>
+            </a:r>
+            <a:r>
+              <a:rPr lang="en-US" sz="1400" b="0" i="0" dirty="0">
+                <a:solidFill>
+                  <a:schemeClr val="tx1">
+                    <a:lumMod val="65000"/>
+                    <a:lumOff val="35000"/>
+                  </a:schemeClr>
+                </a:solidFill>
+                <a:effectLst/>
+                <a:latin typeface="+mj-lt"/>
+                <a:ea typeface="Verdana" panose="020B0604030504040204" pitchFamily="34" charset="0"/>
+              </a:rPr>
+              <a:t>: Blue Windmill Media</a:t>
+            </a:r>
+            <a:r>
+              <a:rPr lang="en-US" sz="1400" dirty="0">
+                <a:solidFill>
+                  <a:schemeClr val="tx1">
+                    <a:lumMod val="65000"/>
+                    <a:lumOff val="35000"/>
+                  </a:schemeClr>
+                </a:solidFill>
+                <a:latin typeface="+mj-lt"/>
+                <a:ea typeface="Verdana" panose="020B0604030504040204" pitchFamily="34" charset="0"/>
+              </a:rPr>
+              <a:t>.</a:t>
+            </a:r>
+          </a:p>
+        </p:txBody>
+      </p:sp>
     </p:spTree>
     <p:extLst>
       <p:ext uri="{BB962C8B-B14F-4D97-AF65-F5344CB8AC3E}">
-        <p14:creationId xmlns:p14="http://schemas.microsoft.com/office/powerpoint/2010/main" val="864611552"/>
+        <p14:creationId xmlns:p14="http://schemas.microsoft.com/office/powerpoint/2010/main" val="614313547"/>
       </p:ext>
     </p:extLst>
   </p:cSld>
@@ -9353,42 +9390,198 @@
           <a:chExt cx="0" cy="0"/>
         </a:xfrm>
       </p:grpSpPr>
-      <p:pic>
-        <p:nvPicPr>
-          <p:cNvPr id="3" name="Picture 2">
-            <a:extLst>
-              <a:ext uri="{FF2B5EF4-FFF2-40B4-BE49-F238E27FC236}">
-                <a16:creationId xmlns:a16="http://schemas.microsoft.com/office/drawing/2014/main" id="{239D0A82-7D34-4E48-BE20-B982B3990537}"/>
-              </a:ext>
-            </a:extLst>
-          </p:cNvPr>
-          <p:cNvPicPr>
-            <a:picLocks noChangeAspect="1"/>
-          </p:cNvPicPr>
-          <p:nvPr/>
-        </p:nvPicPr>
-        <p:blipFill>
-          <a:blip r:embed="rId3"/>
-          <a:stretch>
-            <a:fillRect/>
-          </a:stretch>
-        </p:blipFill>
+      <p:sp>
+        <p:nvSpPr>
+          <p:cNvPr id="5" name="Content Placeholder 4">
+            <a:extLst>
+              <a:ext uri="{FF2B5EF4-FFF2-40B4-BE49-F238E27FC236}">
+                <a16:creationId xmlns:a16="http://schemas.microsoft.com/office/drawing/2014/main" id="{7C82B2FA-DB39-467C-9DC1-245874DCBCF1}"/>
+              </a:ext>
+            </a:extLst>
+          </p:cNvPr>
+          <p:cNvSpPr>
+            <a:spLocks noGrp="1"/>
+          </p:cNvSpPr>
+          <p:nvPr>
+            <p:ph idx="1"/>
+          </p:nvPr>
+        </p:nvSpPr>
         <p:spPr>
           <a:xfrm>
-            <a:off x="0" y="324192"/>
-            <a:ext cx="3233668" cy="840754"/>
+            <a:off x="812801" y="1386840"/>
+            <a:ext cx="10540999" cy="4790124"/>
           </a:xfrm>
-          <a:prstGeom prst="rect">
-            <a:avLst/>
-          </a:prstGeom>
         </p:spPr>
-      </p:pic>
-      <p:sp>
-        <p:nvSpPr>
-          <p:cNvPr id="8" name="Title 1">
-            <a:extLst>
-              <a:ext uri="{FF2B5EF4-FFF2-40B4-BE49-F238E27FC236}">
-                <a16:creationId xmlns:a16="http://schemas.microsoft.com/office/drawing/2014/main" id="{6F128DD7-C643-44B7-803E-11F67E24E0DE}"/>
+        <p:txBody>
+          <a:bodyPr>
+            <a:normAutofit fontScale="92500" lnSpcReduction="20000"/>
+          </a:bodyPr>
+          <a:lstStyle/>
+          <a:p>
+            <a:pPr marL="0" indent="0">
+              <a:buNone/>
+            </a:pPr>
+            <a:endParaRPr lang="en-US" sz="3200" dirty="0">
+              <a:latin typeface="Palatino Linotype" panose="02040502050505030304" pitchFamily="18" charset="0"/>
+            </a:endParaRPr>
+          </a:p>
+          <a:p>
+            <a:pPr>
+              <a:buFont typeface="Wingdings" panose="05000000000000000000" pitchFamily="2" charset="2"/>
+              <a:buChar char="Ø"/>
+            </a:pPr>
+            <a:r>
+              <a:rPr lang="en-US" sz="3200" dirty="0">
+                <a:solidFill>
+                  <a:schemeClr val="tx1">
+                    <a:lumMod val="75000"/>
+                    <a:lumOff val="25000"/>
+                  </a:schemeClr>
+                </a:solidFill>
+                <a:latin typeface="Palatino Linotype" panose="02040502050505030304" pitchFamily="18" charset="0"/>
+              </a:rPr>
+              <a:t> Error (Loss) Function</a:t>
+            </a:r>
+          </a:p>
+          <a:p>
+            <a:pPr marL="0" indent="0">
+              <a:buNone/>
+            </a:pPr>
+            <a:endParaRPr lang="en-US" sz="3200" dirty="0">
+              <a:solidFill>
+                <a:schemeClr val="tx1">
+                  <a:lumMod val="75000"/>
+                  <a:lumOff val="25000"/>
+                </a:schemeClr>
+              </a:solidFill>
+              <a:latin typeface="Palatino Linotype" panose="02040502050505030304" pitchFamily="18" charset="0"/>
+            </a:endParaRPr>
+          </a:p>
+          <a:p>
+            <a:pPr>
+              <a:buFont typeface="Wingdings" panose="05000000000000000000" pitchFamily="2" charset="2"/>
+              <a:buChar char="Ø"/>
+            </a:pPr>
+            <a:r>
+              <a:rPr lang="en-US" sz="3200" dirty="0">
+                <a:solidFill>
+                  <a:schemeClr val="tx1">
+                    <a:lumMod val="75000"/>
+                    <a:lumOff val="25000"/>
+                  </a:schemeClr>
+                </a:solidFill>
+                <a:latin typeface="Palatino Linotype" panose="02040502050505030304" pitchFamily="18" charset="0"/>
+              </a:rPr>
+              <a:t> Gradient Descent &amp; Partial Derivatives</a:t>
+            </a:r>
+          </a:p>
+          <a:p>
+            <a:pPr marL="0" indent="0">
+              <a:buNone/>
+            </a:pPr>
+            <a:r>
+              <a:rPr lang="en-US" sz="3200" dirty="0">
+                <a:solidFill>
+                  <a:schemeClr val="tx1">
+                    <a:lumMod val="75000"/>
+                    <a:lumOff val="25000"/>
+                  </a:schemeClr>
+                </a:solidFill>
+                <a:latin typeface="Palatino Linotype" panose="02040502050505030304" pitchFamily="18" charset="0"/>
+              </a:rPr>
+              <a:t> </a:t>
+            </a:r>
+          </a:p>
+          <a:p>
+            <a:pPr>
+              <a:buFont typeface="Wingdings" panose="05000000000000000000" pitchFamily="2" charset="2"/>
+              <a:buChar char="Ø"/>
+            </a:pPr>
+            <a:r>
+              <a:rPr lang="en-US" sz="3200" dirty="0">
+                <a:solidFill>
+                  <a:schemeClr val="tx1">
+                    <a:lumMod val="75000"/>
+                    <a:lumOff val="25000"/>
+                  </a:schemeClr>
+                </a:solidFill>
+                <a:latin typeface="Palatino Linotype" panose="02040502050505030304" pitchFamily="18" charset="0"/>
+              </a:rPr>
+              <a:t> Complex Gradients</a:t>
+            </a:r>
+          </a:p>
+          <a:p>
+            <a:pPr marL="0" indent="0">
+              <a:buNone/>
+            </a:pPr>
+            <a:endParaRPr lang="en-US" sz="3200" dirty="0">
+              <a:solidFill>
+                <a:schemeClr val="tx1">
+                  <a:lumMod val="75000"/>
+                  <a:lumOff val="25000"/>
+                </a:schemeClr>
+              </a:solidFill>
+              <a:latin typeface="Palatino Linotype" panose="02040502050505030304" pitchFamily="18" charset="0"/>
+            </a:endParaRPr>
+          </a:p>
+          <a:p>
+            <a:pPr>
+              <a:buFont typeface="Wingdings" panose="05000000000000000000" pitchFamily="2" charset="2"/>
+              <a:buChar char="Ø"/>
+            </a:pPr>
+            <a:r>
+              <a:rPr lang="en-US" sz="3200" dirty="0">
+                <a:solidFill>
+                  <a:schemeClr val="tx1">
+                    <a:lumMod val="75000"/>
+                    <a:lumOff val="25000"/>
+                  </a:schemeClr>
+                </a:solidFill>
+                <a:latin typeface="Palatino Linotype" panose="02040502050505030304" pitchFamily="18" charset="0"/>
+              </a:rPr>
+              <a:t> Optimizers</a:t>
+            </a:r>
+          </a:p>
+          <a:p>
+            <a:pPr marL="0" indent="0">
+              <a:buNone/>
+            </a:pPr>
+            <a:endParaRPr lang="en-US" sz="3200" dirty="0">
+              <a:solidFill>
+                <a:schemeClr val="tx1">
+                  <a:lumMod val="75000"/>
+                  <a:lumOff val="25000"/>
+                </a:schemeClr>
+              </a:solidFill>
+              <a:latin typeface="Palatino Linotype" panose="02040502050505030304" pitchFamily="18" charset="0"/>
+            </a:endParaRPr>
+          </a:p>
+          <a:p>
+            <a:pPr>
+              <a:buFont typeface="Wingdings" panose="05000000000000000000" pitchFamily="2" charset="2"/>
+              <a:buChar char="Ø"/>
+            </a:pPr>
+            <a:r>
+              <a:rPr lang="en-US" sz="3200" dirty="0">
+                <a:solidFill>
+                  <a:schemeClr val="tx1">
+                    <a:lumMod val="75000"/>
+                    <a:lumOff val="25000"/>
+                  </a:schemeClr>
+                </a:solidFill>
+                <a:latin typeface="Palatino Linotype" panose="02040502050505030304" pitchFamily="18" charset="0"/>
+              </a:rPr>
+              <a:t> Chain Rule</a:t>
+            </a:r>
+          </a:p>
+        </p:txBody>
+      </p:sp>
+      <p:sp>
+        <p:nvSpPr>
+          <p:cNvPr id="3" name="Title 4">
+            <a:extLst>
+              <a:ext uri="{FF2B5EF4-FFF2-40B4-BE49-F238E27FC236}">
+                <a16:creationId xmlns:a16="http://schemas.microsoft.com/office/drawing/2014/main" id="{8ADCD547-C091-45A4-9127-CC0044D81745}"/>
               </a:ext>
             </a:extLst>
           </p:cNvPr>
@@ -9401,19 +9594,17 @@
         </p:nvSpPr>
         <p:spPr>
           <a:xfrm>
-            <a:off x="0" y="3086009"/>
-            <a:ext cx="12192000" cy="685982"/>
+            <a:off x="812802" y="365126"/>
+            <a:ext cx="10540998" cy="1325563"/>
           </a:xfrm>
-          <a:noFill/>
         </p:spPr>
         <p:txBody>
-          <a:bodyPr>
-            <a:noAutofit/>
-          </a:bodyPr>
+          <a:bodyPr/>
           <a:lstStyle/>
           <a:p>
-            <a:r>
-              <a:rPr lang="en-US" sz="3600" dirty="0">
+            <a:pPr algn="ctr"/>
+            <a:r>
+              <a:rPr lang="en-US" dirty="0">
                 <a:solidFill>
                   <a:schemeClr val="tx1">
                     <a:lumMod val="65000"/>
@@ -9422,38 +9613,15 @@
                 </a:solidFill>
                 <a:latin typeface="Palatino Linotype" panose="02040502050505030304" pitchFamily="18" charset="0"/>
               </a:rPr>
-              <a:t>		2.06 (</a:t>
-            </a:r>
-            <a:r>
-              <a:rPr lang="en-US" sz="3600" b="0" i="0" dirty="0">
-                <a:solidFill>
-                  <a:schemeClr val="tx1">
-                    <a:lumMod val="65000"/>
-                    <a:lumOff val="35000"/>
-                  </a:schemeClr>
-                </a:solidFill>
-                <a:effectLst/>
-                <a:latin typeface="Palatino Linotype" panose="02040502050505030304" pitchFamily="18" charset="0"/>
-              </a:rPr>
-              <a:t>Multilayer Binary Classifier)</a:t>
-            </a:r>
-            <a:endParaRPr lang="en-US" sz="3600" dirty="0">
-              <a:solidFill>
-                <a:schemeClr val="tx1">
-                  <a:lumMod val="65000"/>
-                  <a:lumOff val="35000"/>
-                </a:schemeClr>
-              </a:solidFill>
-              <a:latin typeface="Palatino Linotype" panose="02040502050505030304" pitchFamily="18" charset="0"/>
-              <a:cs typeface="Segoe UI Light" panose="020B0502040204020203" pitchFamily="34" charset="0"/>
-            </a:endParaRPr>
+              <a:t>Summary</a:t>
+            </a:r>
           </a:p>
         </p:txBody>
       </p:sp>
     </p:spTree>
     <p:extLst>
       <p:ext uri="{BB962C8B-B14F-4D97-AF65-F5344CB8AC3E}">
-        <p14:creationId xmlns:p14="http://schemas.microsoft.com/office/powerpoint/2010/main" val="994788979"/>
+        <p14:creationId xmlns:p14="http://schemas.microsoft.com/office/powerpoint/2010/main" val="1397534281"/>
       </p:ext>
     </p:extLst>
   </p:cSld>
@@ -9492,221 +9660,67 @@
           <a:chExt cx="0" cy="0"/>
         </a:xfrm>
       </p:grpSpPr>
-      <p:sp>
-        <p:nvSpPr>
-          <p:cNvPr id="5" name="Content Placeholder 4">
-            <a:extLst>
-              <a:ext uri="{FF2B5EF4-FFF2-40B4-BE49-F238E27FC236}">
-                <a16:creationId xmlns:a16="http://schemas.microsoft.com/office/drawing/2014/main" id="{7C82B2FA-DB39-467C-9DC1-245874DCBCF1}"/>
-              </a:ext>
-            </a:extLst>
-          </p:cNvPr>
-          <p:cNvSpPr>
-            <a:spLocks noGrp="1"/>
-          </p:cNvSpPr>
-          <p:nvPr>
-            <p:ph idx="1"/>
-          </p:nvPr>
-        </p:nvSpPr>
+      <p:pic>
+        <p:nvPicPr>
+          <p:cNvPr id="3" name="Picture 2">
+            <a:extLst>
+              <a:ext uri="{FF2B5EF4-FFF2-40B4-BE49-F238E27FC236}">
+                <a16:creationId xmlns:a16="http://schemas.microsoft.com/office/drawing/2014/main" id="{239D0A82-7D34-4E48-BE20-B982B3990537}"/>
+              </a:ext>
+            </a:extLst>
+          </p:cNvPr>
+          <p:cNvPicPr>
+            <a:picLocks noChangeAspect="1"/>
+          </p:cNvPicPr>
+          <p:nvPr/>
+        </p:nvPicPr>
+        <p:blipFill>
+          <a:blip r:embed="rId3"/>
+          <a:stretch>
+            <a:fillRect/>
+          </a:stretch>
+        </p:blipFill>
         <p:spPr>
           <a:xfrm>
-            <a:off x="812801" y="1386840"/>
-            <a:ext cx="10540999" cy="4790124"/>
+            <a:off x="0" y="324192"/>
+            <a:ext cx="3233668" cy="840754"/>
           </a:xfrm>
+          <a:prstGeom prst="rect">
+            <a:avLst/>
+          </a:prstGeom>
         </p:spPr>
+      </p:pic>
+      <p:sp>
+        <p:nvSpPr>
+          <p:cNvPr id="8" name="Title 1">
+            <a:extLst>
+              <a:ext uri="{FF2B5EF4-FFF2-40B4-BE49-F238E27FC236}">
+                <a16:creationId xmlns:a16="http://schemas.microsoft.com/office/drawing/2014/main" id="{6F128DD7-C643-44B7-803E-11F67E24E0DE}"/>
+              </a:ext>
+            </a:extLst>
+          </p:cNvPr>
+          <p:cNvSpPr>
+            <a:spLocks noGrp="1"/>
+          </p:cNvSpPr>
+          <p:nvPr>
+            <p:ph type="title"/>
+          </p:nvPr>
+        </p:nvSpPr>
+        <p:spPr>
+          <a:xfrm>
+            <a:off x="0" y="3086009"/>
+            <a:ext cx="12192000" cy="685982"/>
+          </a:xfrm>
+          <a:noFill/>
+        </p:spPr>
         <p:txBody>
           <a:bodyPr>
-            <a:normAutofit fontScale="92500" lnSpcReduction="20000"/>
+            <a:noAutofit/>
           </a:bodyPr>
           <a:lstStyle/>
           <a:p>
-            <a:pPr marL="0" indent="0">
-              <a:buNone/>
-            </a:pPr>
-            <a:endParaRPr lang="en-US" sz="3200" dirty="0">
-              <a:latin typeface="Palatino Linotype" panose="02040502050505030304" pitchFamily="18" charset="0"/>
-            </a:endParaRPr>
-          </a:p>
-          <a:p>
-            <a:pPr>
-              <a:buFont typeface="Wingdings" panose="05000000000000000000" pitchFamily="2" charset="2"/>
-              <a:buChar char="Ø"/>
-            </a:pPr>
-            <a:r>
-              <a:rPr lang="en-US" sz="3200" dirty="0">
-                <a:solidFill>
-                  <a:schemeClr val="tx1">
-                    <a:lumMod val="75000"/>
-                    <a:lumOff val="25000"/>
-                  </a:schemeClr>
-                </a:solidFill>
-                <a:latin typeface="Palatino Linotype" panose="02040502050505030304" pitchFamily="18" charset="0"/>
-              </a:rPr>
-              <a:t> Error (Loss) Function</a:t>
-            </a:r>
-          </a:p>
-          <a:p>
-            <a:pPr marL="0" indent="0">
-              <a:buNone/>
-            </a:pPr>
-            <a:endParaRPr lang="en-US" sz="3200" dirty="0">
-              <a:solidFill>
-                <a:schemeClr val="tx1">
-                  <a:lumMod val="75000"/>
-                  <a:lumOff val="25000"/>
-                </a:schemeClr>
-              </a:solidFill>
-              <a:latin typeface="Palatino Linotype" panose="02040502050505030304" pitchFamily="18" charset="0"/>
-            </a:endParaRPr>
-          </a:p>
-          <a:p>
-            <a:pPr>
-              <a:buFont typeface="Wingdings" panose="05000000000000000000" pitchFamily="2" charset="2"/>
-              <a:buChar char="Ø"/>
-            </a:pPr>
-            <a:r>
-              <a:rPr lang="en-US" sz="3200" dirty="0">
-                <a:solidFill>
-                  <a:schemeClr val="tx1">
-                    <a:lumMod val="75000"/>
-                    <a:lumOff val="25000"/>
-                  </a:schemeClr>
-                </a:solidFill>
-                <a:latin typeface="Palatino Linotype" panose="02040502050505030304" pitchFamily="18" charset="0"/>
-              </a:rPr>
-              <a:t> Gradient Descent &amp; Partial Derivatives</a:t>
-            </a:r>
-          </a:p>
-          <a:p>
-            <a:pPr marL="0" indent="0">
-              <a:buNone/>
-            </a:pPr>
-            <a:r>
-              <a:rPr lang="en-US" sz="3200" dirty="0">
-                <a:solidFill>
-                  <a:schemeClr val="tx1">
-                    <a:lumMod val="75000"/>
-                    <a:lumOff val="25000"/>
-                  </a:schemeClr>
-                </a:solidFill>
-                <a:latin typeface="Palatino Linotype" panose="02040502050505030304" pitchFamily="18" charset="0"/>
-              </a:rPr>
-              <a:t> </a:t>
-            </a:r>
-          </a:p>
-          <a:p>
-            <a:pPr>
-              <a:buFont typeface="Wingdings" panose="05000000000000000000" pitchFamily="2" charset="2"/>
-              <a:buChar char="Ø"/>
-            </a:pPr>
-            <a:r>
-              <a:rPr lang="en-US" sz="3200" dirty="0">
-                <a:solidFill>
-                  <a:schemeClr val="tx1">
-                    <a:lumMod val="75000"/>
-                    <a:lumOff val="25000"/>
-                  </a:schemeClr>
-                </a:solidFill>
-                <a:latin typeface="Palatino Linotype" panose="02040502050505030304" pitchFamily="18" charset="0"/>
-              </a:rPr>
-              <a:t> Complex Gradients</a:t>
-            </a:r>
-          </a:p>
-          <a:p>
-            <a:pPr marL="0" indent="0">
-              <a:buNone/>
-            </a:pPr>
-            <a:endParaRPr lang="en-US" sz="3200" dirty="0">
-              <a:solidFill>
-                <a:schemeClr val="tx1">
-                  <a:lumMod val="75000"/>
-                  <a:lumOff val="25000"/>
-                </a:schemeClr>
-              </a:solidFill>
-              <a:latin typeface="Palatino Linotype" panose="02040502050505030304" pitchFamily="18" charset="0"/>
-            </a:endParaRPr>
-          </a:p>
-          <a:p>
-            <a:pPr>
-              <a:buFont typeface="Wingdings" panose="05000000000000000000" pitchFamily="2" charset="2"/>
-              <a:buChar char="Ø"/>
-            </a:pPr>
-            <a:r>
-              <a:rPr lang="en-US" sz="3200" dirty="0">
-                <a:solidFill>
-                  <a:schemeClr val="tx1">
-                    <a:lumMod val="75000"/>
-                    <a:lumOff val="25000"/>
-                  </a:schemeClr>
-                </a:solidFill>
-                <a:latin typeface="Palatino Linotype" panose="02040502050505030304" pitchFamily="18" charset="0"/>
-              </a:rPr>
-              <a:t> Optimizers</a:t>
-            </a:r>
-          </a:p>
-          <a:p>
-            <a:pPr marL="0" indent="0">
-              <a:buNone/>
-            </a:pPr>
-            <a:endParaRPr lang="en-US" sz="3200" dirty="0">
-              <a:solidFill>
-                <a:schemeClr val="tx1">
-                  <a:lumMod val="75000"/>
-                  <a:lumOff val="25000"/>
-                </a:schemeClr>
-              </a:solidFill>
-              <a:latin typeface="Palatino Linotype" panose="02040502050505030304" pitchFamily="18" charset="0"/>
-            </a:endParaRPr>
-          </a:p>
-          <a:p>
-            <a:pPr>
-              <a:buFont typeface="Wingdings" panose="05000000000000000000" pitchFamily="2" charset="2"/>
-              <a:buChar char="Ø"/>
-            </a:pPr>
-            <a:r>
-              <a:rPr lang="en-US" sz="3200" dirty="0">
-                <a:solidFill>
-                  <a:schemeClr val="tx1">
-                    <a:lumMod val="75000"/>
-                    <a:lumOff val="25000"/>
-                  </a:schemeClr>
-                </a:solidFill>
-                <a:latin typeface="Palatino Linotype" panose="02040502050505030304" pitchFamily="18" charset="0"/>
-              </a:rPr>
-              <a:t> Chain Rule</a:t>
-            </a:r>
-          </a:p>
-        </p:txBody>
-      </p:sp>
-      <p:sp>
-        <p:nvSpPr>
-          <p:cNvPr id="3" name="Title 4">
-            <a:extLst>
-              <a:ext uri="{FF2B5EF4-FFF2-40B4-BE49-F238E27FC236}">
-                <a16:creationId xmlns:a16="http://schemas.microsoft.com/office/drawing/2014/main" id="{8ADCD547-C091-45A4-9127-CC0044D81745}"/>
-              </a:ext>
-            </a:extLst>
-          </p:cNvPr>
-          <p:cNvSpPr>
-            <a:spLocks noGrp="1"/>
-          </p:cNvSpPr>
-          <p:nvPr>
-            <p:ph type="title"/>
-          </p:nvPr>
-        </p:nvSpPr>
-        <p:spPr>
-          <a:xfrm>
-            <a:off x="812802" y="365126"/>
-            <a:ext cx="10540998" cy="1325563"/>
-          </a:xfrm>
-        </p:spPr>
-        <p:txBody>
-          <a:bodyPr/>
-          <a:lstStyle/>
-          <a:p>
-            <a:pPr algn="ctr"/>
-            <a:r>
-              <a:rPr lang="en-US" dirty="0">
+            <a:r>
+              <a:rPr lang="en-US" sz="3600" dirty="0">
                 <a:solidFill>
                   <a:schemeClr val="tx1">
                     <a:lumMod val="65000"/>
@@ -9715,15 +9729,38 @@
                 </a:solidFill>
                 <a:latin typeface="Palatino Linotype" panose="02040502050505030304" pitchFamily="18" charset="0"/>
               </a:rPr>
-              <a:t>Summary</a:t>
-            </a:r>
+              <a:t>		2.06 (</a:t>
+            </a:r>
+            <a:r>
+              <a:rPr lang="en-US" sz="3600" b="0" i="0" dirty="0">
+                <a:solidFill>
+                  <a:schemeClr val="tx1">
+                    <a:lumMod val="65000"/>
+                    <a:lumOff val="35000"/>
+                  </a:schemeClr>
+                </a:solidFill>
+                <a:effectLst/>
+                <a:latin typeface="Palatino Linotype" panose="02040502050505030304" pitchFamily="18" charset="0"/>
+              </a:rPr>
+              <a:t>Multilayer Binary Classifier)</a:t>
+            </a:r>
+            <a:endParaRPr lang="en-US" sz="3600" dirty="0">
+              <a:solidFill>
+                <a:schemeClr val="tx1">
+                  <a:lumMod val="65000"/>
+                  <a:lumOff val="35000"/>
+                </a:schemeClr>
+              </a:solidFill>
+              <a:latin typeface="Palatino Linotype" panose="02040502050505030304" pitchFamily="18" charset="0"/>
+              <a:cs typeface="Segoe UI Light" panose="020B0502040204020203" pitchFamily="34" charset="0"/>
+            </a:endParaRPr>
           </a:p>
         </p:txBody>
       </p:sp>
     </p:spTree>
     <p:extLst>
       <p:ext uri="{BB962C8B-B14F-4D97-AF65-F5344CB8AC3E}">
-        <p14:creationId xmlns:p14="http://schemas.microsoft.com/office/powerpoint/2010/main" val="1397534281"/>
+        <p14:creationId xmlns:p14="http://schemas.microsoft.com/office/powerpoint/2010/main" val="994788979"/>
       </p:ext>
     </p:extLst>
   </p:cSld>
@@ -9910,7 +9947,7 @@
           <a:graphicData uri="http://schemas.openxmlformats.org/presentationml/2006/ole">
             <mc:AlternateContent xmlns:mc="http://schemas.openxmlformats.org/markup-compatibility/2006">
               <mc:Choice xmlns:v="urn:schemas-microsoft-com:vml" Requires="v">
-                <p:oleObj spid="_x0000_s1120" name="Visio" r:id="rId8" imgW="2514945" imgH="1657350" progId="Visio.Drawing.15">
+                <p:oleObj spid="_x0000_s1142" name="Visio" r:id="rId8" imgW="2514945" imgH="1657350" progId="Visio.Drawing.15">
                   <p:embed/>
                 </p:oleObj>
               </mc:Choice>

</xml_diff>

<commit_message>
Update 01.1 notebook to new look-and-feel.
</commit_message>
<xml_diff>
--- a/presentations/03_gradient_descent.pptx
+++ b/presentations/03_gradient_descent.pptx
@@ -5,7 +5,7 @@
     <p:sldMasterId id="2147483648" r:id="rId1"/>
   </p:sldMasterIdLst>
   <p:notesMasterIdLst>
-    <p:notesMasterId r:id="rId24"/>
+    <p:notesMasterId r:id="rId25"/>
   </p:notesMasterIdLst>
   <p:sldIdLst>
     <p:sldId id="322" r:id="rId2"/>
@@ -25,11 +25,12 @@
     <p:sldId id="331" r:id="rId16"/>
     <p:sldId id="330" r:id="rId17"/>
     <p:sldId id="311" r:id="rId18"/>
-    <p:sldId id="289" r:id="rId19"/>
-    <p:sldId id="328" r:id="rId20"/>
-    <p:sldId id="332" r:id="rId21"/>
-    <p:sldId id="305" r:id="rId22"/>
-    <p:sldId id="324" r:id="rId23"/>
+    <p:sldId id="333" r:id="rId19"/>
+    <p:sldId id="289" r:id="rId20"/>
+    <p:sldId id="328" r:id="rId21"/>
+    <p:sldId id="332" r:id="rId22"/>
+    <p:sldId id="305" r:id="rId23"/>
+    <p:sldId id="324" r:id="rId24"/>
   </p:sldIdLst>
   <p:sldSz cx="12192000" cy="6858000"/>
   <p:notesSz cx="6858000" cy="9144000"/>
@@ -229,7 +230,7 @@
           <a:p>
             <a:fld id="{FD93C9B2-20F6-4DB1-B471-224337D0AC79}" type="datetimeFigureOut">
               <a:rPr lang="en-US" smtClean="0"/>
-              <a:t>4/5/2022</a:t>
+              <a:t>4/6/2022</a:t>
             </a:fld>
             <a:endParaRPr lang="en-US"/>
           </a:p>
@@ -2077,16 +2078,17 @@
           <a:p>
             <a:r>
               <a:rPr lang="en-US" dirty="0"/>
-              <a:t>Well, we have covered a lot of territory in this presentation.  First, we discussed the loss function and a network’s </a:t>
-            </a:r>
-            <a:r>
-              <a:rPr lang="en-US" b="1" dirty="0"/>
-              <a:t>total error</a:t>
-            </a:r>
+              <a:t>chain_rule_animation.pptx</a:t>
+            </a:r>
+          </a:p>
+          <a:p>
             <a:r>
               <a:rPr lang="en-US" dirty="0"/>
-              <a:t>.  That was followed by an in-depth look at gradient descent and the use of partial differential equations to calculate the derivative or slope at a given point on the gradient.  We also learned that most loss functions exhibit complex contours, featuring hills, values, and plateaus, making it difficult to locate the global minimum.  And finally, I discussed how backpropagation employs the chain rule to determine the contribution of each weight to the total error in relation to the other weights.  </a:t>
-            </a:r>
+              <a:t>chain_rule_simulation.gif</a:t>
+            </a:r>
+          </a:p>
+          <a:p>
+            <a:endParaRPr lang="en-US" dirty="0"/>
           </a:p>
         </p:txBody>
       </p:sp>
@@ -2116,7 +2118,7 @@
     </p:spTree>
     <p:extLst>
       <p:ext uri="{BB962C8B-B14F-4D97-AF65-F5344CB8AC3E}">
-        <p14:creationId xmlns:p14="http://schemas.microsoft.com/office/powerpoint/2010/main" val="1690277211"/>
+        <p14:creationId xmlns:p14="http://schemas.microsoft.com/office/powerpoint/2010/main" val="3680858301"/>
       </p:ext>
     </p:extLst>
   </p:cSld>
@@ -2170,7 +2172,18 @@
           <a:bodyPr/>
           <a:lstStyle/>
           <a:p>
-            <a:endParaRPr lang="en-US" dirty="0"/>
+            <a:r>
+              <a:rPr lang="en-US" dirty="0"/>
+              <a:t>Well, we have covered a lot of territory in this presentation.  First, we discussed the loss function and a network’s </a:t>
+            </a:r>
+            <a:r>
+              <a:rPr lang="en-US" b="1" dirty="0"/>
+              <a:t>total error</a:t>
+            </a:r>
+            <a:r>
+              <a:rPr lang="en-US" dirty="0"/>
+              <a:t>.  That was followed by an in-depth look at gradient descent and the use of partial differential equations to calculate the derivative or slope at a given point on the gradient.  We also learned that most loss functions exhibit complex contours, featuring hills, values, and plateaus, making it difficult to locate the global minimum.  And finally, I discussed how backpropagation employs the chain rule to determine the contribution of each weight to the total error in relation to the other weights.  </a:t>
+            </a:r>
           </a:p>
         </p:txBody>
       </p:sp>
@@ -2200,7 +2213,7 @@
     </p:spTree>
     <p:extLst>
       <p:ext uri="{BB962C8B-B14F-4D97-AF65-F5344CB8AC3E}">
-        <p14:creationId xmlns:p14="http://schemas.microsoft.com/office/powerpoint/2010/main" val="3213588290"/>
+        <p14:creationId xmlns:p14="http://schemas.microsoft.com/office/powerpoint/2010/main" val="1690277211"/>
       </p:ext>
     </p:extLst>
   </p:cSld>
@@ -2637,7 +2650,7 @@
     </p:spTree>
     <p:extLst>
       <p:ext uri="{BB962C8B-B14F-4D97-AF65-F5344CB8AC3E}">
-        <p14:creationId xmlns:p14="http://schemas.microsoft.com/office/powerpoint/2010/main" val="372051230"/>
+        <p14:creationId xmlns:p14="http://schemas.microsoft.com/office/powerpoint/2010/main" val="3213588290"/>
       </p:ext>
     </p:extLst>
   </p:cSld>
@@ -2691,104 +2704,7 @@
           <a:bodyPr/>
           <a:lstStyle/>
           <a:p>
-            <a:pPr algn="l"/>
-            <a:r>
-              <a:rPr lang="en-US" sz="1800" b="0" i="1" u="none" strike="noStrike" baseline="0" dirty="0">
-                <a:solidFill>
-                  <a:srgbClr val="000000"/>
-                </a:solidFill>
-                <a:latin typeface="+mn-lt"/>
-              </a:rPr>
-              <a:t>Gradient Descent </a:t>
-            </a:r>
-            <a:r>
-              <a:rPr lang="en-US" sz="1800" b="0" i="0" u="none" strike="noStrike" baseline="0" dirty="0">
-                <a:solidFill>
-                  <a:srgbClr val="000000"/>
-                </a:solidFill>
-                <a:latin typeface="+mn-lt"/>
-              </a:rPr>
-              <a:t>is a generic optimization algorithm capable of finding optimal solutions to a wide range of problems. The general idea of Gradient Descent is to tweak parameters (weights) iteratively in order to minimize a cost function. Suppose you are lost in the mountains in a dense fog, and you can only feel the slope of the ground below your feet. A good strategy to get to the bottom of the valley quickly is to go downhill in the direction of the steepest slope. This is exactly what Gradient Descent does: it measures the local gradient of the error function with regard to each weight in the network, and it goes in the direction of descending gradient.  Weights are often combined into a parameter vector </a:t>
-            </a:r>
-            <a:r>
-              <a:rPr lang="en-US" sz="1800" b="1" i="0" u="none" strike="noStrike" baseline="0" dirty="0">
-                <a:solidFill>
-                  <a:srgbClr val="000000"/>
-                </a:solidFill>
-                <a:latin typeface="+mn-lt"/>
-              </a:rPr>
-              <a:t>θ, </a:t>
-            </a:r>
-            <a:r>
-              <a:rPr lang="en-US" sz="1800" b="0" i="0" u="none" strike="noStrike" baseline="0" dirty="0">
-                <a:solidFill>
-                  <a:srgbClr val="000000"/>
-                </a:solidFill>
-                <a:latin typeface="+mn-lt"/>
-              </a:rPr>
-              <a:t>pictured here at the Minimum.  Once the gradient is zero, you have reached a minimum!  Concretely, you start by filling </a:t>
-            </a:r>
-            <a:r>
-              <a:rPr lang="en-US" sz="1800" b="1" i="0" u="none" strike="noStrike" baseline="0" dirty="0">
-                <a:solidFill>
-                  <a:srgbClr val="000000"/>
-                </a:solidFill>
-                <a:latin typeface="+mn-lt"/>
-              </a:rPr>
-              <a:t>θ </a:t>
-            </a:r>
-            <a:r>
-              <a:rPr lang="en-US" sz="1800" b="0" i="0" u="none" strike="noStrike" baseline="0" dirty="0">
-                <a:solidFill>
-                  <a:srgbClr val="000000"/>
-                </a:solidFill>
-                <a:latin typeface="+mn-lt"/>
-              </a:rPr>
-              <a:t>with random values (this is called </a:t>
-            </a:r>
-            <a:r>
-              <a:rPr lang="en-US" sz="1800" b="0" i="1" u="none" strike="noStrike" baseline="0" dirty="0">
-                <a:solidFill>
-                  <a:srgbClr val="000000"/>
-                </a:solidFill>
-                <a:latin typeface="+mn-lt"/>
-              </a:rPr>
-              <a:t>random initialization</a:t>
-            </a:r>
-            <a:r>
-              <a:rPr lang="en-US" sz="1800" b="0" i="0" u="none" strike="noStrike" baseline="0" dirty="0">
-                <a:solidFill>
-                  <a:srgbClr val="000000"/>
-                </a:solidFill>
-                <a:latin typeface="+mn-lt"/>
-              </a:rPr>
-              <a:t>). Then you improve it gradually, taking one baby step at a time, each step attempting to decrease the cost function (e.g., the MSE), until the algorithm </a:t>
-            </a:r>
-            <a:r>
-              <a:rPr lang="en-US" sz="1800" b="0" i="1" u="none" strike="noStrike" baseline="0" dirty="0">
-                <a:solidFill>
-                  <a:srgbClr val="000000"/>
-                </a:solidFill>
-                <a:latin typeface="+mn-lt"/>
-              </a:rPr>
-              <a:t>converges </a:t>
-            </a:r>
-            <a:r>
-              <a:rPr lang="en-US" sz="1800" b="0" i="0" u="none" strike="noStrike" baseline="0" dirty="0">
-                <a:solidFill>
-                  <a:srgbClr val="000000"/>
-                </a:solidFill>
-                <a:latin typeface="+mn-lt"/>
-              </a:rPr>
-              <a:t>to a minimum.</a:t>
-            </a:r>
-            <a:endParaRPr lang="en-US" b="0" i="0" dirty="0">
-              <a:solidFill>
-                <a:srgbClr val="3C3C3B"/>
-              </a:solidFill>
-              <a:effectLst/>
-              <a:latin typeface="+mn-lt"/>
-            </a:endParaRPr>
+            <a:endParaRPr lang="en-US" dirty="0"/>
           </a:p>
         </p:txBody>
       </p:sp>
@@ -2818,7 +2734,7 @@
     </p:spTree>
     <p:extLst>
       <p:ext uri="{BB962C8B-B14F-4D97-AF65-F5344CB8AC3E}">
-        <p14:creationId xmlns:p14="http://schemas.microsoft.com/office/powerpoint/2010/main" val="1199395141"/>
+        <p14:creationId xmlns:p14="http://schemas.microsoft.com/office/powerpoint/2010/main" val="372051230"/>
       </p:ext>
     </p:extLst>
   </p:cSld>
@@ -2872,6 +2788,187 @@
           <a:bodyPr/>
           <a:lstStyle/>
           <a:p>
+            <a:pPr algn="l"/>
+            <a:r>
+              <a:rPr lang="en-US" sz="1800" b="0" i="1" u="none" strike="noStrike" baseline="0" dirty="0">
+                <a:solidFill>
+                  <a:srgbClr val="000000"/>
+                </a:solidFill>
+                <a:latin typeface="+mn-lt"/>
+              </a:rPr>
+              <a:t>Gradient Descent </a:t>
+            </a:r>
+            <a:r>
+              <a:rPr lang="en-US" sz="1800" b="0" i="0" u="none" strike="noStrike" baseline="0" dirty="0">
+                <a:solidFill>
+                  <a:srgbClr val="000000"/>
+                </a:solidFill>
+                <a:latin typeface="+mn-lt"/>
+              </a:rPr>
+              <a:t>is a generic optimization algorithm capable of finding optimal solutions to a wide range of problems. The general idea of Gradient Descent is to tweak parameters (weights) iteratively in order to minimize a cost function. Suppose you are lost in the mountains in a dense fog, and you can only feel the slope of the ground below your feet. A good strategy to get to the bottom of the valley quickly is to go downhill in the direction of the steepest slope. This is exactly what Gradient Descent does: it measures the local gradient of the error function with regard to each weight in the network, and it goes in the direction of descending gradient.  Weights are often combined into a parameter vector </a:t>
+            </a:r>
+            <a:r>
+              <a:rPr lang="en-US" sz="1800" b="1" i="0" u="none" strike="noStrike" baseline="0" dirty="0">
+                <a:solidFill>
+                  <a:srgbClr val="000000"/>
+                </a:solidFill>
+                <a:latin typeface="+mn-lt"/>
+              </a:rPr>
+              <a:t>θ, </a:t>
+            </a:r>
+            <a:r>
+              <a:rPr lang="en-US" sz="1800" b="0" i="0" u="none" strike="noStrike" baseline="0" dirty="0">
+                <a:solidFill>
+                  <a:srgbClr val="000000"/>
+                </a:solidFill>
+                <a:latin typeface="+mn-lt"/>
+              </a:rPr>
+              <a:t>pictured here at the Minimum.  Once the gradient is zero, you have reached a minimum!  Concretely, you start by filling </a:t>
+            </a:r>
+            <a:r>
+              <a:rPr lang="en-US" sz="1800" b="1" i="0" u="none" strike="noStrike" baseline="0" dirty="0">
+                <a:solidFill>
+                  <a:srgbClr val="000000"/>
+                </a:solidFill>
+                <a:latin typeface="+mn-lt"/>
+              </a:rPr>
+              <a:t>θ </a:t>
+            </a:r>
+            <a:r>
+              <a:rPr lang="en-US" sz="1800" b="0" i="0" u="none" strike="noStrike" baseline="0" dirty="0">
+                <a:solidFill>
+                  <a:srgbClr val="000000"/>
+                </a:solidFill>
+                <a:latin typeface="+mn-lt"/>
+              </a:rPr>
+              <a:t>with random values (this is called </a:t>
+            </a:r>
+            <a:r>
+              <a:rPr lang="en-US" sz="1800" b="0" i="1" u="none" strike="noStrike" baseline="0" dirty="0">
+                <a:solidFill>
+                  <a:srgbClr val="000000"/>
+                </a:solidFill>
+                <a:latin typeface="+mn-lt"/>
+              </a:rPr>
+              <a:t>random initialization</a:t>
+            </a:r>
+            <a:r>
+              <a:rPr lang="en-US" sz="1800" b="0" i="0" u="none" strike="noStrike" baseline="0" dirty="0">
+                <a:solidFill>
+                  <a:srgbClr val="000000"/>
+                </a:solidFill>
+                <a:latin typeface="+mn-lt"/>
+              </a:rPr>
+              <a:t>). Then you improve it gradually, taking one baby step at a time, each step attempting to decrease the cost function (e.g., the MSE), until the algorithm </a:t>
+            </a:r>
+            <a:r>
+              <a:rPr lang="en-US" sz="1800" b="0" i="1" u="none" strike="noStrike" baseline="0" dirty="0">
+                <a:solidFill>
+                  <a:srgbClr val="000000"/>
+                </a:solidFill>
+                <a:latin typeface="+mn-lt"/>
+              </a:rPr>
+              <a:t>converges </a:t>
+            </a:r>
+            <a:r>
+              <a:rPr lang="en-US" sz="1800" b="0" i="0" u="none" strike="noStrike" baseline="0" dirty="0">
+                <a:solidFill>
+                  <a:srgbClr val="000000"/>
+                </a:solidFill>
+                <a:latin typeface="+mn-lt"/>
+              </a:rPr>
+              <a:t>to a minimum.</a:t>
+            </a:r>
+            <a:endParaRPr lang="en-US" b="0" i="0" dirty="0">
+              <a:solidFill>
+                <a:srgbClr val="3C3C3B"/>
+              </a:solidFill>
+              <a:effectLst/>
+              <a:latin typeface="+mn-lt"/>
+            </a:endParaRPr>
+          </a:p>
+        </p:txBody>
+      </p:sp>
+      <p:sp>
+        <p:nvSpPr>
+          <p:cNvPr id="4" name="Slide Number Placeholder 3"/>
+          <p:cNvSpPr>
+            <a:spLocks noGrp="1"/>
+          </p:cNvSpPr>
+          <p:nvPr>
+            <p:ph type="sldNum" sz="quarter" idx="5"/>
+          </p:nvPr>
+        </p:nvSpPr>
+        <p:spPr/>
+        <p:txBody>
+          <a:bodyPr/>
+          <a:lstStyle/>
+          <a:p>
+            <a:fld id="{3148858F-F1DB-4027-9C85-CCA6849540DD}" type="slidenum">
+              <a:rPr lang="en-US" smtClean="0"/>
+              <a:t>22</a:t>
+            </a:fld>
+            <a:endParaRPr lang="en-US"/>
+          </a:p>
+        </p:txBody>
+      </p:sp>
+    </p:spTree>
+    <p:extLst>
+      <p:ext uri="{BB962C8B-B14F-4D97-AF65-F5344CB8AC3E}">
+        <p14:creationId xmlns:p14="http://schemas.microsoft.com/office/powerpoint/2010/main" val="1199395141"/>
+      </p:ext>
+    </p:extLst>
+  </p:cSld>
+  <p:clrMapOvr>
+    <a:masterClrMapping/>
+  </p:clrMapOvr>
+</p:notes>
+</file>
+
+<file path=ppt/notesSlides/notesSlide23.xml><?xml version="1.0" encoding="utf-8"?>
+<p:notes xmlns:a="http://schemas.openxmlformats.org/drawingml/2006/main" xmlns:r="http://schemas.openxmlformats.org/officeDocument/2006/relationships" xmlns:p="http://schemas.openxmlformats.org/presentationml/2006/main">
+  <p:cSld>
+    <p:spTree>
+      <p:nvGrpSpPr>
+        <p:cNvPr id="1" name=""/>
+        <p:cNvGrpSpPr/>
+        <p:nvPr/>
+      </p:nvGrpSpPr>
+      <p:grpSpPr>
+        <a:xfrm>
+          <a:off x="0" y="0"/>
+          <a:ext cx="0" cy="0"/>
+          <a:chOff x="0" y="0"/>
+          <a:chExt cx="0" cy="0"/>
+        </a:xfrm>
+      </p:grpSpPr>
+      <p:sp>
+        <p:nvSpPr>
+          <p:cNvPr id="2" name="Slide Image Placeholder 1"/>
+          <p:cNvSpPr>
+            <a:spLocks noGrp="1" noRot="1" noChangeAspect="1"/>
+          </p:cNvSpPr>
+          <p:nvPr>
+            <p:ph type="sldImg"/>
+          </p:nvPr>
+        </p:nvSpPr>
+        <p:spPr/>
+      </p:sp>
+      <p:sp>
+        <p:nvSpPr>
+          <p:cNvPr id="3" name="Notes Placeholder 2"/>
+          <p:cNvSpPr>
+            <a:spLocks noGrp="1"/>
+          </p:cNvSpPr>
+          <p:nvPr>
+            <p:ph type="body" idx="1"/>
+          </p:nvPr>
+        </p:nvSpPr>
+        <p:spPr/>
+        <p:txBody>
+          <a:bodyPr/>
+          <a:lstStyle/>
+          <a:p>
             <a:pPr marL="0" marR="0" lvl="0" indent="0" algn="l" defTabSz="914400" rtl="0" eaLnBrk="1" fontAlgn="auto" latinLnBrk="0" hangingPunct="1">
               <a:lnSpc>
                 <a:spcPct val="100000"/>
@@ -3075,7 +3172,7 @@
           <a:p>
             <a:fld id="{3148858F-F1DB-4027-9C85-CCA6849540DD}" type="slidenum">
               <a:rPr lang="en-US" smtClean="0"/>
-              <a:t>22</a:t>
+              <a:t>23</a:t>
             </a:fld>
             <a:endParaRPr lang="en-US"/>
           </a:p>
@@ -4270,7 +4367,7 @@
           <a:p>
             <a:fld id="{C3F78080-8D0A-4BE8-A5B4-CB115102D524}" type="datetimeFigureOut">
               <a:rPr lang="en-US" smtClean="0"/>
-              <a:t>4/5/2022</a:t>
+              <a:t>4/6/2022</a:t>
             </a:fld>
             <a:endParaRPr lang="en-US"/>
           </a:p>
@@ -4468,7 +4565,7 @@
           <a:p>
             <a:fld id="{C3F78080-8D0A-4BE8-A5B4-CB115102D524}" type="datetimeFigureOut">
               <a:rPr lang="en-US" smtClean="0"/>
-              <a:t>4/5/2022</a:t>
+              <a:t>4/6/2022</a:t>
             </a:fld>
             <a:endParaRPr lang="en-US"/>
           </a:p>
@@ -4676,7 +4773,7 @@
           <a:p>
             <a:fld id="{C3F78080-8D0A-4BE8-A5B4-CB115102D524}" type="datetimeFigureOut">
               <a:rPr lang="en-US" smtClean="0"/>
-              <a:t>4/5/2022</a:t>
+              <a:t>4/6/2022</a:t>
             </a:fld>
             <a:endParaRPr lang="en-US"/>
           </a:p>
@@ -4874,7 +4971,7 @@
           <a:p>
             <a:fld id="{C3F78080-8D0A-4BE8-A5B4-CB115102D524}" type="datetimeFigureOut">
               <a:rPr lang="en-US" smtClean="0"/>
-              <a:t>4/5/2022</a:t>
+              <a:t>4/6/2022</a:t>
             </a:fld>
             <a:endParaRPr lang="en-US"/>
           </a:p>
@@ -5149,7 +5246,7 @@
           <a:p>
             <a:fld id="{C3F78080-8D0A-4BE8-A5B4-CB115102D524}" type="datetimeFigureOut">
               <a:rPr lang="en-US" smtClean="0"/>
-              <a:t>4/5/2022</a:t>
+              <a:t>4/6/2022</a:t>
             </a:fld>
             <a:endParaRPr lang="en-US"/>
           </a:p>
@@ -5414,7 +5511,7 @@
           <a:p>
             <a:fld id="{C3F78080-8D0A-4BE8-A5B4-CB115102D524}" type="datetimeFigureOut">
               <a:rPr lang="en-US" smtClean="0"/>
-              <a:t>4/5/2022</a:t>
+              <a:t>4/6/2022</a:t>
             </a:fld>
             <a:endParaRPr lang="en-US"/>
           </a:p>
@@ -5826,7 +5923,7 @@
           <a:p>
             <a:fld id="{C3F78080-8D0A-4BE8-A5B4-CB115102D524}" type="datetimeFigureOut">
               <a:rPr lang="en-US" smtClean="0"/>
-              <a:t>4/5/2022</a:t>
+              <a:t>4/6/2022</a:t>
             </a:fld>
             <a:endParaRPr lang="en-US"/>
           </a:p>
@@ -5967,7 +6064,7 @@
           <a:p>
             <a:fld id="{C3F78080-8D0A-4BE8-A5B4-CB115102D524}" type="datetimeFigureOut">
               <a:rPr lang="en-US" smtClean="0"/>
-              <a:t>4/5/2022</a:t>
+              <a:t>4/6/2022</a:t>
             </a:fld>
             <a:endParaRPr lang="en-US"/>
           </a:p>
@@ -6080,7 +6177,7 @@
           <a:p>
             <a:fld id="{C3F78080-8D0A-4BE8-A5B4-CB115102D524}" type="datetimeFigureOut">
               <a:rPr lang="en-US" smtClean="0"/>
-              <a:t>4/5/2022</a:t>
+              <a:t>4/6/2022</a:t>
             </a:fld>
             <a:endParaRPr lang="en-US"/>
           </a:p>
@@ -6391,7 +6488,7 @@
           <a:p>
             <a:fld id="{C3F78080-8D0A-4BE8-A5B4-CB115102D524}" type="datetimeFigureOut">
               <a:rPr lang="en-US" smtClean="0"/>
-              <a:t>4/5/2022</a:t>
+              <a:t>4/6/2022</a:t>
             </a:fld>
             <a:endParaRPr lang="en-US"/>
           </a:p>
@@ -6679,7 +6776,7 @@
           <a:p>
             <a:fld id="{C3F78080-8D0A-4BE8-A5B4-CB115102D524}" type="datetimeFigureOut">
               <a:rPr lang="en-US" smtClean="0"/>
-              <a:t>4/5/2022</a:t>
+              <a:t>4/6/2022</a:t>
             </a:fld>
             <a:endParaRPr lang="en-US"/>
           </a:p>
@@ -6920,7 +7017,7 @@
           <a:p>
             <a:fld id="{C3F78080-8D0A-4BE8-A5B4-CB115102D524}" type="datetimeFigureOut">
               <a:rPr lang="en-US" smtClean="0"/>
-              <a:t>4/5/2022</a:t>
+              <a:t>4/6/2022</a:t>
             </a:fld>
             <a:endParaRPr lang="en-US"/>
           </a:p>
@@ -9507,219 +9604,55 @@
       </p:grpSpPr>
       <p:sp>
         <p:nvSpPr>
-          <p:cNvPr id="5" name="Content Placeholder 4">
+          <p:cNvPr id="2" name="Title 1">
             <a:extLst>
               <a:ext uri="{FF2B5EF4-FFF2-40B4-BE49-F238E27FC236}">
-                <a16:creationId xmlns:a16="http://schemas.microsoft.com/office/drawing/2014/main" id="{7C82B2FA-DB39-467C-9DC1-245874DCBCF1}"/>
+                <a16:creationId xmlns:a16="http://schemas.microsoft.com/office/drawing/2014/main" id="{8E6BAAA1-9306-4CE5-9DB4-B02103B5C105}"/>
               </a:ext>
             </a:extLst>
           </p:cNvPr>
-          <p:cNvSpPr>
-            <a:spLocks noGrp="1"/>
-          </p:cNvSpPr>
-          <p:nvPr>
-            <p:ph idx="1"/>
-          </p:nvPr>
+          <p:cNvSpPr txBox="1">
+            <a:spLocks/>
+          </p:cNvSpPr>
+          <p:nvPr/>
         </p:nvSpPr>
         <p:spPr>
           <a:xfrm>
-            <a:off x="812801" y="1386840"/>
-            <a:ext cx="10540999" cy="4790124"/>
+            <a:off x="0" y="2883665"/>
+            <a:ext cx="12192000" cy="1365606"/>
           </a:xfrm>
+          <a:prstGeom prst="rect">
+            <a:avLst/>
+          </a:prstGeom>
+          <a:noFill/>
         </p:spPr>
         <p:txBody>
-          <a:bodyPr>
-            <a:normAutofit fontScale="92500" lnSpcReduction="20000"/>
+          <a:bodyPr vert="horz" lIns="91440" tIns="45720" rIns="91440" bIns="45720" rtlCol="0" anchor="b">
+            <a:noAutofit/>
           </a:bodyPr>
-          <a:lstStyle/>
-          <a:p>
-            <a:pPr marL="0" indent="0">
+          <a:lstStyle>
+            <a:lvl1pPr algn="l" defTabSz="914400" rtl="0" eaLnBrk="1" latinLnBrk="0" hangingPunct="1">
+              <a:lnSpc>
+                <a:spcPct val="90000"/>
+              </a:lnSpc>
+              <a:spcBef>
+                <a:spcPct val="0"/>
+              </a:spcBef>
               <a:buNone/>
-            </a:pPr>
-            <a:endParaRPr lang="en-US" sz="3200" dirty="0">
-              <a:latin typeface="Palatino Linotype" panose="02040502050505030304" pitchFamily="18" charset="0"/>
-            </a:endParaRPr>
-          </a:p>
-          <a:p>
-            <a:pPr>
-              <a:buFont typeface="Wingdings" panose="05000000000000000000" pitchFamily="2" charset="2"/>
-              <a:buChar char="Ø"/>
-            </a:pPr>
-            <a:r>
-              <a:rPr lang="en-US" sz="3200" dirty="0">
-                <a:solidFill>
-                  <a:schemeClr val="tx1">
-                    <a:lumMod val="75000"/>
-                    <a:lumOff val="25000"/>
-                  </a:schemeClr>
-                </a:solidFill>
-                <a:latin typeface="Palatino Linotype" panose="02040502050505030304" pitchFamily="18" charset="0"/>
-              </a:rPr>
-              <a:t> Error (Loss) Function</a:t>
-            </a:r>
-          </a:p>
-          <a:p>
-            <a:pPr marL="0" indent="0">
-              <a:buNone/>
-            </a:pPr>
-            <a:endParaRPr lang="en-US" sz="3200" dirty="0">
-              <a:solidFill>
-                <a:schemeClr val="tx1">
-                  <a:lumMod val="75000"/>
-                  <a:lumOff val="25000"/>
-                </a:schemeClr>
-              </a:solidFill>
-              <a:latin typeface="Palatino Linotype" panose="02040502050505030304" pitchFamily="18" charset="0"/>
-            </a:endParaRPr>
-          </a:p>
-          <a:p>
-            <a:pPr>
-              <a:buFont typeface="Wingdings" panose="05000000000000000000" pitchFamily="2" charset="2"/>
-              <a:buChar char="Ø"/>
-            </a:pPr>
-            <a:r>
-              <a:rPr lang="en-US" sz="3200" dirty="0">
-                <a:solidFill>
-                  <a:schemeClr val="tx1">
-                    <a:lumMod val="75000"/>
-                    <a:lumOff val="25000"/>
-                  </a:schemeClr>
-                </a:solidFill>
-                <a:latin typeface="Palatino Linotype" panose="02040502050505030304" pitchFamily="18" charset="0"/>
-              </a:rPr>
-              <a:t> Gradient Descent &amp; Partial Derivatives</a:t>
-            </a:r>
-          </a:p>
-          <a:p>
-            <a:pPr marL="0" indent="0">
-              <a:buNone/>
-            </a:pPr>
-            <a:r>
-              <a:rPr lang="en-US" sz="3200" dirty="0">
-                <a:solidFill>
-                  <a:schemeClr val="tx1">
-                    <a:lumMod val="75000"/>
-                    <a:lumOff val="25000"/>
-                  </a:schemeClr>
-                </a:solidFill>
-                <a:latin typeface="Palatino Linotype" panose="02040502050505030304" pitchFamily="18" charset="0"/>
-              </a:rPr>
-              <a:t> </a:t>
-            </a:r>
-          </a:p>
-          <a:p>
-            <a:pPr>
-              <a:buFont typeface="Wingdings" panose="05000000000000000000" pitchFamily="2" charset="2"/>
-              <a:buChar char="Ø"/>
-            </a:pPr>
-            <a:r>
-              <a:rPr lang="en-US" sz="3200" dirty="0">
-                <a:solidFill>
-                  <a:schemeClr val="tx1">
-                    <a:lumMod val="75000"/>
-                    <a:lumOff val="25000"/>
-                  </a:schemeClr>
-                </a:solidFill>
-                <a:latin typeface="Palatino Linotype" panose="02040502050505030304" pitchFamily="18" charset="0"/>
-              </a:rPr>
-              <a:t> Complex Gradients</a:t>
-            </a:r>
-          </a:p>
-          <a:p>
-            <a:pPr marL="0" indent="0">
-              <a:buNone/>
-            </a:pPr>
-            <a:endParaRPr lang="en-US" sz="3200" dirty="0">
-              <a:solidFill>
-                <a:schemeClr val="tx1">
-                  <a:lumMod val="75000"/>
-                  <a:lumOff val="25000"/>
-                </a:schemeClr>
-              </a:solidFill>
-              <a:latin typeface="Palatino Linotype" panose="02040502050505030304" pitchFamily="18" charset="0"/>
-            </a:endParaRPr>
-          </a:p>
-          <a:p>
-            <a:pPr>
-              <a:buFont typeface="Wingdings" panose="05000000000000000000" pitchFamily="2" charset="2"/>
-              <a:buChar char="Ø"/>
-            </a:pPr>
-            <a:r>
-              <a:rPr lang="en-US" sz="3200" dirty="0">
-                <a:solidFill>
-                  <a:schemeClr val="tx1">
-                    <a:lumMod val="75000"/>
-                    <a:lumOff val="25000"/>
-                  </a:schemeClr>
-                </a:solidFill>
-                <a:latin typeface="Palatino Linotype" panose="02040502050505030304" pitchFamily="18" charset="0"/>
-              </a:rPr>
-              <a:t> Optimizers</a:t>
-            </a:r>
-          </a:p>
-          <a:p>
-            <a:pPr marL="0" indent="0">
-              <a:buNone/>
-            </a:pPr>
-            <a:endParaRPr lang="en-US" sz="3200" dirty="0">
-              <a:solidFill>
-                <a:schemeClr val="tx1">
-                  <a:lumMod val="75000"/>
-                  <a:lumOff val="25000"/>
-                </a:schemeClr>
-              </a:solidFill>
-              <a:latin typeface="Palatino Linotype" panose="02040502050505030304" pitchFamily="18" charset="0"/>
-            </a:endParaRPr>
-          </a:p>
-          <a:p>
-            <a:pPr>
-              <a:buFont typeface="Wingdings" panose="05000000000000000000" pitchFamily="2" charset="2"/>
-              <a:buChar char="Ø"/>
-            </a:pPr>
-            <a:r>
-              <a:rPr lang="en-US" sz="3200" dirty="0">
-                <a:solidFill>
-                  <a:schemeClr val="tx1">
-                    <a:lumMod val="75000"/>
-                    <a:lumOff val="25000"/>
-                  </a:schemeClr>
-                </a:solidFill>
-                <a:latin typeface="Palatino Linotype" panose="02040502050505030304" pitchFamily="18" charset="0"/>
-              </a:rPr>
-              <a:t> Chain Rule</a:t>
-            </a:r>
-          </a:p>
-        </p:txBody>
-      </p:sp>
-      <p:sp>
-        <p:nvSpPr>
-          <p:cNvPr id="3" name="Title 4">
-            <a:extLst>
-              <a:ext uri="{FF2B5EF4-FFF2-40B4-BE49-F238E27FC236}">
-                <a16:creationId xmlns:a16="http://schemas.microsoft.com/office/drawing/2014/main" id="{8ADCD547-C091-45A4-9127-CC0044D81745}"/>
-              </a:ext>
-            </a:extLst>
-          </p:cNvPr>
-          <p:cNvSpPr>
-            <a:spLocks noGrp="1"/>
-          </p:cNvSpPr>
-          <p:nvPr>
-            <p:ph type="title"/>
-          </p:nvPr>
-        </p:nvSpPr>
-        <p:spPr>
-          <a:xfrm>
-            <a:off x="812802" y="365126"/>
-            <a:ext cx="10540998" cy="1325563"/>
-          </a:xfrm>
-        </p:spPr>
-        <p:txBody>
-          <a:bodyPr/>
-          <a:lstStyle/>
+              <a:defRPr sz="6000" kern="1200">
+                <a:solidFill>
+                  <a:schemeClr val="tx1"/>
+                </a:solidFill>
+                <a:latin typeface="+mj-lt"/>
+                <a:ea typeface="+mj-ea"/>
+                <a:cs typeface="+mj-cs"/>
+              </a:defRPr>
+            </a:lvl1pPr>
+          </a:lstStyle>
           <a:p>
             <a:pPr algn="ctr"/>
-            <a:r>
-              <a:rPr lang="en-US" dirty="0">
+            <a:br>
+              <a:rPr lang="en-US" sz="3600" dirty="0">
                 <a:solidFill>
                   <a:schemeClr val="tx1">
                     <a:lumMod val="65000"/>
@@ -9728,15 +9661,116 @@
                 </a:solidFill>
                 <a:latin typeface="Palatino Linotype" panose="02040502050505030304" pitchFamily="18" charset="0"/>
               </a:rPr>
-              <a:t>Summary</a:t>
-            </a:r>
+            </a:br>
+            <a:br>
+              <a:rPr lang="en-US" sz="3600" dirty="0">
+                <a:solidFill>
+                  <a:schemeClr val="tx1">
+                    <a:lumMod val="65000"/>
+                    <a:lumOff val="35000"/>
+                  </a:schemeClr>
+                </a:solidFill>
+                <a:latin typeface="Palatino Linotype" panose="02040502050505030304" pitchFamily="18" charset="0"/>
+              </a:rPr>
+            </a:br>
+            <a:br>
+              <a:rPr lang="en-US" sz="3600" dirty="0">
+                <a:solidFill>
+                  <a:schemeClr val="tx1">
+                    <a:lumMod val="65000"/>
+                    <a:lumOff val="35000"/>
+                  </a:schemeClr>
+                </a:solidFill>
+                <a:latin typeface="Palatino Linotype" panose="02040502050505030304" pitchFamily="18" charset="0"/>
+              </a:rPr>
+            </a:br>
+            <a:br>
+              <a:rPr lang="en-US" sz="3600" dirty="0">
+                <a:solidFill>
+                  <a:schemeClr val="tx1">
+                    <a:lumMod val="65000"/>
+                    <a:lumOff val="35000"/>
+                  </a:schemeClr>
+                </a:solidFill>
+                <a:latin typeface="Palatino Linotype" panose="02040502050505030304" pitchFamily="18" charset="0"/>
+              </a:rPr>
+            </a:br>
+            <a:br>
+              <a:rPr lang="en-US" sz="3600" dirty="0">
+                <a:solidFill>
+                  <a:schemeClr val="tx1">
+                    <a:lumMod val="65000"/>
+                    <a:lumOff val="35000"/>
+                  </a:schemeClr>
+                </a:solidFill>
+                <a:latin typeface="Palatino Linotype" panose="02040502050505030304" pitchFamily="18" charset="0"/>
+              </a:rPr>
+            </a:br>
+            <a:br>
+              <a:rPr lang="en-US" sz="3600" dirty="0">
+                <a:solidFill>
+                  <a:schemeClr val="tx1">
+                    <a:lumMod val="65000"/>
+                    <a:lumOff val="35000"/>
+                  </a:schemeClr>
+                </a:solidFill>
+                <a:latin typeface="Palatino Linotype" panose="02040502050505030304" pitchFamily="18" charset="0"/>
+              </a:rPr>
+            </a:br>
+            <a:br>
+              <a:rPr lang="en-US" sz="3600" dirty="0">
+                <a:solidFill>
+                  <a:schemeClr val="tx1">
+                    <a:lumMod val="65000"/>
+                    <a:lumOff val="35000"/>
+                  </a:schemeClr>
+                </a:solidFill>
+                <a:latin typeface="Palatino Linotype" panose="02040502050505030304" pitchFamily="18" charset="0"/>
+              </a:rPr>
+            </a:br>
+            <a:br>
+              <a:rPr lang="en-US" sz="3600" dirty="0">
+                <a:solidFill>
+                  <a:schemeClr val="tx1">
+                    <a:lumMod val="65000"/>
+                    <a:lumOff val="35000"/>
+                  </a:schemeClr>
+                </a:solidFill>
+                <a:latin typeface="Palatino Linotype" panose="02040502050505030304" pitchFamily="18" charset="0"/>
+              </a:rPr>
+            </a:br>
+            <a:r>
+              <a:rPr lang="en-US" sz="3600" dirty="0">
+                <a:solidFill>
+                  <a:schemeClr val="tx1">
+                    <a:lumMod val="65000"/>
+                    <a:lumOff val="35000"/>
+                  </a:schemeClr>
+                </a:solidFill>
+                <a:latin typeface="Palatino Linotype" panose="02040502050505030304" pitchFamily="18" charset="0"/>
+              </a:rPr>
+              <a:t>Add Gradient Descent Simulation</a:t>
+            </a:r>
+          </a:p>
+          <a:p>
+            <a:pPr algn="ctr"/>
+            <a:endParaRPr lang="en-US" sz="2800" dirty="0">
+              <a:solidFill>
+                <a:schemeClr val="tx1">
+                  <a:lumMod val="65000"/>
+                  <a:lumOff val="35000"/>
+                </a:schemeClr>
+              </a:solidFill>
+              <a:latin typeface="Palatino Linotype" panose="02040502050505030304" pitchFamily="18" charset="0"/>
+              <a:cs typeface="Segoe UI Light" panose="020B0502040204020203" pitchFamily="34" charset="0"/>
+            </a:endParaRPr>
           </a:p>
         </p:txBody>
       </p:sp>
     </p:spTree>
     <p:extLst>
       <p:ext uri="{BB962C8B-B14F-4D97-AF65-F5344CB8AC3E}">
-        <p14:creationId xmlns:p14="http://schemas.microsoft.com/office/powerpoint/2010/main" val="1397534281"/>
+        <p14:creationId xmlns:p14="http://schemas.microsoft.com/office/powerpoint/2010/main" val="2131189601"/>
       </p:ext>
     </p:extLst>
   </p:cSld>
@@ -9775,10 +9809,238 @@
           <a:chExt cx="0" cy="0"/>
         </a:xfrm>
       </p:grpSpPr>
+      <p:sp>
+        <p:nvSpPr>
+          <p:cNvPr id="5" name="Content Placeholder 4">
+            <a:extLst>
+              <a:ext uri="{FF2B5EF4-FFF2-40B4-BE49-F238E27FC236}">
+                <a16:creationId xmlns:a16="http://schemas.microsoft.com/office/drawing/2014/main" id="{7C82B2FA-DB39-467C-9DC1-245874DCBCF1}"/>
+              </a:ext>
+            </a:extLst>
+          </p:cNvPr>
+          <p:cNvSpPr>
+            <a:spLocks noGrp="1"/>
+          </p:cNvSpPr>
+          <p:nvPr>
+            <p:ph idx="1"/>
+          </p:nvPr>
+        </p:nvSpPr>
+        <p:spPr>
+          <a:xfrm>
+            <a:off x="812801" y="1386840"/>
+            <a:ext cx="10540999" cy="4790124"/>
+          </a:xfrm>
+        </p:spPr>
+        <p:txBody>
+          <a:bodyPr>
+            <a:normAutofit fontScale="92500" lnSpcReduction="20000"/>
+          </a:bodyPr>
+          <a:lstStyle/>
+          <a:p>
+            <a:pPr marL="0" indent="0">
+              <a:buNone/>
+            </a:pPr>
+            <a:endParaRPr lang="en-US" sz="3200" dirty="0">
+              <a:latin typeface="Palatino Linotype" panose="02040502050505030304" pitchFamily="18" charset="0"/>
+            </a:endParaRPr>
+          </a:p>
+          <a:p>
+            <a:pPr>
+              <a:buFont typeface="Wingdings" panose="05000000000000000000" pitchFamily="2" charset="2"/>
+              <a:buChar char="Ø"/>
+            </a:pPr>
+            <a:r>
+              <a:rPr lang="en-US" sz="3200" dirty="0">
+                <a:solidFill>
+                  <a:schemeClr val="tx1">
+                    <a:lumMod val="75000"/>
+                    <a:lumOff val="25000"/>
+                  </a:schemeClr>
+                </a:solidFill>
+                <a:latin typeface="Palatino Linotype" panose="02040502050505030304" pitchFamily="18" charset="0"/>
+              </a:rPr>
+              <a:t> Error (Loss) Function</a:t>
+            </a:r>
+          </a:p>
+          <a:p>
+            <a:pPr marL="0" indent="0">
+              <a:buNone/>
+            </a:pPr>
+            <a:endParaRPr lang="en-US" sz="3200" dirty="0">
+              <a:solidFill>
+                <a:schemeClr val="tx1">
+                  <a:lumMod val="75000"/>
+                  <a:lumOff val="25000"/>
+                </a:schemeClr>
+              </a:solidFill>
+              <a:latin typeface="Palatino Linotype" panose="02040502050505030304" pitchFamily="18" charset="0"/>
+            </a:endParaRPr>
+          </a:p>
+          <a:p>
+            <a:pPr>
+              <a:buFont typeface="Wingdings" panose="05000000000000000000" pitchFamily="2" charset="2"/>
+              <a:buChar char="Ø"/>
+            </a:pPr>
+            <a:r>
+              <a:rPr lang="en-US" sz="3200" dirty="0">
+                <a:solidFill>
+                  <a:schemeClr val="tx1">
+                    <a:lumMod val="75000"/>
+                    <a:lumOff val="25000"/>
+                  </a:schemeClr>
+                </a:solidFill>
+                <a:latin typeface="Palatino Linotype" panose="02040502050505030304" pitchFamily="18" charset="0"/>
+              </a:rPr>
+              <a:t> Gradient Descent &amp; Partial Derivatives</a:t>
+            </a:r>
+          </a:p>
+          <a:p>
+            <a:pPr marL="0" indent="0">
+              <a:buNone/>
+            </a:pPr>
+            <a:r>
+              <a:rPr lang="en-US" sz="3200" dirty="0">
+                <a:solidFill>
+                  <a:schemeClr val="tx1">
+                    <a:lumMod val="75000"/>
+                    <a:lumOff val="25000"/>
+                  </a:schemeClr>
+                </a:solidFill>
+                <a:latin typeface="Palatino Linotype" panose="02040502050505030304" pitchFamily="18" charset="0"/>
+              </a:rPr>
+              <a:t> </a:t>
+            </a:r>
+          </a:p>
+          <a:p>
+            <a:pPr>
+              <a:buFont typeface="Wingdings" panose="05000000000000000000" pitchFamily="2" charset="2"/>
+              <a:buChar char="Ø"/>
+            </a:pPr>
+            <a:r>
+              <a:rPr lang="en-US" sz="3200" dirty="0">
+                <a:solidFill>
+                  <a:schemeClr val="tx1">
+                    <a:lumMod val="75000"/>
+                    <a:lumOff val="25000"/>
+                  </a:schemeClr>
+                </a:solidFill>
+                <a:latin typeface="Palatino Linotype" panose="02040502050505030304" pitchFamily="18" charset="0"/>
+              </a:rPr>
+              <a:t> Complex Gradients</a:t>
+            </a:r>
+          </a:p>
+          <a:p>
+            <a:pPr marL="0" indent="0">
+              <a:buNone/>
+            </a:pPr>
+            <a:endParaRPr lang="en-US" sz="3200" dirty="0">
+              <a:solidFill>
+                <a:schemeClr val="tx1">
+                  <a:lumMod val="75000"/>
+                  <a:lumOff val="25000"/>
+                </a:schemeClr>
+              </a:solidFill>
+              <a:latin typeface="Palatino Linotype" panose="02040502050505030304" pitchFamily="18" charset="0"/>
+            </a:endParaRPr>
+          </a:p>
+          <a:p>
+            <a:pPr>
+              <a:buFont typeface="Wingdings" panose="05000000000000000000" pitchFamily="2" charset="2"/>
+              <a:buChar char="Ø"/>
+            </a:pPr>
+            <a:r>
+              <a:rPr lang="en-US" sz="3200" dirty="0">
+                <a:solidFill>
+                  <a:schemeClr val="tx1">
+                    <a:lumMod val="75000"/>
+                    <a:lumOff val="25000"/>
+                  </a:schemeClr>
+                </a:solidFill>
+                <a:latin typeface="Palatino Linotype" panose="02040502050505030304" pitchFamily="18" charset="0"/>
+              </a:rPr>
+              <a:t> Optimizers</a:t>
+            </a:r>
+          </a:p>
+          <a:p>
+            <a:pPr marL="0" indent="0">
+              <a:buNone/>
+            </a:pPr>
+            <a:endParaRPr lang="en-US" sz="3200" dirty="0">
+              <a:solidFill>
+                <a:schemeClr val="tx1">
+                  <a:lumMod val="75000"/>
+                  <a:lumOff val="25000"/>
+                </a:schemeClr>
+              </a:solidFill>
+              <a:latin typeface="Palatino Linotype" panose="02040502050505030304" pitchFamily="18" charset="0"/>
+            </a:endParaRPr>
+          </a:p>
+          <a:p>
+            <a:pPr>
+              <a:buFont typeface="Wingdings" panose="05000000000000000000" pitchFamily="2" charset="2"/>
+              <a:buChar char="Ø"/>
+            </a:pPr>
+            <a:r>
+              <a:rPr lang="en-US" sz="3200" dirty="0">
+                <a:solidFill>
+                  <a:schemeClr val="tx1">
+                    <a:lumMod val="75000"/>
+                    <a:lumOff val="25000"/>
+                  </a:schemeClr>
+                </a:solidFill>
+                <a:latin typeface="Palatino Linotype" panose="02040502050505030304" pitchFamily="18" charset="0"/>
+              </a:rPr>
+              <a:t> Chain Rule</a:t>
+            </a:r>
+          </a:p>
+        </p:txBody>
+      </p:sp>
+      <p:sp>
+        <p:nvSpPr>
+          <p:cNvPr id="3" name="Title 4">
+            <a:extLst>
+              <a:ext uri="{FF2B5EF4-FFF2-40B4-BE49-F238E27FC236}">
+                <a16:creationId xmlns:a16="http://schemas.microsoft.com/office/drawing/2014/main" id="{8ADCD547-C091-45A4-9127-CC0044D81745}"/>
+              </a:ext>
+            </a:extLst>
+          </p:cNvPr>
+          <p:cNvSpPr>
+            <a:spLocks noGrp="1"/>
+          </p:cNvSpPr>
+          <p:nvPr>
+            <p:ph type="title"/>
+          </p:nvPr>
+        </p:nvSpPr>
+        <p:spPr>
+          <a:xfrm>
+            <a:off x="812802" y="365126"/>
+            <a:ext cx="10540998" cy="1325563"/>
+          </a:xfrm>
+        </p:spPr>
+        <p:txBody>
+          <a:bodyPr/>
+          <a:lstStyle/>
+          <a:p>
+            <a:pPr algn="ctr"/>
+            <a:r>
+              <a:rPr lang="en-US" dirty="0">
+                <a:solidFill>
+                  <a:schemeClr val="tx1">
+                    <a:lumMod val="65000"/>
+                    <a:lumOff val="35000"/>
+                  </a:schemeClr>
+                </a:solidFill>
+                <a:latin typeface="Palatino Linotype" panose="02040502050505030304" pitchFamily="18" charset="0"/>
+              </a:rPr>
+              <a:t>Summary</a:t>
+            </a:r>
+          </a:p>
+        </p:txBody>
+      </p:sp>
     </p:spTree>
     <p:extLst>
       <p:ext uri="{BB962C8B-B14F-4D97-AF65-F5344CB8AC3E}">
-        <p14:creationId xmlns:p14="http://schemas.microsoft.com/office/powerpoint/2010/main" val="2128530490"/>
+        <p14:creationId xmlns:p14="http://schemas.microsoft.com/office/powerpoint/2010/main" val="1397534281"/>
       </p:ext>
     </p:extLst>
   </p:cSld>
@@ -9965,7 +10227,7 @@
           <a:graphicData uri="http://schemas.openxmlformats.org/presentationml/2006/ole">
             <mc:AlternateContent xmlns:mc="http://schemas.openxmlformats.org/markup-compatibility/2006">
               <mc:Choice xmlns:v="urn:schemas-microsoft-com:vml" Requires="v">
-                <p:oleObj spid="_x0000_s1150" name="Visio" r:id="rId8" imgW="2514945" imgH="1657350" progId="Visio.Drawing.15">
+                <p:oleObj spid="_x0000_s1152" name="Visio" r:id="rId8" imgW="2514945" imgH="1657350" progId="Visio.Drawing.15">
                   <p:embed/>
                 </p:oleObj>
               </mc:Choice>
@@ -10162,6 +10424,48 @@
           <a:chExt cx="0" cy="0"/>
         </a:xfrm>
       </p:grpSpPr>
+    </p:spTree>
+    <p:extLst>
+      <p:ext uri="{BB962C8B-B14F-4D97-AF65-F5344CB8AC3E}">
+        <p14:creationId xmlns:p14="http://schemas.microsoft.com/office/powerpoint/2010/main" val="2128530490"/>
+      </p:ext>
+    </p:extLst>
+  </p:cSld>
+  <p:clrMapOvr>
+    <a:masterClrMapping/>
+  </p:clrMapOvr>
+  <mc:AlternateContent xmlns:mc="http://schemas.openxmlformats.org/markup-compatibility/2006" xmlns:p14="http://schemas.microsoft.com/office/powerpoint/2010/main">
+    <mc:Choice Requires="p14">
+      <p:transition spd="med" p14:dur="700">
+        <p:fade/>
+      </p:transition>
+    </mc:Choice>
+    <mc:Fallback xmlns="">
+      <p:transition spd="med">
+        <p:fade/>
+      </p:transition>
+    </mc:Fallback>
+  </mc:AlternateContent>
+</p:sld>
+</file>
+
+<file path=ppt/slides/slide21.xml><?xml version="1.0" encoding="utf-8"?>
+<p:sld xmlns:a="http://schemas.openxmlformats.org/drawingml/2006/main" xmlns:r="http://schemas.openxmlformats.org/officeDocument/2006/relationships" xmlns:p="http://schemas.openxmlformats.org/presentationml/2006/main">
+  <p:cSld>
+    <p:spTree>
+      <p:nvGrpSpPr>
+        <p:cNvPr id="1" name=""/>
+        <p:cNvGrpSpPr/>
+        <p:nvPr/>
+      </p:nvGrpSpPr>
+      <p:grpSpPr>
+        <a:xfrm>
+          <a:off x="0" y="0"/>
+          <a:ext cx="0" cy="0"/>
+          <a:chOff x="0" y="0"/>
+          <a:chExt cx="0" cy="0"/>
+        </a:xfrm>
+      </p:grpSpPr>
       <p:pic>
         <p:nvPicPr>
           <p:cNvPr id="2" name="Picture 2">
@@ -10232,7 +10536,7 @@
 </p:sld>
 </file>
 
-<file path=ppt/slides/slide21.xml><?xml version="1.0" encoding="utf-8"?>
+<file path=ppt/slides/slide22.xml><?xml version="1.0" encoding="utf-8"?>
 <p:sld xmlns:a="http://schemas.openxmlformats.org/drawingml/2006/main" xmlns:r="http://schemas.openxmlformats.org/officeDocument/2006/relationships" xmlns:p="http://schemas.openxmlformats.org/presentationml/2006/main">
   <p:cSld>
     <p:spTree>
@@ -10304,7 +10608,7 @@
 </p:sld>
 </file>
 
-<file path=ppt/slides/slide22.xml><?xml version="1.0" encoding="utf-8"?>
+<file path=ppt/slides/slide23.xml><?xml version="1.0" encoding="utf-8"?>
 <p:sld xmlns:a="http://schemas.openxmlformats.org/drawingml/2006/main" xmlns:r="http://schemas.openxmlformats.org/officeDocument/2006/relationships" xmlns:p="http://schemas.openxmlformats.org/presentationml/2006/main">
   <p:cSld>
     <p:spTree>

</xml_diff>

<commit_message>
Added code to description steps & added simulation to gradient pptx.
</commit_message>
<xml_diff>
--- a/presentations/03_gradient_descent.pptx
+++ b/presentations/03_gradient_descent.pptx
@@ -5,7 +5,7 @@
     <p:sldMasterId id="2147483648" r:id="rId1"/>
   </p:sldMasterIdLst>
   <p:notesMasterIdLst>
-    <p:notesMasterId r:id="rId25"/>
+    <p:notesMasterId r:id="rId26"/>
   </p:notesMasterIdLst>
   <p:sldIdLst>
     <p:sldId id="322" r:id="rId2"/>
@@ -26,11 +26,12 @@
     <p:sldId id="330" r:id="rId17"/>
     <p:sldId id="311" r:id="rId18"/>
     <p:sldId id="333" r:id="rId19"/>
-    <p:sldId id="289" r:id="rId20"/>
-    <p:sldId id="328" r:id="rId21"/>
-    <p:sldId id="332" r:id="rId22"/>
-    <p:sldId id="305" r:id="rId23"/>
-    <p:sldId id="324" r:id="rId24"/>
+    <p:sldId id="334" r:id="rId20"/>
+    <p:sldId id="289" r:id="rId21"/>
+    <p:sldId id="328" r:id="rId22"/>
+    <p:sldId id="332" r:id="rId23"/>
+    <p:sldId id="305" r:id="rId24"/>
+    <p:sldId id="324" r:id="rId25"/>
   </p:sldIdLst>
   <p:sldSz cx="12192000" cy="6858000"/>
   <p:notesSz cx="6858000" cy="9144000"/>
@@ -230,7 +231,7 @@
           <a:p>
             <a:fld id="{FD93C9B2-20F6-4DB1-B471-224337D0AC79}" type="datetimeFigureOut">
               <a:rPr lang="en-US" smtClean="0"/>
-              <a:t>4/6/2022</a:t>
+              <a:t>6/6/2022</a:t>
             </a:fld>
             <a:endParaRPr lang="en-US"/>
           </a:p>
@@ -2172,18 +2173,7 @@
           <a:bodyPr/>
           <a:lstStyle/>
           <a:p>
-            <a:r>
-              <a:rPr lang="en-US" dirty="0"/>
-              <a:t>Well, we have covered a lot of territory in this presentation.  First, we discussed the loss function and a network’s </a:t>
-            </a:r>
-            <a:r>
-              <a:rPr lang="en-US" b="1" dirty="0"/>
-              <a:t>total error</a:t>
-            </a:r>
-            <a:r>
-              <a:rPr lang="en-US" dirty="0"/>
-              <a:t>.  That was followed by an in-depth look at gradient descent and the use of partial differential equations to calculate the derivative or slope at a given point on the gradient.  We also learned that most loss functions exhibit complex contours, featuring hills, values, and plateaus, making it difficult to locate the global minimum.  And finally, I discussed how backpropagation employs the chain rule to determine the contribution of each weight to the total error in relation to the other weights.  </a:t>
-            </a:r>
+            <a:endParaRPr lang="en-US" dirty="0"/>
           </a:p>
         </p:txBody>
       </p:sp>
@@ -2213,7 +2203,7 @@
     </p:spTree>
     <p:extLst>
       <p:ext uri="{BB962C8B-B14F-4D97-AF65-F5344CB8AC3E}">
-        <p14:creationId xmlns:p14="http://schemas.microsoft.com/office/powerpoint/2010/main" val="1690277211"/>
+        <p14:creationId xmlns:p14="http://schemas.microsoft.com/office/powerpoint/2010/main" val="2567730846"/>
       </p:ext>
     </p:extLst>
   </p:cSld>
@@ -2620,7 +2610,18 @@
           <a:bodyPr/>
           <a:lstStyle/>
           <a:p>
-            <a:endParaRPr lang="en-US" dirty="0"/>
+            <a:r>
+              <a:rPr lang="en-US" dirty="0"/>
+              <a:t>Well, we have covered a lot of territory in this presentation.  First, we discussed the loss function and a network’s </a:t>
+            </a:r>
+            <a:r>
+              <a:rPr lang="en-US" b="1" dirty="0"/>
+              <a:t>total error</a:t>
+            </a:r>
+            <a:r>
+              <a:rPr lang="en-US" dirty="0"/>
+              <a:t>.  That was followed by an in-depth look at gradient descent and the use of partial differential equations to calculate the derivative or slope at a given point on the gradient.  We also learned that most loss functions exhibit complex contours, featuring hills, values, and plateaus, making it difficult to locate the global minimum.  And finally, I discussed how backpropagation employs the chain rule to determine the contribution of each weight to the total error in relation to the other weights.  </a:t>
+            </a:r>
           </a:p>
         </p:txBody>
       </p:sp>
@@ -2650,7 +2651,7 @@
     </p:spTree>
     <p:extLst>
       <p:ext uri="{BB962C8B-B14F-4D97-AF65-F5344CB8AC3E}">
-        <p14:creationId xmlns:p14="http://schemas.microsoft.com/office/powerpoint/2010/main" val="3213588290"/>
+        <p14:creationId xmlns:p14="http://schemas.microsoft.com/office/powerpoint/2010/main" val="1690277211"/>
       </p:ext>
     </p:extLst>
   </p:cSld>
@@ -2734,7 +2735,7 @@
     </p:spTree>
     <p:extLst>
       <p:ext uri="{BB962C8B-B14F-4D97-AF65-F5344CB8AC3E}">
-        <p14:creationId xmlns:p14="http://schemas.microsoft.com/office/powerpoint/2010/main" val="372051230"/>
+        <p14:creationId xmlns:p14="http://schemas.microsoft.com/office/powerpoint/2010/main" val="3213588290"/>
       </p:ext>
     </p:extLst>
   </p:cSld>
@@ -2788,104 +2789,7 @@
           <a:bodyPr/>
           <a:lstStyle/>
           <a:p>
-            <a:pPr algn="l"/>
-            <a:r>
-              <a:rPr lang="en-US" sz="1800" b="0" i="1" u="none" strike="noStrike" baseline="0" dirty="0">
-                <a:solidFill>
-                  <a:srgbClr val="000000"/>
-                </a:solidFill>
-                <a:latin typeface="+mn-lt"/>
-              </a:rPr>
-              <a:t>Gradient Descent </a:t>
-            </a:r>
-            <a:r>
-              <a:rPr lang="en-US" sz="1800" b="0" i="0" u="none" strike="noStrike" baseline="0" dirty="0">
-                <a:solidFill>
-                  <a:srgbClr val="000000"/>
-                </a:solidFill>
-                <a:latin typeface="+mn-lt"/>
-              </a:rPr>
-              <a:t>is a generic optimization algorithm capable of finding optimal solutions to a wide range of problems. The general idea of Gradient Descent is to tweak parameters (weights) iteratively in order to minimize a cost function. Suppose you are lost in the mountains in a dense fog, and you can only feel the slope of the ground below your feet. A good strategy to get to the bottom of the valley quickly is to go downhill in the direction of the steepest slope. This is exactly what Gradient Descent does: it measures the local gradient of the error function with regard to each weight in the network, and it goes in the direction of descending gradient.  Weights are often combined into a parameter vector </a:t>
-            </a:r>
-            <a:r>
-              <a:rPr lang="en-US" sz="1800" b="1" i="0" u="none" strike="noStrike" baseline="0" dirty="0">
-                <a:solidFill>
-                  <a:srgbClr val="000000"/>
-                </a:solidFill>
-                <a:latin typeface="+mn-lt"/>
-              </a:rPr>
-              <a:t>θ, </a:t>
-            </a:r>
-            <a:r>
-              <a:rPr lang="en-US" sz="1800" b="0" i="0" u="none" strike="noStrike" baseline="0" dirty="0">
-                <a:solidFill>
-                  <a:srgbClr val="000000"/>
-                </a:solidFill>
-                <a:latin typeface="+mn-lt"/>
-              </a:rPr>
-              <a:t>pictured here at the Minimum.  Once the gradient is zero, you have reached a minimum!  Concretely, you start by filling </a:t>
-            </a:r>
-            <a:r>
-              <a:rPr lang="en-US" sz="1800" b="1" i="0" u="none" strike="noStrike" baseline="0" dirty="0">
-                <a:solidFill>
-                  <a:srgbClr val="000000"/>
-                </a:solidFill>
-                <a:latin typeface="+mn-lt"/>
-              </a:rPr>
-              <a:t>θ </a:t>
-            </a:r>
-            <a:r>
-              <a:rPr lang="en-US" sz="1800" b="0" i="0" u="none" strike="noStrike" baseline="0" dirty="0">
-                <a:solidFill>
-                  <a:srgbClr val="000000"/>
-                </a:solidFill>
-                <a:latin typeface="+mn-lt"/>
-              </a:rPr>
-              <a:t>with random values (this is called </a:t>
-            </a:r>
-            <a:r>
-              <a:rPr lang="en-US" sz="1800" b="0" i="1" u="none" strike="noStrike" baseline="0" dirty="0">
-                <a:solidFill>
-                  <a:srgbClr val="000000"/>
-                </a:solidFill>
-                <a:latin typeface="+mn-lt"/>
-              </a:rPr>
-              <a:t>random initialization</a:t>
-            </a:r>
-            <a:r>
-              <a:rPr lang="en-US" sz="1800" b="0" i="0" u="none" strike="noStrike" baseline="0" dirty="0">
-                <a:solidFill>
-                  <a:srgbClr val="000000"/>
-                </a:solidFill>
-                <a:latin typeface="+mn-lt"/>
-              </a:rPr>
-              <a:t>). Then you improve it gradually, taking one baby step at a time, each step attempting to decrease the cost function (e.g., the MSE), until the algorithm </a:t>
-            </a:r>
-            <a:r>
-              <a:rPr lang="en-US" sz="1800" b="0" i="1" u="none" strike="noStrike" baseline="0" dirty="0">
-                <a:solidFill>
-                  <a:srgbClr val="000000"/>
-                </a:solidFill>
-                <a:latin typeface="+mn-lt"/>
-              </a:rPr>
-              <a:t>converges </a:t>
-            </a:r>
-            <a:r>
-              <a:rPr lang="en-US" sz="1800" b="0" i="0" u="none" strike="noStrike" baseline="0" dirty="0">
-                <a:solidFill>
-                  <a:srgbClr val="000000"/>
-                </a:solidFill>
-                <a:latin typeface="+mn-lt"/>
-              </a:rPr>
-              <a:t>to a minimum.</a:t>
-            </a:r>
-            <a:endParaRPr lang="en-US" b="0" i="0" dirty="0">
-              <a:solidFill>
-                <a:srgbClr val="3C3C3B"/>
-              </a:solidFill>
-              <a:effectLst/>
-              <a:latin typeface="+mn-lt"/>
-            </a:endParaRPr>
+            <a:endParaRPr lang="en-US" dirty="0"/>
           </a:p>
         </p:txBody>
       </p:sp>
@@ -2915,7 +2819,7 @@
     </p:spTree>
     <p:extLst>
       <p:ext uri="{BB962C8B-B14F-4D97-AF65-F5344CB8AC3E}">
-        <p14:creationId xmlns:p14="http://schemas.microsoft.com/office/powerpoint/2010/main" val="1199395141"/>
+        <p14:creationId xmlns:p14="http://schemas.microsoft.com/office/powerpoint/2010/main" val="372051230"/>
       </p:ext>
     </p:extLst>
   </p:cSld>
@@ -2969,6 +2873,187 @@
           <a:bodyPr/>
           <a:lstStyle/>
           <a:p>
+            <a:pPr algn="l"/>
+            <a:r>
+              <a:rPr lang="en-US" sz="1800" b="0" i="1" u="none" strike="noStrike" baseline="0" dirty="0">
+                <a:solidFill>
+                  <a:srgbClr val="000000"/>
+                </a:solidFill>
+                <a:latin typeface="+mn-lt"/>
+              </a:rPr>
+              <a:t>Gradient Descent </a:t>
+            </a:r>
+            <a:r>
+              <a:rPr lang="en-US" sz="1800" b="0" i="0" u="none" strike="noStrike" baseline="0" dirty="0">
+                <a:solidFill>
+                  <a:srgbClr val="000000"/>
+                </a:solidFill>
+                <a:latin typeface="+mn-lt"/>
+              </a:rPr>
+              <a:t>is a generic optimization algorithm capable of finding optimal solutions to a wide range of problems. The general idea of Gradient Descent is to tweak parameters (weights) iteratively in order to minimize a cost function. Suppose you are lost in the mountains in a dense fog, and you can only feel the slope of the ground below your feet. A good strategy to get to the bottom of the valley quickly is to go downhill in the direction of the steepest slope. This is exactly what Gradient Descent does: it measures the local gradient of the error function with regard to each weight in the network, and it goes in the direction of descending gradient.  Weights are often combined into a parameter vector </a:t>
+            </a:r>
+            <a:r>
+              <a:rPr lang="en-US" sz="1800" b="1" i="0" u="none" strike="noStrike" baseline="0" dirty="0">
+                <a:solidFill>
+                  <a:srgbClr val="000000"/>
+                </a:solidFill>
+                <a:latin typeface="+mn-lt"/>
+              </a:rPr>
+              <a:t>θ, </a:t>
+            </a:r>
+            <a:r>
+              <a:rPr lang="en-US" sz="1800" b="0" i="0" u="none" strike="noStrike" baseline="0" dirty="0">
+                <a:solidFill>
+                  <a:srgbClr val="000000"/>
+                </a:solidFill>
+                <a:latin typeface="+mn-lt"/>
+              </a:rPr>
+              <a:t>pictured here at the Minimum.  Once the gradient is zero, you have reached a minimum!  Concretely, you start by filling </a:t>
+            </a:r>
+            <a:r>
+              <a:rPr lang="en-US" sz="1800" b="1" i="0" u="none" strike="noStrike" baseline="0" dirty="0">
+                <a:solidFill>
+                  <a:srgbClr val="000000"/>
+                </a:solidFill>
+                <a:latin typeface="+mn-lt"/>
+              </a:rPr>
+              <a:t>θ </a:t>
+            </a:r>
+            <a:r>
+              <a:rPr lang="en-US" sz="1800" b="0" i="0" u="none" strike="noStrike" baseline="0" dirty="0">
+                <a:solidFill>
+                  <a:srgbClr val="000000"/>
+                </a:solidFill>
+                <a:latin typeface="+mn-lt"/>
+              </a:rPr>
+              <a:t>with random values (this is called </a:t>
+            </a:r>
+            <a:r>
+              <a:rPr lang="en-US" sz="1800" b="0" i="1" u="none" strike="noStrike" baseline="0" dirty="0">
+                <a:solidFill>
+                  <a:srgbClr val="000000"/>
+                </a:solidFill>
+                <a:latin typeface="+mn-lt"/>
+              </a:rPr>
+              <a:t>random initialization</a:t>
+            </a:r>
+            <a:r>
+              <a:rPr lang="en-US" sz="1800" b="0" i="0" u="none" strike="noStrike" baseline="0" dirty="0">
+                <a:solidFill>
+                  <a:srgbClr val="000000"/>
+                </a:solidFill>
+                <a:latin typeface="+mn-lt"/>
+              </a:rPr>
+              <a:t>). Then you improve it gradually, taking one baby step at a time, each step attempting to decrease the cost function (e.g., the MSE), until the algorithm </a:t>
+            </a:r>
+            <a:r>
+              <a:rPr lang="en-US" sz="1800" b="0" i="1" u="none" strike="noStrike" baseline="0" dirty="0">
+                <a:solidFill>
+                  <a:srgbClr val="000000"/>
+                </a:solidFill>
+                <a:latin typeface="+mn-lt"/>
+              </a:rPr>
+              <a:t>converges </a:t>
+            </a:r>
+            <a:r>
+              <a:rPr lang="en-US" sz="1800" b="0" i="0" u="none" strike="noStrike" baseline="0" dirty="0">
+                <a:solidFill>
+                  <a:srgbClr val="000000"/>
+                </a:solidFill>
+                <a:latin typeface="+mn-lt"/>
+              </a:rPr>
+              <a:t>to a minimum.</a:t>
+            </a:r>
+            <a:endParaRPr lang="en-US" b="0" i="0" dirty="0">
+              <a:solidFill>
+                <a:srgbClr val="3C3C3B"/>
+              </a:solidFill>
+              <a:effectLst/>
+              <a:latin typeface="+mn-lt"/>
+            </a:endParaRPr>
+          </a:p>
+        </p:txBody>
+      </p:sp>
+      <p:sp>
+        <p:nvSpPr>
+          <p:cNvPr id="4" name="Slide Number Placeholder 3"/>
+          <p:cNvSpPr>
+            <a:spLocks noGrp="1"/>
+          </p:cNvSpPr>
+          <p:nvPr>
+            <p:ph type="sldNum" sz="quarter" idx="5"/>
+          </p:nvPr>
+        </p:nvSpPr>
+        <p:spPr/>
+        <p:txBody>
+          <a:bodyPr/>
+          <a:lstStyle/>
+          <a:p>
+            <a:fld id="{3148858F-F1DB-4027-9C85-CCA6849540DD}" type="slidenum">
+              <a:rPr lang="en-US" smtClean="0"/>
+              <a:t>23</a:t>
+            </a:fld>
+            <a:endParaRPr lang="en-US"/>
+          </a:p>
+        </p:txBody>
+      </p:sp>
+    </p:spTree>
+    <p:extLst>
+      <p:ext uri="{BB962C8B-B14F-4D97-AF65-F5344CB8AC3E}">
+        <p14:creationId xmlns:p14="http://schemas.microsoft.com/office/powerpoint/2010/main" val="1199395141"/>
+      </p:ext>
+    </p:extLst>
+  </p:cSld>
+  <p:clrMapOvr>
+    <a:masterClrMapping/>
+  </p:clrMapOvr>
+</p:notes>
+</file>
+
+<file path=ppt/notesSlides/notesSlide24.xml><?xml version="1.0" encoding="utf-8"?>
+<p:notes xmlns:a="http://schemas.openxmlformats.org/drawingml/2006/main" xmlns:r="http://schemas.openxmlformats.org/officeDocument/2006/relationships" xmlns:p="http://schemas.openxmlformats.org/presentationml/2006/main">
+  <p:cSld>
+    <p:spTree>
+      <p:nvGrpSpPr>
+        <p:cNvPr id="1" name=""/>
+        <p:cNvGrpSpPr/>
+        <p:nvPr/>
+      </p:nvGrpSpPr>
+      <p:grpSpPr>
+        <a:xfrm>
+          <a:off x="0" y="0"/>
+          <a:ext cx="0" cy="0"/>
+          <a:chOff x="0" y="0"/>
+          <a:chExt cx="0" cy="0"/>
+        </a:xfrm>
+      </p:grpSpPr>
+      <p:sp>
+        <p:nvSpPr>
+          <p:cNvPr id="2" name="Slide Image Placeholder 1"/>
+          <p:cNvSpPr>
+            <a:spLocks noGrp="1" noRot="1" noChangeAspect="1"/>
+          </p:cNvSpPr>
+          <p:nvPr>
+            <p:ph type="sldImg"/>
+          </p:nvPr>
+        </p:nvSpPr>
+        <p:spPr/>
+      </p:sp>
+      <p:sp>
+        <p:nvSpPr>
+          <p:cNvPr id="3" name="Notes Placeholder 2"/>
+          <p:cNvSpPr>
+            <a:spLocks noGrp="1"/>
+          </p:cNvSpPr>
+          <p:nvPr>
+            <p:ph type="body" idx="1"/>
+          </p:nvPr>
+        </p:nvSpPr>
+        <p:spPr/>
+        <p:txBody>
+          <a:bodyPr/>
+          <a:lstStyle/>
+          <a:p>
             <a:pPr marL="0" marR="0" lvl="0" indent="0" algn="l" defTabSz="914400" rtl="0" eaLnBrk="1" fontAlgn="auto" latinLnBrk="0" hangingPunct="1">
               <a:lnSpc>
                 <a:spcPct val="100000"/>
@@ -3172,7 +3257,7 @@
           <a:p>
             <a:fld id="{3148858F-F1DB-4027-9C85-CCA6849540DD}" type="slidenum">
               <a:rPr lang="en-US" smtClean="0"/>
-              <a:t>23</a:t>
+              <a:t>24</a:t>
             </a:fld>
             <a:endParaRPr lang="en-US"/>
           </a:p>
@@ -4367,7 +4452,7 @@
           <a:p>
             <a:fld id="{C3F78080-8D0A-4BE8-A5B4-CB115102D524}" type="datetimeFigureOut">
               <a:rPr lang="en-US" smtClean="0"/>
-              <a:t>4/6/2022</a:t>
+              <a:t>6/6/2022</a:t>
             </a:fld>
             <a:endParaRPr lang="en-US"/>
           </a:p>
@@ -4565,7 +4650,7 @@
           <a:p>
             <a:fld id="{C3F78080-8D0A-4BE8-A5B4-CB115102D524}" type="datetimeFigureOut">
               <a:rPr lang="en-US" smtClean="0"/>
-              <a:t>4/6/2022</a:t>
+              <a:t>6/6/2022</a:t>
             </a:fld>
             <a:endParaRPr lang="en-US"/>
           </a:p>
@@ -4773,7 +4858,7 @@
           <a:p>
             <a:fld id="{C3F78080-8D0A-4BE8-A5B4-CB115102D524}" type="datetimeFigureOut">
               <a:rPr lang="en-US" smtClean="0"/>
-              <a:t>4/6/2022</a:t>
+              <a:t>6/6/2022</a:t>
             </a:fld>
             <a:endParaRPr lang="en-US"/>
           </a:p>
@@ -4971,7 +5056,7 @@
           <a:p>
             <a:fld id="{C3F78080-8D0A-4BE8-A5B4-CB115102D524}" type="datetimeFigureOut">
               <a:rPr lang="en-US" smtClean="0"/>
-              <a:t>4/6/2022</a:t>
+              <a:t>6/6/2022</a:t>
             </a:fld>
             <a:endParaRPr lang="en-US"/>
           </a:p>
@@ -5246,7 +5331,7 @@
           <a:p>
             <a:fld id="{C3F78080-8D0A-4BE8-A5B4-CB115102D524}" type="datetimeFigureOut">
               <a:rPr lang="en-US" smtClean="0"/>
-              <a:t>4/6/2022</a:t>
+              <a:t>6/6/2022</a:t>
             </a:fld>
             <a:endParaRPr lang="en-US"/>
           </a:p>
@@ -5511,7 +5596,7 @@
           <a:p>
             <a:fld id="{C3F78080-8D0A-4BE8-A5B4-CB115102D524}" type="datetimeFigureOut">
               <a:rPr lang="en-US" smtClean="0"/>
-              <a:t>4/6/2022</a:t>
+              <a:t>6/6/2022</a:t>
             </a:fld>
             <a:endParaRPr lang="en-US"/>
           </a:p>
@@ -5923,7 +6008,7 @@
           <a:p>
             <a:fld id="{C3F78080-8D0A-4BE8-A5B4-CB115102D524}" type="datetimeFigureOut">
               <a:rPr lang="en-US" smtClean="0"/>
-              <a:t>4/6/2022</a:t>
+              <a:t>6/6/2022</a:t>
             </a:fld>
             <a:endParaRPr lang="en-US"/>
           </a:p>
@@ -6064,7 +6149,7 @@
           <a:p>
             <a:fld id="{C3F78080-8D0A-4BE8-A5B4-CB115102D524}" type="datetimeFigureOut">
               <a:rPr lang="en-US" smtClean="0"/>
-              <a:t>4/6/2022</a:t>
+              <a:t>6/6/2022</a:t>
             </a:fld>
             <a:endParaRPr lang="en-US"/>
           </a:p>
@@ -6177,7 +6262,7 @@
           <a:p>
             <a:fld id="{C3F78080-8D0A-4BE8-A5B4-CB115102D524}" type="datetimeFigureOut">
               <a:rPr lang="en-US" smtClean="0"/>
-              <a:t>4/6/2022</a:t>
+              <a:t>6/6/2022</a:t>
             </a:fld>
             <a:endParaRPr lang="en-US"/>
           </a:p>
@@ -6488,7 +6573,7 @@
           <a:p>
             <a:fld id="{C3F78080-8D0A-4BE8-A5B4-CB115102D524}" type="datetimeFigureOut">
               <a:rPr lang="en-US" smtClean="0"/>
-              <a:t>4/6/2022</a:t>
+              <a:t>6/6/2022</a:t>
             </a:fld>
             <a:endParaRPr lang="en-US"/>
           </a:p>
@@ -6776,7 +6861,7 @@
           <a:p>
             <a:fld id="{C3F78080-8D0A-4BE8-A5B4-CB115102D524}" type="datetimeFigureOut">
               <a:rPr lang="en-US" smtClean="0"/>
-              <a:t>4/6/2022</a:t>
+              <a:t>6/6/2022</a:t>
             </a:fld>
             <a:endParaRPr lang="en-US"/>
           </a:p>
@@ -7017,7 +7102,7 @@
           <a:p>
             <a:fld id="{C3F78080-8D0A-4BE8-A5B4-CB115102D524}" type="datetimeFigureOut">
               <a:rPr lang="en-US" smtClean="0"/>
-              <a:t>4/6/2022</a:t>
+              <a:t>6/6/2022</a:t>
             </a:fld>
             <a:endParaRPr lang="en-US"/>
           </a:p>
@@ -9809,230 +9894,98 @@
           <a:chExt cx="0" cy="0"/>
         </a:xfrm>
       </p:grpSpPr>
-      <p:sp>
-        <p:nvSpPr>
-          <p:cNvPr id="5" name="Content Placeholder 4">
+      <p:pic>
+        <p:nvPicPr>
+          <p:cNvPr id="3" name="Picture 2">
             <a:extLst>
               <a:ext uri="{FF2B5EF4-FFF2-40B4-BE49-F238E27FC236}">
-                <a16:creationId xmlns:a16="http://schemas.microsoft.com/office/drawing/2014/main" id="{7C82B2FA-DB39-467C-9DC1-245874DCBCF1}"/>
+                <a16:creationId xmlns:a16="http://schemas.microsoft.com/office/drawing/2014/main" id="{079E553D-87CC-498F-A6F4-BE873941F430}"/>
               </a:ext>
             </a:extLst>
           </p:cNvPr>
-          <p:cNvSpPr>
-            <a:spLocks noGrp="1"/>
-          </p:cNvSpPr>
-          <p:nvPr>
-            <p:ph idx="1"/>
-          </p:nvPr>
-        </p:nvSpPr>
+          <p:cNvPicPr>
+            <a:picLocks noChangeAspect="1"/>
+          </p:cNvPicPr>
+          <p:nvPr/>
+        </p:nvPicPr>
+        <p:blipFill>
+          <a:blip r:embed="rId3"/>
+          <a:stretch>
+            <a:fillRect/>
+          </a:stretch>
+        </p:blipFill>
         <p:spPr>
           <a:xfrm>
-            <a:off x="812801" y="1386840"/>
-            <a:ext cx="10540999" cy="4790124"/>
+            <a:off x="2012051" y="1892620"/>
+            <a:ext cx="8167897" cy="3072760"/>
           </a:xfrm>
+          <a:prstGeom prst="rect">
+            <a:avLst/>
+          </a:prstGeom>
+          <a:ln>
+            <a:noFill/>
+          </a:ln>
+          <a:effectLst>
+            <a:outerShdw blurRad="292100" dist="139700" dir="2700000" algn="tl" rotWithShape="0">
+              <a:srgbClr val="333333">
+                <a:alpha val="65000"/>
+              </a:srgbClr>
+            </a:outerShdw>
+          </a:effectLst>
         </p:spPr>
-        <p:txBody>
-          <a:bodyPr>
-            <a:normAutofit fontScale="92500" lnSpcReduction="20000"/>
+      </p:pic>
+      <p:sp>
+        <p:nvSpPr>
+          <p:cNvPr id="4" name="TextBox 3">
+            <a:extLst>
+              <a:ext uri="{FF2B5EF4-FFF2-40B4-BE49-F238E27FC236}">
+                <a16:creationId xmlns:a16="http://schemas.microsoft.com/office/drawing/2014/main" id="{5A97D8DA-1FC8-4770-8EEA-E4947515185A}"/>
+              </a:ext>
+            </a:extLst>
+          </p:cNvPr>
+          <p:cNvSpPr txBox="1"/>
+          <p:nvPr/>
+        </p:nvSpPr>
+        <p:spPr>
+          <a:xfrm>
+            <a:off x="0" y="6550223"/>
+            <a:ext cx="12192000" cy="307777"/>
+          </a:xfrm>
+          <a:prstGeom prst="rect">
+            <a:avLst/>
+          </a:prstGeom>
+          <a:noFill/>
+        </p:spPr>
+        <p:txBody>
+          <a:bodyPr wrap="square" rtlCol="0">
+            <a:spAutoFit/>
           </a:bodyPr>
           <a:lstStyle/>
           <a:p>
-            <a:pPr marL="0" indent="0">
-              <a:buNone/>
-            </a:pPr>
-            <a:endParaRPr lang="en-US" sz="3200" dirty="0">
-              <a:latin typeface="Palatino Linotype" panose="02040502050505030304" pitchFamily="18" charset="0"/>
-            </a:endParaRPr>
-          </a:p>
-          <a:p>
-            <a:pPr>
-              <a:buFont typeface="Wingdings" panose="05000000000000000000" pitchFamily="2" charset="2"/>
-              <a:buChar char="Ø"/>
-            </a:pPr>
-            <a:r>
-              <a:rPr lang="en-US" sz="3200" dirty="0">
-                <a:solidFill>
-                  <a:schemeClr val="tx1">
-                    <a:lumMod val="75000"/>
-                    <a:lumOff val="25000"/>
-                  </a:schemeClr>
-                </a:solidFill>
-                <a:latin typeface="Palatino Linotype" panose="02040502050505030304" pitchFamily="18" charset="0"/>
-              </a:rPr>
-              <a:t> Error (Loss) Function</a:t>
-            </a:r>
-          </a:p>
-          <a:p>
-            <a:pPr marL="0" indent="0">
-              <a:buNone/>
-            </a:pPr>
-            <a:endParaRPr lang="en-US" sz="3200" dirty="0">
-              <a:solidFill>
-                <a:schemeClr val="tx1">
-                  <a:lumMod val="75000"/>
-                  <a:lumOff val="25000"/>
-                </a:schemeClr>
-              </a:solidFill>
-              <a:latin typeface="Palatino Linotype" panose="02040502050505030304" pitchFamily="18" charset="0"/>
-            </a:endParaRPr>
-          </a:p>
-          <a:p>
-            <a:pPr>
-              <a:buFont typeface="Wingdings" panose="05000000000000000000" pitchFamily="2" charset="2"/>
-              <a:buChar char="Ø"/>
-            </a:pPr>
-            <a:r>
-              <a:rPr lang="en-US" sz="3200" dirty="0">
-                <a:solidFill>
-                  <a:schemeClr val="tx1">
-                    <a:lumMod val="75000"/>
-                    <a:lumOff val="25000"/>
-                  </a:schemeClr>
-                </a:solidFill>
-                <a:latin typeface="Palatino Linotype" panose="02040502050505030304" pitchFamily="18" charset="0"/>
-              </a:rPr>
-              <a:t> Gradient Descent &amp; Partial Derivatives</a:t>
-            </a:r>
-          </a:p>
-          <a:p>
-            <a:pPr marL="0" indent="0">
-              <a:buNone/>
-            </a:pPr>
-            <a:r>
-              <a:rPr lang="en-US" sz="3200" dirty="0">
-                <a:solidFill>
-                  <a:schemeClr val="tx1">
-                    <a:lumMod val="75000"/>
-                    <a:lumOff val="25000"/>
-                  </a:schemeClr>
-                </a:solidFill>
-                <a:latin typeface="Palatino Linotype" panose="02040502050505030304" pitchFamily="18" charset="0"/>
-              </a:rPr>
-              <a:t> </a:t>
-            </a:r>
-          </a:p>
-          <a:p>
-            <a:pPr>
-              <a:buFont typeface="Wingdings" panose="05000000000000000000" pitchFamily="2" charset="2"/>
-              <a:buChar char="Ø"/>
-            </a:pPr>
-            <a:r>
-              <a:rPr lang="en-US" sz="3200" dirty="0">
-                <a:solidFill>
-                  <a:schemeClr val="tx1">
-                    <a:lumMod val="75000"/>
-                    <a:lumOff val="25000"/>
-                  </a:schemeClr>
-                </a:solidFill>
-                <a:latin typeface="Palatino Linotype" panose="02040502050505030304" pitchFamily="18" charset="0"/>
-              </a:rPr>
-              <a:t> Complex Gradients</a:t>
-            </a:r>
-          </a:p>
-          <a:p>
-            <a:pPr marL="0" indent="0">
-              <a:buNone/>
-            </a:pPr>
-            <a:endParaRPr lang="en-US" sz="3200" dirty="0">
-              <a:solidFill>
-                <a:schemeClr val="tx1">
-                  <a:lumMod val="75000"/>
-                  <a:lumOff val="25000"/>
-                </a:schemeClr>
-              </a:solidFill>
-              <a:latin typeface="Palatino Linotype" panose="02040502050505030304" pitchFamily="18" charset="0"/>
-            </a:endParaRPr>
-          </a:p>
-          <a:p>
-            <a:pPr>
-              <a:buFont typeface="Wingdings" panose="05000000000000000000" pitchFamily="2" charset="2"/>
-              <a:buChar char="Ø"/>
-            </a:pPr>
-            <a:r>
-              <a:rPr lang="en-US" sz="3200" dirty="0">
-                <a:solidFill>
-                  <a:schemeClr val="tx1">
-                    <a:lumMod val="75000"/>
-                    <a:lumOff val="25000"/>
-                  </a:schemeClr>
-                </a:solidFill>
-                <a:latin typeface="Palatino Linotype" panose="02040502050505030304" pitchFamily="18" charset="0"/>
-              </a:rPr>
-              <a:t> Optimizers</a:t>
-            </a:r>
-          </a:p>
-          <a:p>
-            <a:pPr marL="0" indent="0">
-              <a:buNone/>
-            </a:pPr>
-            <a:endParaRPr lang="en-US" sz="3200" dirty="0">
-              <a:solidFill>
-                <a:schemeClr val="tx1">
-                  <a:lumMod val="75000"/>
-                  <a:lumOff val="25000"/>
-                </a:schemeClr>
-              </a:solidFill>
-              <a:latin typeface="Palatino Linotype" panose="02040502050505030304" pitchFamily="18" charset="0"/>
-            </a:endParaRPr>
-          </a:p>
-          <a:p>
-            <a:pPr>
-              <a:buFont typeface="Wingdings" panose="05000000000000000000" pitchFamily="2" charset="2"/>
-              <a:buChar char="Ø"/>
-            </a:pPr>
-            <a:r>
-              <a:rPr lang="en-US" sz="3200" dirty="0">
-                <a:solidFill>
-                  <a:schemeClr val="tx1">
-                    <a:lumMod val="75000"/>
-                    <a:lumOff val="25000"/>
-                  </a:schemeClr>
-                </a:solidFill>
-                <a:latin typeface="Palatino Linotype" panose="02040502050505030304" pitchFamily="18" charset="0"/>
-              </a:rPr>
-              <a:t> Chain Rule</a:t>
-            </a:r>
-          </a:p>
-        </p:txBody>
-      </p:sp>
-      <p:sp>
-        <p:nvSpPr>
-          <p:cNvPr id="3" name="Title 4">
-            <a:extLst>
-              <a:ext uri="{FF2B5EF4-FFF2-40B4-BE49-F238E27FC236}">
-                <a16:creationId xmlns:a16="http://schemas.microsoft.com/office/drawing/2014/main" id="{8ADCD547-C091-45A4-9127-CC0044D81745}"/>
-              </a:ext>
-            </a:extLst>
-          </p:cNvPr>
-          <p:cNvSpPr>
-            <a:spLocks noGrp="1"/>
-          </p:cNvSpPr>
-          <p:nvPr>
-            <p:ph type="title"/>
-          </p:nvPr>
-        </p:nvSpPr>
-        <p:spPr>
-          <a:xfrm>
-            <a:off x="812802" y="365126"/>
-            <a:ext cx="10540998" cy="1325563"/>
-          </a:xfrm>
-        </p:spPr>
-        <p:txBody>
-          <a:bodyPr/>
-          <a:lstStyle/>
-          <a:p>
-            <a:pPr algn="ctr"/>
-            <a:r>
-              <a:rPr lang="en-US" dirty="0">
+            <a:r>
+              <a:rPr lang="en-US" sz="1400" dirty="0">
                 <a:solidFill>
                   <a:schemeClr val="tx1">
                     <a:lumMod val="65000"/>
                     <a:lumOff val="35000"/>
                   </a:schemeClr>
                 </a:solidFill>
-                <a:latin typeface="Palatino Linotype" panose="02040502050505030304" pitchFamily="18" charset="0"/>
-              </a:rPr>
-              <a:t>Summary</a:t>
+                <a:latin typeface="+mj-lt"/>
+                <a:ea typeface="Verdana" panose="020B0604030504040204" pitchFamily="34" charset="0"/>
+              </a:rPr>
+              <a:t>Source: </a:t>
+            </a:r>
+            <a:r>
+              <a:rPr lang="en-US" sz="1400" dirty="0">
+                <a:solidFill>
+                  <a:schemeClr val="tx1">
+                    <a:lumMod val="65000"/>
+                    <a:lumOff val="35000"/>
+                  </a:schemeClr>
+                </a:solidFill>
+                <a:latin typeface="+mj-lt"/>
+              </a:rPr>
+              <a:t>https://medium.com/swlh/introduction-to-deep-learning-using-keras-and-tensorflow-part2-284746ab4442</a:t>
             </a:r>
           </a:p>
         </p:txBody>
@@ -10040,7 +9993,7 @@
     </p:spTree>
     <p:extLst>
       <p:ext uri="{BB962C8B-B14F-4D97-AF65-F5344CB8AC3E}">
-        <p14:creationId xmlns:p14="http://schemas.microsoft.com/office/powerpoint/2010/main" val="1397534281"/>
+        <p14:creationId xmlns:p14="http://schemas.microsoft.com/office/powerpoint/2010/main" val="3930004800"/>
       </p:ext>
     </p:extLst>
   </p:cSld>
@@ -10227,7 +10180,7 @@
           <a:graphicData uri="http://schemas.openxmlformats.org/presentationml/2006/ole">
             <mc:AlternateContent xmlns:mc="http://schemas.openxmlformats.org/markup-compatibility/2006">
               <mc:Choice xmlns:v="urn:schemas-microsoft-com:vml" Requires="v">
-                <p:oleObj spid="_x0000_s1152" name="Visio" r:id="rId8" imgW="2514945" imgH="1657350" progId="Visio.Drawing.15">
+                <p:oleObj spid="_x0000_s1159" name="Visio" r:id="rId8" imgW="2514945" imgH="1657350" progId="Visio.Drawing.15">
                   <p:embed/>
                 </p:oleObj>
               </mc:Choice>
@@ -10424,10 +10377,238 @@
           <a:chExt cx="0" cy="0"/>
         </a:xfrm>
       </p:grpSpPr>
+      <p:sp>
+        <p:nvSpPr>
+          <p:cNvPr id="5" name="Content Placeholder 4">
+            <a:extLst>
+              <a:ext uri="{FF2B5EF4-FFF2-40B4-BE49-F238E27FC236}">
+                <a16:creationId xmlns:a16="http://schemas.microsoft.com/office/drawing/2014/main" id="{7C82B2FA-DB39-467C-9DC1-245874DCBCF1}"/>
+              </a:ext>
+            </a:extLst>
+          </p:cNvPr>
+          <p:cNvSpPr>
+            <a:spLocks noGrp="1"/>
+          </p:cNvSpPr>
+          <p:nvPr>
+            <p:ph idx="1"/>
+          </p:nvPr>
+        </p:nvSpPr>
+        <p:spPr>
+          <a:xfrm>
+            <a:off x="812801" y="1386840"/>
+            <a:ext cx="10540999" cy="4790124"/>
+          </a:xfrm>
+        </p:spPr>
+        <p:txBody>
+          <a:bodyPr>
+            <a:normAutofit fontScale="92500" lnSpcReduction="20000"/>
+          </a:bodyPr>
+          <a:lstStyle/>
+          <a:p>
+            <a:pPr marL="0" indent="0">
+              <a:buNone/>
+            </a:pPr>
+            <a:endParaRPr lang="en-US" sz="3200" dirty="0">
+              <a:latin typeface="Palatino Linotype" panose="02040502050505030304" pitchFamily="18" charset="0"/>
+            </a:endParaRPr>
+          </a:p>
+          <a:p>
+            <a:pPr>
+              <a:buFont typeface="Wingdings" panose="05000000000000000000" pitchFamily="2" charset="2"/>
+              <a:buChar char="Ø"/>
+            </a:pPr>
+            <a:r>
+              <a:rPr lang="en-US" sz="3200" dirty="0">
+                <a:solidFill>
+                  <a:schemeClr val="tx1">
+                    <a:lumMod val="75000"/>
+                    <a:lumOff val="25000"/>
+                  </a:schemeClr>
+                </a:solidFill>
+                <a:latin typeface="Palatino Linotype" panose="02040502050505030304" pitchFamily="18" charset="0"/>
+              </a:rPr>
+              <a:t> Error (Loss) Function</a:t>
+            </a:r>
+          </a:p>
+          <a:p>
+            <a:pPr marL="0" indent="0">
+              <a:buNone/>
+            </a:pPr>
+            <a:endParaRPr lang="en-US" sz="3200" dirty="0">
+              <a:solidFill>
+                <a:schemeClr val="tx1">
+                  <a:lumMod val="75000"/>
+                  <a:lumOff val="25000"/>
+                </a:schemeClr>
+              </a:solidFill>
+              <a:latin typeface="Palatino Linotype" panose="02040502050505030304" pitchFamily="18" charset="0"/>
+            </a:endParaRPr>
+          </a:p>
+          <a:p>
+            <a:pPr>
+              <a:buFont typeface="Wingdings" panose="05000000000000000000" pitchFamily="2" charset="2"/>
+              <a:buChar char="Ø"/>
+            </a:pPr>
+            <a:r>
+              <a:rPr lang="en-US" sz="3200" dirty="0">
+                <a:solidFill>
+                  <a:schemeClr val="tx1">
+                    <a:lumMod val="75000"/>
+                    <a:lumOff val="25000"/>
+                  </a:schemeClr>
+                </a:solidFill>
+                <a:latin typeface="Palatino Linotype" panose="02040502050505030304" pitchFamily="18" charset="0"/>
+              </a:rPr>
+              <a:t> Gradient Descent &amp; Partial Derivatives</a:t>
+            </a:r>
+          </a:p>
+          <a:p>
+            <a:pPr marL="0" indent="0">
+              <a:buNone/>
+            </a:pPr>
+            <a:r>
+              <a:rPr lang="en-US" sz="3200" dirty="0">
+                <a:solidFill>
+                  <a:schemeClr val="tx1">
+                    <a:lumMod val="75000"/>
+                    <a:lumOff val="25000"/>
+                  </a:schemeClr>
+                </a:solidFill>
+                <a:latin typeface="Palatino Linotype" panose="02040502050505030304" pitchFamily="18" charset="0"/>
+              </a:rPr>
+              <a:t> </a:t>
+            </a:r>
+          </a:p>
+          <a:p>
+            <a:pPr>
+              <a:buFont typeface="Wingdings" panose="05000000000000000000" pitchFamily="2" charset="2"/>
+              <a:buChar char="Ø"/>
+            </a:pPr>
+            <a:r>
+              <a:rPr lang="en-US" sz="3200" dirty="0">
+                <a:solidFill>
+                  <a:schemeClr val="tx1">
+                    <a:lumMod val="75000"/>
+                    <a:lumOff val="25000"/>
+                  </a:schemeClr>
+                </a:solidFill>
+                <a:latin typeface="Palatino Linotype" panose="02040502050505030304" pitchFamily="18" charset="0"/>
+              </a:rPr>
+              <a:t> Complex Gradients</a:t>
+            </a:r>
+          </a:p>
+          <a:p>
+            <a:pPr marL="0" indent="0">
+              <a:buNone/>
+            </a:pPr>
+            <a:endParaRPr lang="en-US" sz="3200" dirty="0">
+              <a:solidFill>
+                <a:schemeClr val="tx1">
+                  <a:lumMod val="75000"/>
+                  <a:lumOff val="25000"/>
+                </a:schemeClr>
+              </a:solidFill>
+              <a:latin typeface="Palatino Linotype" panose="02040502050505030304" pitchFamily="18" charset="0"/>
+            </a:endParaRPr>
+          </a:p>
+          <a:p>
+            <a:pPr>
+              <a:buFont typeface="Wingdings" panose="05000000000000000000" pitchFamily="2" charset="2"/>
+              <a:buChar char="Ø"/>
+            </a:pPr>
+            <a:r>
+              <a:rPr lang="en-US" sz="3200" dirty="0">
+                <a:solidFill>
+                  <a:schemeClr val="tx1">
+                    <a:lumMod val="75000"/>
+                    <a:lumOff val="25000"/>
+                  </a:schemeClr>
+                </a:solidFill>
+                <a:latin typeface="Palatino Linotype" panose="02040502050505030304" pitchFamily="18" charset="0"/>
+              </a:rPr>
+              <a:t> Optimizers</a:t>
+            </a:r>
+          </a:p>
+          <a:p>
+            <a:pPr marL="0" indent="0">
+              <a:buNone/>
+            </a:pPr>
+            <a:endParaRPr lang="en-US" sz="3200" dirty="0">
+              <a:solidFill>
+                <a:schemeClr val="tx1">
+                  <a:lumMod val="75000"/>
+                  <a:lumOff val="25000"/>
+                </a:schemeClr>
+              </a:solidFill>
+              <a:latin typeface="Palatino Linotype" panose="02040502050505030304" pitchFamily="18" charset="0"/>
+            </a:endParaRPr>
+          </a:p>
+          <a:p>
+            <a:pPr>
+              <a:buFont typeface="Wingdings" panose="05000000000000000000" pitchFamily="2" charset="2"/>
+              <a:buChar char="Ø"/>
+            </a:pPr>
+            <a:r>
+              <a:rPr lang="en-US" sz="3200" dirty="0">
+                <a:solidFill>
+                  <a:schemeClr val="tx1">
+                    <a:lumMod val="75000"/>
+                    <a:lumOff val="25000"/>
+                  </a:schemeClr>
+                </a:solidFill>
+                <a:latin typeface="Palatino Linotype" panose="02040502050505030304" pitchFamily="18" charset="0"/>
+              </a:rPr>
+              <a:t> Chain Rule</a:t>
+            </a:r>
+          </a:p>
+        </p:txBody>
+      </p:sp>
+      <p:sp>
+        <p:nvSpPr>
+          <p:cNvPr id="3" name="Title 4">
+            <a:extLst>
+              <a:ext uri="{FF2B5EF4-FFF2-40B4-BE49-F238E27FC236}">
+                <a16:creationId xmlns:a16="http://schemas.microsoft.com/office/drawing/2014/main" id="{8ADCD547-C091-45A4-9127-CC0044D81745}"/>
+              </a:ext>
+            </a:extLst>
+          </p:cNvPr>
+          <p:cNvSpPr>
+            <a:spLocks noGrp="1"/>
+          </p:cNvSpPr>
+          <p:nvPr>
+            <p:ph type="title"/>
+          </p:nvPr>
+        </p:nvSpPr>
+        <p:spPr>
+          <a:xfrm>
+            <a:off x="812802" y="365126"/>
+            <a:ext cx="10540998" cy="1325563"/>
+          </a:xfrm>
+        </p:spPr>
+        <p:txBody>
+          <a:bodyPr/>
+          <a:lstStyle/>
+          <a:p>
+            <a:pPr algn="ctr"/>
+            <a:r>
+              <a:rPr lang="en-US" dirty="0">
+                <a:solidFill>
+                  <a:schemeClr val="tx1">
+                    <a:lumMod val="65000"/>
+                    <a:lumOff val="35000"/>
+                  </a:schemeClr>
+                </a:solidFill>
+                <a:latin typeface="Palatino Linotype" panose="02040502050505030304" pitchFamily="18" charset="0"/>
+              </a:rPr>
+              <a:t>Summary</a:t>
+            </a:r>
+          </a:p>
+        </p:txBody>
+      </p:sp>
     </p:spTree>
     <p:extLst>
       <p:ext uri="{BB962C8B-B14F-4D97-AF65-F5344CB8AC3E}">
-        <p14:creationId xmlns:p14="http://schemas.microsoft.com/office/powerpoint/2010/main" val="2128530490"/>
+        <p14:creationId xmlns:p14="http://schemas.microsoft.com/office/powerpoint/2010/main" val="1397534281"/>
       </p:ext>
     </p:extLst>
   </p:cSld>
@@ -10466,6 +10647,48 @@
           <a:chExt cx="0" cy="0"/>
         </a:xfrm>
       </p:grpSpPr>
+    </p:spTree>
+    <p:extLst>
+      <p:ext uri="{BB962C8B-B14F-4D97-AF65-F5344CB8AC3E}">
+        <p14:creationId xmlns:p14="http://schemas.microsoft.com/office/powerpoint/2010/main" val="2128530490"/>
+      </p:ext>
+    </p:extLst>
+  </p:cSld>
+  <p:clrMapOvr>
+    <a:masterClrMapping/>
+  </p:clrMapOvr>
+  <mc:AlternateContent xmlns:mc="http://schemas.openxmlformats.org/markup-compatibility/2006" xmlns:p14="http://schemas.microsoft.com/office/powerpoint/2010/main">
+    <mc:Choice Requires="p14">
+      <p:transition spd="med" p14:dur="700">
+        <p:fade/>
+      </p:transition>
+    </mc:Choice>
+    <mc:Fallback xmlns="">
+      <p:transition spd="med">
+        <p:fade/>
+      </p:transition>
+    </mc:Fallback>
+  </mc:AlternateContent>
+</p:sld>
+</file>
+
+<file path=ppt/slides/slide22.xml><?xml version="1.0" encoding="utf-8"?>
+<p:sld xmlns:a="http://schemas.openxmlformats.org/drawingml/2006/main" xmlns:r="http://schemas.openxmlformats.org/officeDocument/2006/relationships" xmlns:p="http://schemas.openxmlformats.org/presentationml/2006/main">
+  <p:cSld>
+    <p:spTree>
+      <p:nvGrpSpPr>
+        <p:cNvPr id="1" name=""/>
+        <p:cNvGrpSpPr/>
+        <p:nvPr/>
+      </p:nvGrpSpPr>
+      <p:grpSpPr>
+        <a:xfrm>
+          <a:off x="0" y="0"/>
+          <a:ext cx="0" cy="0"/>
+          <a:chOff x="0" y="0"/>
+          <a:chExt cx="0" cy="0"/>
+        </a:xfrm>
+      </p:grpSpPr>
       <p:pic>
         <p:nvPicPr>
           <p:cNvPr id="2" name="Picture 2">
@@ -10536,7 +10759,7 @@
 </p:sld>
 </file>
 
-<file path=ppt/slides/slide22.xml><?xml version="1.0" encoding="utf-8"?>
+<file path=ppt/slides/slide23.xml><?xml version="1.0" encoding="utf-8"?>
 <p:sld xmlns:a="http://schemas.openxmlformats.org/drawingml/2006/main" xmlns:r="http://schemas.openxmlformats.org/officeDocument/2006/relationships" xmlns:p="http://schemas.openxmlformats.org/presentationml/2006/main">
   <p:cSld>
     <p:spTree>
@@ -10608,7 +10831,7 @@
 </p:sld>
 </file>
 
-<file path=ppt/slides/slide23.xml><?xml version="1.0" encoding="utf-8"?>
+<file path=ppt/slides/slide24.xml><?xml version="1.0" encoding="utf-8"?>
 <p:sld xmlns:a="http://schemas.openxmlformats.org/drawingml/2006/main" xmlns:r="http://schemas.openxmlformats.org/officeDocument/2006/relationships" xmlns:p="http://schemas.openxmlformats.org/presentationml/2006/main">
   <p:cSld>
     <p:spTree>

</xml_diff>

<commit_message>
Notebook & presentation updates for 11.08.22 workshop.
</commit_message>
<xml_diff>
--- a/presentations/03_gradient_descent.pptx
+++ b/presentations/03_gradient_descent.pptx
@@ -240,7 +240,7 @@
           <a:p>
             <a:fld id="{FD93C9B2-20F6-4DB1-B471-224337D0AC79}" type="datetimeFigureOut">
               <a:rPr lang="en-US" smtClean="0"/>
-              <a:t>6/27/2022</a:t>
+              <a:t>11/2/2022</a:t>
             </a:fld>
             <a:endParaRPr lang="en-US"/>
           </a:p>
@@ -6179,7 +6179,7 @@
           <a:p>
             <a:fld id="{C3F78080-8D0A-4BE8-A5B4-CB115102D524}" type="datetimeFigureOut">
               <a:rPr lang="en-US" smtClean="0"/>
-              <a:t>6/27/2022</a:t>
+              <a:t>11/2/2022</a:t>
             </a:fld>
             <a:endParaRPr lang="en-US"/>
           </a:p>
@@ -6377,7 +6377,7 @@
           <a:p>
             <a:fld id="{C3F78080-8D0A-4BE8-A5B4-CB115102D524}" type="datetimeFigureOut">
               <a:rPr lang="en-US" smtClean="0"/>
-              <a:t>6/27/2022</a:t>
+              <a:t>11/2/2022</a:t>
             </a:fld>
             <a:endParaRPr lang="en-US"/>
           </a:p>
@@ -6585,7 +6585,7 @@
           <a:p>
             <a:fld id="{C3F78080-8D0A-4BE8-A5B4-CB115102D524}" type="datetimeFigureOut">
               <a:rPr lang="en-US" smtClean="0"/>
-              <a:t>6/27/2022</a:t>
+              <a:t>11/2/2022</a:t>
             </a:fld>
             <a:endParaRPr lang="en-US"/>
           </a:p>
@@ -6783,7 +6783,7 @@
           <a:p>
             <a:fld id="{C3F78080-8D0A-4BE8-A5B4-CB115102D524}" type="datetimeFigureOut">
               <a:rPr lang="en-US" smtClean="0"/>
-              <a:t>6/27/2022</a:t>
+              <a:t>11/2/2022</a:t>
             </a:fld>
             <a:endParaRPr lang="en-US"/>
           </a:p>
@@ -7058,7 +7058,7 @@
           <a:p>
             <a:fld id="{C3F78080-8D0A-4BE8-A5B4-CB115102D524}" type="datetimeFigureOut">
               <a:rPr lang="en-US" smtClean="0"/>
-              <a:t>6/27/2022</a:t>
+              <a:t>11/2/2022</a:t>
             </a:fld>
             <a:endParaRPr lang="en-US"/>
           </a:p>
@@ -7323,7 +7323,7 @@
           <a:p>
             <a:fld id="{C3F78080-8D0A-4BE8-A5B4-CB115102D524}" type="datetimeFigureOut">
               <a:rPr lang="en-US" smtClean="0"/>
-              <a:t>6/27/2022</a:t>
+              <a:t>11/2/2022</a:t>
             </a:fld>
             <a:endParaRPr lang="en-US"/>
           </a:p>
@@ -7735,7 +7735,7 @@
           <a:p>
             <a:fld id="{C3F78080-8D0A-4BE8-A5B4-CB115102D524}" type="datetimeFigureOut">
               <a:rPr lang="en-US" smtClean="0"/>
-              <a:t>6/27/2022</a:t>
+              <a:t>11/2/2022</a:t>
             </a:fld>
             <a:endParaRPr lang="en-US"/>
           </a:p>
@@ -7876,7 +7876,7 @@
           <a:p>
             <a:fld id="{C3F78080-8D0A-4BE8-A5B4-CB115102D524}" type="datetimeFigureOut">
               <a:rPr lang="en-US" smtClean="0"/>
-              <a:t>6/27/2022</a:t>
+              <a:t>11/2/2022</a:t>
             </a:fld>
             <a:endParaRPr lang="en-US"/>
           </a:p>
@@ -7989,7 +7989,7 @@
           <a:p>
             <a:fld id="{C3F78080-8D0A-4BE8-A5B4-CB115102D524}" type="datetimeFigureOut">
               <a:rPr lang="en-US" smtClean="0"/>
-              <a:t>6/27/2022</a:t>
+              <a:t>11/2/2022</a:t>
             </a:fld>
             <a:endParaRPr lang="en-US"/>
           </a:p>
@@ -8300,7 +8300,7 @@
           <a:p>
             <a:fld id="{C3F78080-8D0A-4BE8-A5B4-CB115102D524}" type="datetimeFigureOut">
               <a:rPr lang="en-US" smtClean="0"/>
-              <a:t>6/27/2022</a:t>
+              <a:t>11/2/2022</a:t>
             </a:fld>
             <a:endParaRPr lang="en-US"/>
           </a:p>
@@ -8588,7 +8588,7 @@
           <a:p>
             <a:fld id="{C3F78080-8D0A-4BE8-A5B4-CB115102D524}" type="datetimeFigureOut">
               <a:rPr lang="en-US" smtClean="0"/>
-              <a:t>6/27/2022</a:t>
+              <a:t>11/2/2022</a:t>
             </a:fld>
             <a:endParaRPr lang="en-US"/>
           </a:p>
@@ -8829,7 +8829,7 @@
           <a:p>
             <a:fld id="{C3F78080-8D0A-4BE8-A5B4-CB115102D524}" type="datetimeFigureOut">
               <a:rPr lang="en-US" smtClean="0"/>
-              <a:t>6/27/2022</a:t>
+              <a:t>11/2/2022</a:t>
             </a:fld>
             <a:endParaRPr lang="en-US"/>
           </a:p>
@@ -19085,10 +19085,19 @@
                   </a:schemeClr>
                 </a:solidFill>
                 <a:latin typeface="Palatino Linotype" panose="02040502050505030304" pitchFamily="18" charset="0"/>
-                <a:cs typeface="Segoe UI Light" panose="020B0502040204020203" pitchFamily="34" charset="0"/>
-              </a:rPr>
-              <a:t>MNISTExercise.pdf</a:t>
-            </a:r>
+              </a:rPr>
+              <a:t>03.2_mnist_classifier.ipynb</a:t>
+            </a:r>
+            <a:endParaRPr lang="en-US" sz="3200" dirty="0">
+              <a:solidFill>
+                <a:schemeClr val="tx1">
+                  <a:lumMod val="65000"/>
+                  <a:lumOff val="35000"/>
+                </a:schemeClr>
+              </a:solidFill>
+              <a:latin typeface="Palatino Linotype" panose="02040502050505030304" pitchFamily="18" charset="0"/>
+              <a:cs typeface="Segoe UI Light" panose="020B0502040204020203" pitchFamily="34" charset="0"/>
+            </a:endParaRPr>
           </a:p>
         </p:txBody>
       </p:sp>
@@ -19179,7 +19188,7 @@
           <p:nvPr/>
         </p:nvPicPr>
         <p:blipFill>
-          <a:blip r:embed="rId4"/>
+          <a:blip r:embed="rId3"/>
           <a:stretch>
             <a:fillRect/>
           </a:stretch>
@@ -19209,7 +19218,7 @@
           <p:nvPr/>
         </p:nvPicPr>
         <p:blipFill>
-          <a:blip r:embed="rId5"/>
+          <a:blip r:embed="rId4"/>
           <a:stretch>
             <a:fillRect/>
           </a:stretch>
@@ -19239,7 +19248,7 @@
           <p:nvPr/>
         </p:nvPicPr>
         <p:blipFill>
-          <a:blip r:embed="rId6"/>
+          <a:blip r:embed="rId5"/>
           <a:stretch>
             <a:fillRect/>
           </a:stretch>
@@ -19269,7 +19278,7 @@
           <p:nvPr/>
         </p:nvPicPr>
         <p:blipFill>
-          <a:blip r:embed="rId7"/>
+          <a:blip r:embed="rId6"/>
           <a:stretch>
             <a:fillRect/>
           </a:stretch>
@@ -19312,12 +19321,12 @@
           <a:graphicData uri="http://schemas.openxmlformats.org/presentationml/2006/ole">
             <mc:AlternateContent xmlns:mc="http://schemas.openxmlformats.org/markup-compatibility/2006">
               <mc:Choice xmlns:v="urn:schemas-microsoft-com:vml" Requires="v">
-                <p:oleObj spid="_x0000_s1380" name="Visio" r:id="rId8" imgW="2514945" imgH="1657350" progId="Visio.Drawing.15">
+                <p:oleObj name="Visio" r:id="rId7" imgW="2514945" imgH="1657350" progId="Visio.Drawing.15">
                   <p:embed/>
                 </p:oleObj>
               </mc:Choice>
               <mc:Fallback>
-                <p:oleObj name="Visio" r:id="rId8" imgW="2514945" imgH="1657350" progId="Visio.Drawing.15">
+                <p:oleObj name="Visio" r:id="rId7" imgW="2514945" imgH="1657350" progId="Visio.Drawing.15">
                   <p:embed/>
                   <p:pic>
                     <p:nvPicPr>
@@ -19326,7 +19335,7 @@
                       <p:nvPr/>
                     </p:nvPicPr>
                     <p:blipFill>
-                      <a:blip r:embed="rId9"/>
+                      <a:blip r:embed="rId8"/>
                       <a:stretch>
                         <a:fillRect/>
                       </a:stretch>
@@ -19362,7 +19371,7 @@
           <p:nvPr/>
         </p:nvPicPr>
         <p:blipFill>
-          <a:blip r:embed="rId10"/>
+          <a:blip r:embed="rId9"/>
           <a:stretch>
             <a:fillRect/>
           </a:stretch>
@@ -19392,7 +19401,7 @@
           <p:nvPr/>
         </p:nvPicPr>
         <p:blipFill>
-          <a:blip r:embed="rId11"/>
+          <a:blip r:embed="rId10"/>
           <a:stretch>
             <a:fillRect/>
           </a:stretch>
@@ -19422,7 +19431,7 @@
           <p:nvPr/>
         </p:nvPicPr>
         <p:blipFill>
-          <a:blip r:embed="rId12"/>
+          <a:blip r:embed="rId11"/>
           <a:stretch>
             <a:fillRect/>
           </a:stretch>
@@ -19452,7 +19461,7 @@
           <p:nvPr/>
         </p:nvPicPr>
         <p:blipFill>
-          <a:blip r:embed="rId13"/>
+          <a:blip r:embed="rId12"/>
           <a:stretch>
             <a:fillRect/>
           </a:stretch>

</xml_diff>